<commit_message>
Continued working on PowerPoint
removed unnecessary slides. Started giving credit in the notes of each slide. We need to get who did what sorted out before the presentation.
</commit_message>
<xml_diff>
--- a/Course Project Presentation 1.pptx
+++ b/Course Project Presentation 1.pptx
@@ -4,17 +4,15 @@
   <p:sldMasterIdLst>
     <p:sldMasterId id="2147483648" r:id="rId1"/>
   </p:sldMasterIdLst>
+  <p:notesMasterIdLst>
+    <p:notesMasterId r:id="rId7"/>
+  </p:notesMasterIdLst>
   <p:sldIdLst>
     <p:sldId id="256" r:id="rId2"/>
-    <p:sldId id="257" r:id="rId3"/>
-    <p:sldId id="258" r:id="rId4"/>
-    <p:sldId id="259" r:id="rId5"/>
-    <p:sldId id="260" r:id="rId6"/>
-    <p:sldId id="265" r:id="rId7"/>
-    <p:sldId id="261" r:id="rId8"/>
-    <p:sldId id="262" r:id="rId9"/>
-    <p:sldId id="263" r:id="rId10"/>
-    <p:sldId id="264" r:id="rId11"/>
+    <p:sldId id="258" r:id="rId3"/>
+    <p:sldId id="259" r:id="rId4"/>
+    <p:sldId id="260" r:id="rId5"/>
+    <p:sldId id="265" r:id="rId6"/>
   </p:sldIdLst>
   <p:sldSz cx="12192000" cy="6858000"/>
   <p:notesSz cx="6858000" cy="9144000"/>
@@ -113,7 +111,709 @@
       </a:defRPr>
     </a:lvl9pPr>
   </p:defaultTextStyle>
+  <p:extLst>
+    <p:ext uri="{EFAFB233-063F-42B5-8137-9DF3F51BA10A}">
+      <p15:sldGuideLst xmlns:p15="http://schemas.microsoft.com/office/powerpoint/2012/main"/>
+    </p:ext>
+  </p:extLst>
 </p:presentation>
+</file>
+
+<file path=ppt/notesMasters/notesMaster1.xml><?xml version="1.0" encoding="utf-8"?>
+<p:notesMaster xmlns:a="http://schemas.openxmlformats.org/drawingml/2006/main" xmlns:r="http://schemas.openxmlformats.org/officeDocument/2006/relationships" xmlns:p="http://schemas.openxmlformats.org/presentationml/2006/main">
+  <p:cSld>
+    <p:bg>
+      <p:bgRef idx="1001">
+        <a:schemeClr val="bg1"/>
+      </p:bgRef>
+    </p:bg>
+    <p:spTree>
+      <p:nvGrpSpPr>
+        <p:cNvPr id="1" name=""/>
+        <p:cNvGrpSpPr/>
+        <p:nvPr/>
+      </p:nvGrpSpPr>
+      <p:grpSpPr>
+        <a:xfrm>
+          <a:off x="0" y="0"/>
+          <a:ext cx="0" cy="0"/>
+          <a:chOff x="0" y="0"/>
+          <a:chExt cx="0" cy="0"/>
+        </a:xfrm>
+      </p:grpSpPr>
+      <p:sp>
+        <p:nvSpPr>
+          <p:cNvPr id="2" name="Header Placeholder 1"/>
+          <p:cNvSpPr>
+            <a:spLocks noGrp="1"/>
+          </p:cNvSpPr>
+          <p:nvPr>
+            <p:ph type="hdr" sz="quarter"/>
+          </p:nvPr>
+        </p:nvSpPr>
+        <p:spPr>
+          <a:xfrm>
+            <a:off x="0" y="0"/>
+            <a:ext cx="2971800" cy="458788"/>
+          </a:xfrm>
+          <a:prstGeom prst="rect">
+            <a:avLst/>
+          </a:prstGeom>
+        </p:spPr>
+        <p:txBody>
+          <a:bodyPr vert="horz" lIns="91440" tIns="45720" rIns="91440" bIns="45720" rtlCol="0"/>
+          <a:lstStyle>
+            <a:lvl1pPr algn="l">
+              <a:defRPr sz="1200"/>
+            </a:lvl1pPr>
+          </a:lstStyle>
+          <a:p>
+            <a:endParaRPr lang="en-US"/>
+          </a:p>
+        </p:txBody>
+      </p:sp>
+      <p:sp>
+        <p:nvSpPr>
+          <p:cNvPr id="3" name="Date Placeholder 2"/>
+          <p:cNvSpPr>
+            <a:spLocks noGrp="1"/>
+          </p:cNvSpPr>
+          <p:nvPr>
+            <p:ph type="dt" idx="1"/>
+          </p:nvPr>
+        </p:nvSpPr>
+        <p:spPr>
+          <a:xfrm>
+            <a:off x="3884613" y="0"/>
+            <a:ext cx="2971800" cy="458788"/>
+          </a:xfrm>
+          <a:prstGeom prst="rect">
+            <a:avLst/>
+          </a:prstGeom>
+        </p:spPr>
+        <p:txBody>
+          <a:bodyPr vert="horz" lIns="91440" tIns="45720" rIns="91440" bIns="45720" rtlCol="0"/>
+          <a:lstStyle>
+            <a:lvl1pPr algn="r">
+              <a:defRPr sz="1200"/>
+            </a:lvl1pPr>
+          </a:lstStyle>
+          <a:p>
+            <a:fld id="{BDF7FFFB-BA7E-49B8-B545-27E28F10223E}" type="datetimeFigureOut">
+              <a:rPr lang="en-US" smtClean="0"/>
+              <a:t>9/26/2018</a:t>
+            </a:fld>
+            <a:endParaRPr lang="en-US"/>
+          </a:p>
+        </p:txBody>
+      </p:sp>
+      <p:sp>
+        <p:nvSpPr>
+          <p:cNvPr id="4" name="Slide Image Placeholder 3"/>
+          <p:cNvSpPr>
+            <a:spLocks noGrp="1" noRot="1" noChangeAspect="1"/>
+          </p:cNvSpPr>
+          <p:nvPr>
+            <p:ph type="sldImg" idx="2"/>
+          </p:nvPr>
+        </p:nvSpPr>
+        <p:spPr>
+          <a:xfrm>
+            <a:off x="685800" y="1143000"/>
+            <a:ext cx="5486400" cy="3086100"/>
+          </a:xfrm>
+          <a:prstGeom prst="rect">
+            <a:avLst/>
+          </a:prstGeom>
+          <a:noFill/>
+          <a:ln w="12700">
+            <a:solidFill>
+              <a:prstClr val="black"/>
+            </a:solidFill>
+          </a:ln>
+        </p:spPr>
+        <p:txBody>
+          <a:bodyPr vert="horz" lIns="91440" tIns="45720" rIns="91440" bIns="45720" rtlCol="0" anchor="ctr"/>
+          <a:lstStyle/>
+          <a:p>
+            <a:endParaRPr lang="en-US"/>
+          </a:p>
+        </p:txBody>
+      </p:sp>
+      <p:sp>
+        <p:nvSpPr>
+          <p:cNvPr id="5" name="Notes Placeholder 4"/>
+          <p:cNvSpPr>
+            <a:spLocks noGrp="1"/>
+          </p:cNvSpPr>
+          <p:nvPr>
+            <p:ph type="body" sz="quarter" idx="3"/>
+          </p:nvPr>
+        </p:nvSpPr>
+        <p:spPr>
+          <a:xfrm>
+            <a:off x="685800" y="4400550"/>
+            <a:ext cx="5486400" cy="3600450"/>
+          </a:xfrm>
+          <a:prstGeom prst="rect">
+            <a:avLst/>
+          </a:prstGeom>
+        </p:spPr>
+        <p:txBody>
+          <a:bodyPr vert="horz" lIns="91440" tIns="45720" rIns="91440" bIns="45720" rtlCol="0"/>
+          <a:lstStyle/>
+          <a:p>
+            <a:pPr lvl="0"/>
+            <a:r>
+              <a:rPr lang="en-US"/>
+              <a:t>Edit Master text styles</a:t>
+            </a:r>
+          </a:p>
+          <a:p>
+            <a:pPr lvl="1"/>
+            <a:r>
+              <a:rPr lang="en-US"/>
+              <a:t>Second level</a:t>
+            </a:r>
+          </a:p>
+          <a:p>
+            <a:pPr lvl="2"/>
+            <a:r>
+              <a:rPr lang="en-US"/>
+              <a:t>Third level</a:t>
+            </a:r>
+          </a:p>
+          <a:p>
+            <a:pPr lvl="3"/>
+            <a:r>
+              <a:rPr lang="en-US"/>
+              <a:t>Fourth level</a:t>
+            </a:r>
+          </a:p>
+          <a:p>
+            <a:pPr lvl="4"/>
+            <a:r>
+              <a:rPr lang="en-US"/>
+              <a:t>Fifth level</a:t>
+            </a:r>
+          </a:p>
+        </p:txBody>
+      </p:sp>
+      <p:sp>
+        <p:nvSpPr>
+          <p:cNvPr id="6" name="Footer Placeholder 5"/>
+          <p:cNvSpPr>
+            <a:spLocks noGrp="1"/>
+          </p:cNvSpPr>
+          <p:nvPr>
+            <p:ph type="ftr" sz="quarter" idx="4"/>
+          </p:nvPr>
+        </p:nvSpPr>
+        <p:spPr>
+          <a:xfrm>
+            <a:off x="0" y="8685213"/>
+            <a:ext cx="2971800" cy="458787"/>
+          </a:xfrm>
+          <a:prstGeom prst="rect">
+            <a:avLst/>
+          </a:prstGeom>
+        </p:spPr>
+        <p:txBody>
+          <a:bodyPr vert="horz" lIns="91440" tIns="45720" rIns="91440" bIns="45720" rtlCol="0" anchor="b"/>
+          <a:lstStyle>
+            <a:lvl1pPr algn="l">
+              <a:defRPr sz="1200"/>
+            </a:lvl1pPr>
+          </a:lstStyle>
+          <a:p>
+            <a:endParaRPr lang="en-US"/>
+          </a:p>
+        </p:txBody>
+      </p:sp>
+      <p:sp>
+        <p:nvSpPr>
+          <p:cNvPr id="7" name="Slide Number Placeholder 6"/>
+          <p:cNvSpPr>
+            <a:spLocks noGrp="1"/>
+          </p:cNvSpPr>
+          <p:nvPr>
+            <p:ph type="sldNum" sz="quarter" idx="5"/>
+          </p:nvPr>
+        </p:nvSpPr>
+        <p:spPr>
+          <a:xfrm>
+            <a:off x="3884613" y="8685213"/>
+            <a:ext cx="2971800" cy="458787"/>
+          </a:xfrm>
+          <a:prstGeom prst="rect">
+            <a:avLst/>
+          </a:prstGeom>
+        </p:spPr>
+        <p:txBody>
+          <a:bodyPr vert="horz" lIns="91440" tIns="45720" rIns="91440" bIns="45720" rtlCol="0" anchor="b"/>
+          <a:lstStyle>
+            <a:lvl1pPr algn="r">
+              <a:defRPr sz="1200"/>
+            </a:lvl1pPr>
+          </a:lstStyle>
+          <a:p>
+            <a:fld id="{6010D91D-3246-47C2-A380-84E50B05807D}" type="slidenum">
+              <a:rPr lang="en-US" smtClean="0"/>
+              <a:t>‹#›</a:t>
+            </a:fld>
+            <a:endParaRPr lang="en-US"/>
+          </a:p>
+        </p:txBody>
+      </p:sp>
+    </p:spTree>
+    <p:extLst>
+      <p:ext uri="{BB962C8B-B14F-4D97-AF65-F5344CB8AC3E}">
+        <p14:creationId xmlns:p14="http://schemas.microsoft.com/office/powerpoint/2010/main" val="402039811"/>
+      </p:ext>
+    </p:extLst>
+  </p:cSld>
+  <p:clrMap bg1="lt1" tx1="dk1" bg2="lt2" tx2="dk2" accent1="accent1" accent2="accent2" accent3="accent3" accent4="accent4" accent5="accent5" accent6="accent6" hlink="hlink" folHlink="folHlink"/>
+  <p:notesStyle>
+    <a:lvl1pPr marL="0" algn="l" defTabSz="914400" rtl="0" eaLnBrk="1" latinLnBrk="0" hangingPunct="1">
+      <a:defRPr sz="1200" kern="1200">
+        <a:solidFill>
+          <a:schemeClr val="tx1"/>
+        </a:solidFill>
+        <a:latin typeface="+mn-lt"/>
+        <a:ea typeface="+mn-ea"/>
+        <a:cs typeface="+mn-cs"/>
+      </a:defRPr>
+    </a:lvl1pPr>
+    <a:lvl2pPr marL="457200" algn="l" defTabSz="914400" rtl="0" eaLnBrk="1" latinLnBrk="0" hangingPunct="1">
+      <a:defRPr sz="1200" kern="1200">
+        <a:solidFill>
+          <a:schemeClr val="tx1"/>
+        </a:solidFill>
+        <a:latin typeface="+mn-lt"/>
+        <a:ea typeface="+mn-ea"/>
+        <a:cs typeface="+mn-cs"/>
+      </a:defRPr>
+    </a:lvl2pPr>
+    <a:lvl3pPr marL="914400" algn="l" defTabSz="914400" rtl="0" eaLnBrk="1" latinLnBrk="0" hangingPunct="1">
+      <a:defRPr sz="1200" kern="1200">
+        <a:solidFill>
+          <a:schemeClr val="tx1"/>
+        </a:solidFill>
+        <a:latin typeface="+mn-lt"/>
+        <a:ea typeface="+mn-ea"/>
+        <a:cs typeface="+mn-cs"/>
+      </a:defRPr>
+    </a:lvl3pPr>
+    <a:lvl4pPr marL="1371600" algn="l" defTabSz="914400" rtl="0" eaLnBrk="1" latinLnBrk="0" hangingPunct="1">
+      <a:defRPr sz="1200" kern="1200">
+        <a:solidFill>
+          <a:schemeClr val="tx1"/>
+        </a:solidFill>
+        <a:latin typeface="+mn-lt"/>
+        <a:ea typeface="+mn-ea"/>
+        <a:cs typeface="+mn-cs"/>
+      </a:defRPr>
+    </a:lvl4pPr>
+    <a:lvl5pPr marL="1828800" algn="l" defTabSz="914400" rtl="0" eaLnBrk="1" latinLnBrk="0" hangingPunct="1">
+      <a:defRPr sz="1200" kern="1200">
+        <a:solidFill>
+          <a:schemeClr val="tx1"/>
+        </a:solidFill>
+        <a:latin typeface="+mn-lt"/>
+        <a:ea typeface="+mn-ea"/>
+        <a:cs typeface="+mn-cs"/>
+      </a:defRPr>
+    </a:lvl5pPr>
+    <a:lvl6pPr marL="2286000" algn="l" defTabSz="914400" rtl="0" eaLnBrk="1" latinLnBrk="0" hangingPunct="1">
+      <a:defRPr sz="1200" kern="1200">
+        <a:solidFill>
+          <a:schemeClr val="tx1"/>
+        </a:solidFill>
+        <a:latin typeface="+mn-lt"/>
+        <a:ea typeface="+mn-ea"/>
+        <a:cs typeface="+mn-cs"/>
+      </a:defRPr>
+    </a:lvl6pPr>
+    <a:lvl7pPr marL="2743200" algn="l" defTabSz="914400" rtl="0" eaLnBrk="1" latinLnBrk="0" hangingPunct="1">
+      <a:defRPr sz="1200" kern="1200">
+        <a:solidFill>
+          <a:schemeClr val="tx1"/>
+        </a:solidFill>
+        <a:latin typeface="+mn-lt"/>
+        <a:ea typeface="+mn-ea"/>
+        <a:cs typeface="+mn-cs"/>
+      </a:defRPr>
+    </a:lvl7pPr>
+    <a:lvl8pPr marL="3200400" algn="l" defTabSz="914400" rtl="0" eaLnBrk="1" latinLnBrk="0" hangingPunct="1">
+      <a:defRPr sz="1200" kern="1200">
+        <a:solidFill>
+          <a:schemeClr val="tx1"/>
+        </a:solidFill>
+        <a:latin typeface="+mn-lt"/>
+        <a:ea typeface="+mn-ea"/>
+        <a:cs typeface="+mn-cs"/>
+      </a:defRPr>
+    </a:lvl8pPr>
+    <a:lvl9pPr marL="3657600" algn="l" defTabSz="914400" rtl="0" eaLnBrk="1" latinLnBrk="0" hangingPunct="1">
+      <a:defRPr sz="1200" kern="1200">
+        <a:solidFill>
+          <a:schemeClr val="tx1"/>
+        </a:solidFill>
+        <a:latin typeface="+mn-lt"/>
+        <a:ea typeface="+mn-ea"/>
+        <a:cs typeface="+mn-cs"/>
+      </a:defRPr>
+    </a:lvl9pPr>
+  </p:notesStyle>
+</p:notesMaster>
+</file>
+
+<file path=ppt/notesSlides/notesSlide1.xml><?xml version="1.0" encoding="utf-8"?>
+<p:notes xmlns:a="http://schemas.openxmlformats.org/drawingml/2006/main" xmlns:r="http://schemas.openxmlformats.org/officeDocument/2006/relationships" xmlns:p="http://schemas.openxmlformats.org/presentationml/2006/main">
+  <p:cSld>
+    <p:spTree>
+      <p:nvGrpSpPr>
+        <p:cNvPr id="1" name=""/>
+        <p:cNvGrpSpPr/>
+        <p:nvPr/>
+      </p:nvGrpSpPr>
+      <p:grpSpPr>
+        <a:xfrm>
+          <a:off x="0" y="0"/>
+          <a:ext cx="0" cy="0"/>
+          <a:chOff x="0" y="0"/>
+          <a:chExt cx="0" cy="0"/>
+        </a:xfrm>
+      </p:grpSpPr>
+      <p:sp>
+        <p:nvSpPr>
+          <p:cNvPr id="2" name="Slide Image Placeholder 1"/>
+          <p:cNvSpPr>
+            <a:spLocks noGrp="1" noRot="1" noChangeAspect="1"/>
+          </p:cNvSpPr>
+          <p:nvPr>
+            <p:ph type="sldImg"/>
+          </p:nvPr>
+        </p:nvSpPr>
+        <p:spPr/>
+      </p:sp>
+      <p:sp>
+        <p:nvSpPr>
+          <p:cNvPr id="3" name="Notes Placeholder 2"/>
+          <p:cNvSpPr>
+            <a:spLocks noGrp="1"/>
+          </p:cNvSpPr>
+          <p:nvPr>
+            <p:ph type="body" idx="1"/>
+          </p:nvPr>
+        </p:nvSpPr>
+        <p:spPr/>
+        <p:txBody>
+          <a:bodyPr/>
+          <a:lstStyle/>
+          <a:p>
+            <a:r>
+              <a:rPr lang="en-US" dirty="0"/>
+              <a:t>Jonathan made this.</a:t>
+            </a:r>
+          </a:p>
+        </p:txBody>
+      </p:sp>
+      <p:sp>
+        <p:nvSpPr>
+          <p:cNvPr id="4" name="Slide Number Placeholder 3"/>
+          <p:cNvSpPr>
+            <a:spLocks noGrp="1"/>
+          </p:cNvSpPr>
+          <p:nvPr>
+            <p:ph type="sldNum" sz="quarter" idx="5"/>
+          </p:nvPr>
+        </p:nvSpPr>
+        <p:spPr/>
+        <p:txBody>
+          <a:bodyPr/>
+          <a:lstStyle/>
+          <a:p>
+            <a:fld id="{6010D91D-3246-47C2-A380-84E50B05807D}" type="slidenum">
+              <a:rPr lang="en-US" smtClean="0"/>
+              <a:t>2</a:t>
+            </a:fld>
+            <a:endParaRPr lang="en-US"/>
+          </a:p>
+        </p:txBody>
+      </p:sp>
+    </p:spTree>
+    <p:extLst>
+      <p:ext uri="{BB962C8B-B14F-4D97-AF65-F5344CB8AC3E}">
+        <p14:creationId xmlns:p14="http://schemas.microsoft.com/office/powerpoint/2010/main" val="3674417569"/>
+      </p:ext>
+    </p:extLst>
+  </p:cSld>
+  <p:clrMapOvr>
+    <a:masterClrMapping/>
+  </p:clrMapOvr>
+</p:notes>
+</file>
+
+<file path=ppt/notesSlides/notesSlide2.xml><?xml version="1.0" encoding="utf-8"?>
+<p:notes xmlns:a="http://schemas.openxmlformats.org/drawingml/2006/main" xmlns:r="http://schemas.openxmlformats.org/officeDocument/2006/relationships" xmlns:p="http://schemas.openxmlformats.org/presentationml/2006/main">
+  <p:cSld>
+    <p:spTree>
+      <p:nvGrpSpPr>
+        <p:cNvPr id="1" name=""/>
+        <p:cNvGrpSpPr/>
+        <p:nvPr/>
+      </p:nvGrpSpPr>
+      <p:grpSpPr>
+        <a:xfrm>
+          <a:off x="0" y="0"/>
+          <a:ext cx="0" cy="0"/>
+          <a:chOff x="0" y="0"/>
+          <a:chExt cx="0" cy="0"/>
+        </a:xfrm>
+      </p:grpSpPr>
+      <p:sp>
+        <p:nvSpPr>
+          <p:cNvPr id="2" name="Slide Image Placeholder 1"/>
+          <p:cNvSpPr>
+            <a:spLocks noGrp="1" noRot="1" noChangeAspect="1"/>
+          </p:cNvSpPr>
+          <p:nvPr>
+            <p:ph type="sldImg"/>
+          </p:nvPr>
+        </p:nvSpPr>
+        <p:spPr/>
+      </p:sp>
+      <p:sp>
+        <p:nvSpPr>
+          <p:cNvPr id="3" name="Notes Placeholder 2"/>
+          <p:cNvSpPr>
+            <a:spLocks noGrp="1"/>
+          </p:cNvSpPr>
+          <p:nvPr>
+            <p:ph type="body" idx="1"/>
+          </p:nvPr>
+        </p:nvSpPr>
+        <p:spPr/>
+        <p:txBody>
+          <a:bodyPr/>
+          <a:lstStyle/>
+          <a:p>
+            <a:r>
+              <a:rPr lang="en-US" dirty="0"/>
+              <a:t>Eric made most of on his own, with some alterations suggested by Alexander and Jonathan.</a:t>
+            </a:r>
+          </a:p>
+        </p:txBody>
+      </p:sp>
+      <p:sp>
+        <p:nvSpPr>
+          <p:cNvPr id="4" name="Slide Number Placeholder 3"/>
+          <p:cNvSpPr>
+            <a:spLocks noGrp="1"/>
+          </p:cNvSpPr>
+          <p:nvPr>
+            <p:ph type="sldNum" sz="quarter" idx="5"/>
+          </p:nvPr>
+        </p:nvSpPr>
+        <p:spPr/>
+        <p:txBody>
+          <a:bodyPr/>
+          <a:lstStyle/>
+          <a:p>
+            <a:fld id="{6010D91D-3246-47C2-A380-84E50B05807D}" type="slidenum">
+              <a:rPr lang="en-US" smtClean="0"/>
+              <a:t>3</a:t>
+            </a:fld>
+            <a:endParaRPr lang="en-US"/>
+          </a:p>
+        </p:txBody>
+      </p:sp>
+    </p:spTree>
+    <p:extLst>
+      <p:ext uri="{BB962C8B-B14F-4D97-AF65-F5344CB8AC3E}">
+        <p14:creationId xmlns:p14="http://schemas.microsoft.com/office/powerpoint/2010/main" val="2013586668"/>
+      </p:ext>
+    </p:extLst>
+  </p:cSld>
+  <p:clrMapOvr>
+    <a:masterClrMapping/>
+  </p:clrMapOvr>
+</p:notes>
+</file>
+
+<file path=ppt/notesSlides/notesSlide3.xml><?xml version="1.0" encoding="utf-8"?>
+<p:notes xmlns:a="http://schemas.openxmlformats.org/drawingml/2006/main" xmlns:r="http://schemas.openxmlformats.org/officeDocument/2006/relationships" xmlns:p="http://schemas.openxmlformats.org/presentationml/2006/main">
+  <p:cSld>
+    <p:spTree>
+      <p:nvGrpSpPr>
+        <p:cNvPr id="1" name=""/>
+        <p:cNvGrpSpPr/>
+        <p:nvPr/>
+      </p:nvGrpSpPr>
+      <p:grpSpPr>
+        <a:xfrm>
+          <a:off x="0" y="0"/>
+          <a:ext cx="0" cy="0"/>
+          <a:chOff x="0" y="0"/>
+          <a:chExt cx="0" cy="0"/>
+        </a:xfrm>
+      </p:grpSpPr>
+      <p:sp>
+        <p:nvSpPr>
+          <p:cNvPr id="2" name="Slide Image Placeholder 1"/>
+          <p:cNvSpPr>
+            <a:spLocks noGrp="1" noRot="1" noChangeAspect="1"/>
+          </p:cNvSpPr>
+          <p:nvPr>
+            <p:ph type="sldImg"/>
+          </p:nvPr>
+        </p:nvSpPr>
+        <p:spPr/>
+      </p:sp>
+      <p:sp>
+        <p:nvSpPr>
+          <p:cNvPr id="3" name="Notes Placeholder 2"/>
+          <p:cNvSpPr>
+            <a:spLocks noGrp="1"/>
+          </p:cNvSpPr>
+          <p:nvPr>
+            <p:ph type="body" idx="1"/>
+          </p:nvPr>
+        </p:nvSpPr>
+        <p:spPr/>
+        <p:txBody>
+          <a:bodyPr/>
+          <a:lstStyle/>
+          <a:p>
+            <a:r>
+              <a:rPr lang="en-US" dirty="0"/>
+              <a:t>Eric made all the input boxes and buttons.  Alexander got the add degree and remove degree buttons to work, with assistance from Jonathan. Alexander also made the header visible in the background, and the window the form is displayed in.</a:t>
+            </a:r>
+          </a:p>
+        </p:txBody>
+      </p:sp>
+      <p:sp>
+        <p:nvSpPr>
+          <p:cNvPr id="4" name="Slide Number Placeholder 3"/>
+          <p:cNvSpPr>
+            <a:spLocks noGrp="1"/>
+          </p:cNvSpPr>
+          <p:nvPr>
+            <p:ph type="sldNum" sz="quarter" idx="5"/>
+          </p:nvPr>
+        </p:nvSpPr>
+        <p:spPr/>
+        <p:txBody>
+          <a:bodyPr/>
+          <a:lstStyle/>
+          <a:p>
+            <a:fld id="{6010D91D-3246-47C2-A380-84E50B05807D}" type="slidenum">
+              <a:rPr lang="en-US" smtClean="0"/>
+              <a:t>4</a:t>
+            </a:fld>
+            <a:endParaRPr lang="en-US"/>
+          </a:p>
+        </p:txBody>
+      </p:sp>
+    </p:spTree>
+    <p:extLst>
+      <p:ext uri="{BB962C8B-B14F-4D97-AF65-F5344CB8AC3E}">
+        <p14:creationId xmlns:p14="http://schemas.microsoft.com/office/powerpoint/2010/main" val="4230267099"/>
+      </p:ext>
+    </p:extLst>
+  </p:cSld>
+  <p:clrMapOvr>
+    <a:masterClrMapping/>
+  </p:clrMapOvr>
+</p:notes>
+</file>
+
+<file path=ppt/notesSlides/notesSlide4.xml><?xml version="1.0" encoding="utf-8"?>
+<p:notes xmlns:a="http://schemas.openxmlformats.org/drawingml/2006/main" xmlns:r="http://schemas.openxmlformats.org/officeDocument/2006/relationships" xmlns:p="http://schemas.openxmlformats.org/presentationml/2006/main">
+  <p:cSld>
+    <p:spTree>
+      <p:nvGrpSpPr>
+        <p:cNvPr id="1" name=""/>
+        <p:cNvGrpSpPr/>
+        <p:nvPr/>
+      </p:nvGrpSpPr>
+      <p:grpSpPr>
+        <a:xfrm>
+          <a:off x="0" y="0"/>
+          <a:ext cx="0" cy="0"/>
+          <a:chOff x="0" y="0"/>
+          <a:chExt cx="0" cy="0"/>
+        </a:xfrm>
+      </p:grpSpPr>
+      <p:sp>
+        <p:nvSpPr>
+          <p:cNvPr id="2" name="Slide Image Placeholder 1"/>
+          <p:cNvSpPr>
+            <a:spLocks noGrp="1" noRot="1" noChangeAspect="1"/>
+          </p:cNvSpPr>
+          <p:nvPr>
+            <p:ph type="sldImg"/>
+          </p:nvPr>
+        </p:nvSpPr>
+        <p:spPr/>
+      </p:sp>
+      <p:sp>
+        <p:nvSpPr>
+          <p:cNvPr id="3" name="Notes Placeholder 2"/>
+          <p:cNvSpPr>
+            <a:spLocks noGrp="1"/>
+          </p:cNvSpPr>
+          <p:nvPr>
+            <p:ph type="body" idx="1"/>
+          </p:nvPr>
+        </p:nvSpPr>
+        <p:spPr/>
+        <p:txBody>
+          <a:bodyPr/>
+          <a:lstStyle/>
+          <a:p>
+            <a:r>
+              <a:rPr lang="en-US" dirty="0"/>
+              <a:t>Eric made the input boxes and label text. Alexander plugged that into a window, and applied the style.</a:t>
+            </a:r>
+          </a:p>
+        </p:txBody>
+      </p:sp>
+      <p:sp>
+        <p:nvSpPr>
+          <p:cNvPr id="4" name="Slide Number Placeholder 3"/>
+          <p:cNvSpPr>
+            <a:spLocks noGrp="1"/>
+          </p:cNvSpPr>
+          <p:nvPr>
+            <p:ph type="sldNum" sz="quarter" idx="5"/>
+          </p:nvPr>
+        </p:nvSpPr>
+        <p:spPr/>
+        <p:txBody>
+          <a:bodyPr/>
+          <a:lstStyle/>
+          <a:p>
+            <a:fld id="{6010D91D-3246-47C2-A380-84E50B05807D}" type="slidenum">
+              <a:rPr lang="en-US" smtClean="0"/>
+              <a:t>5</a:t>
+            </a:fld>
+            <a:endParaRPr lang="en-US"/>
+          </a:p>
+        </p:txBody>
+      </p:sp>
+    </p:spTree>
+    <p:extLst>
+      <p:ext uri="{BB962C8B-B14F-4D97-AF65-F5344CB8AC3E}">
+        <p14:creationId xmlns:p14="http://schemas.microsoft.com/office/powerpoint/2010/main" val="2101869579"/>
+      </p:ext>
+    </p:extLst>
+  </p:cSld>
+  <p:clrMapOvr>
+    <a:masterClrMapping/>
+  </p:clrMapOvr>
+</p:notes>
 </file>
 
 <file path=ppt/slideLayouts/slideLayout1.xml><?xml version="1.0" encoding="utf-8"?>
@@ -263,7 +963,7 @@
           <a:p>
             <a:fld id="{F5419309-CD7D-4A31-A808-F6632611B59D}" type="datetimeFigureOut">
               <a:rPr lang="en-US" smtClean="0"/>
-              <a:t>9/24/2018</a:t>
+              <a:t>9/26/2018</a:t>
             </a:fld>
             <a:endParaRPr lang="en-US"/>
           </a:p>
@@ -461,7 +1161,7 @@
           <a:p>
             <a:fld id="{F5419309-CD7D-4A31-A808-F6632611B59D}" type="datetimeFigureOut">
               <a:rPr lang="en-US" smtClean="0"/>
-              <a:t>9/24/2018</a:t>
+              <a:t>9/26/2018</a:t>
             </a:fld>
             <a:endParaRPr lang="en-US"/>
           </a:p>
@@ -669,7 +1369,7 @@
           <a:p>
             <a:fld id="{F5419309-CD7D-4A31-A808-F6632611B59D}" type="datetimeFigureOut">
               <a:rPr lang="en-US" smtClean="0"/>
-              <a:t>9/24/2018</a:t>
+              <a:t>9/26/2018</a:t>
             </a:fld>
             <a:endParaRPr lang="en-US"/>
           </a:p>
@@ -867,7 +1567,7 @@
           <a:p>
             <a:fld id="{F5419309-CD7D-4A31-A808-F6632611B59D}" type="datetimeFigureOut">
               <a:rPr lang="en-US" smtClean="0"/>
-              <a:t>9/24/2018</a:t>
+              <a:t>9/26/2018</a:t>
             </a:fld>
             <a:endParaRPr lang="en-US"/>
           </a:p>
@@ -1142,7 +1842,7 @@
           <a:p>
             <a:fld id="{F5419309-CD7D-4A31-A808-F6632611B59D}" type="datetimeFigureOut">
               <a:rPr lang="en-US" smtClean="0"/>
-              <a:t>9/24/2018</a:t>
+              <a:t>9/26/2018</a:t>
             </a:fld>
             <a:endParaRPr lang="en-US"/>
           </a:p>
@@ -1407,7 +2107,7 @@
           <a:p>
             <a:fld id="{F5419309-CD7D-4A31-A808-F6632611B59D}" type="datetimeFigureOut">
               <a:rPr lang="en-US" smtClean="0"/>
-              <a:t>9/24/2018</a:t>
+              <a:t>9/26/2018</a:t>
             </a:fld>
             <a:endParaRPr lang="en-US"/>
           </a:p>
@@ -1819,7 +2519,7 @@
           <a:p>
             <a:fld id="{F5419309-CD7D-4A31-A808-F6632611B59D}" type="datetimeFigureOut">
               <a:rPr lang="en-US" smtClean="0"/>
-              <a:t>9/24/2018</a:t>
+              <a:t>9/26/2018</a:t>
             </a:fld>
             <a:endParaRPr lang="en-US"/>
           </a:p>
@@ -1960,7 +2660,7 @@
           <a:p>
             <a:fld id="{F5419309-CD7D-4A31-A808-F6632611B59D}" type="datetimeFigureOut">
               <a:rPr lang="en-US" smtClean="0"/>
-              <a:t>9/24/2018</a:t>
+              <a:t>9/26/2018</a:t>
             </a:fld>
             <a:endParaRPr lang="en-US"/>
           </a:p>
@@ -2073,7 +2773,7 @@
           <a:p>
             <a:fld id="{F5419309-CD7D-4A31-A808-F6632611B59D}" type="datetimeFigureOut">
               <a:rPr lang="en-US" smtClean="0"/>
-              <a:t>9/24/2018</a:t>
+              <a:t>9/26/2018</a:t>
             </a:fld>
             <a:endParaRPr lang="en-US"/>
           </a:p>
@@ -2384,7 +3084,7 @@
           <a:p>
             <a:fld id="{F5419309-CD7D-4A31-A808-F6632611B59D}" type="datetimeFigureOut">
               <a:rPr lang="en-US" smtClean="0"/>
-              <a:t>9/24/2018</a:t>
+              <a:t>9/26/2018</a:t>
             </a:fld>
             <a:endParaRPr lang="en-US"/>
           </a:p>
@@ -2672,7 +3372,7 @@
           <a:p>
             <a:fld id="{F5419309-CD7D-4A31-A808-F6632611B59D}" type="datetimeFigureOut">
               <a:rPr lang="en-US" smtClean="0"/>
-              <a:t>9/24/2018</a:t>
+              <a:t>9/26/2018</a:t>
             </a:fld>
             <a:endParaRPr lang="en-US"/>
           </a:p>
@@ -2913,7 +3613,7 @@
           <a:p>
             <a:fld id="{F5419309-CD7D-4A31-A808-F6632611B59D}" type="datetimeFigureOut">
               <a:rPr lang="en-US" smtClean="0"/>
-              <a:t>9/24/2018</a:t>
+              <a:t>9/26/2018</a:t>
             </a:fld>
             <a:endParaRPr lang="en-US"/>
           </a:p>
@@ -3396,89 +4096,6 @@
 </p:sld>
 </file>
 
-<file path=ppt/slides/slide10.xml><?xml version="1.0" encoding="utf-8"?>
-<p:sld xmlns:a="http://schemas.openxmlformats.org/drawingml/2006/main" xmlns:r="http://schemas.openxmlformats.org/officeDocument/2006/relationships" xmlns:p="http://schemas.openxmlformats.org/presentationml/2006/main">
-  <p:cSld>
-    <p:spTree>
-      <p:nvGrpSpPr>
-        <p:cNvPr id="1" name=""/>
-        <p:cNvGrpSpPr/>
-        <p:nvPr/>
-      </p:nvGrpSpPr>
-      <p:grpSpPr>
-        <a:xfrm>
-          <a:off x="0" y="0"/>
-          <a:ext cx="0" cy="0"/>
-          <a:chOff x="0" y="0"/>
-          <a:chExt cx="0" cy="0"/>
-        </a:xfrm>
-      </p:grpSpPr>
-      <p:sp>
-        <p:nvSpPr>
-          <p:cNvPr id="2" name="Title 1">
-            <a:extLst>
-              <a:ext uri="{FF2B5EF4-FFF2-40B4-BE49-F238E27FC236}">
-                <a16:creationId xmlns:a16="http://schemas.microsoft.com/office/drawing/2014/main" id="{04BADB71-C160-4D23-9DAD-20192A181599}"/>
-              </a:ext>
-            </a:extLst>
-          </p:cNvPr>
-          <p:cNvSpPr>
-            <a:spLocks noGrp="1"/>
-          </p:cNvSpPr>
-          <p:nvPr>
-            <p:ph type="title"/>
-          </p:nvPr>
-        </p:nvSpPr>
-        <p:spPr/>
-        <p:txBody>
-          <a:bodyPr/>
-          <a:lstStyle/>
-          <a:p>
-            <a:r>
-              <a:rPr lang="en-US" dirty="0"/>
-              <a:t>Jacob Hu’s contributions</a:t>
-            </a:r>
-          </a:p>
-        </p:txBody>
-      </p:sp>
-      <p:sp>
-        <p:nvSpPr>
-          <p:cNvPr id="3" name="Content Placeholder 2">
-            <a:extLst>
-              <a:ext uri="{FF2B5EF4-FFF2-40B4-BE49-F238E27FC236}">
-                <a16:creationId xmlns:a16="http://schemas.microsoft.com/office/drawing/2014/main" id="{95177628-C2D1-4A3C-8220-C87E9800CFE9}"/>
-              </a:ext>
-            </a:extLst>
-          </p:cNvPr>
-          <p:cNvSpPr>
-            <a:spLocks noGrp="1"/>
-          </p:cNvSpPr>
-          <p:nvPr>
-            <p:ph idx="1"/>
-          </p:nvPr>
-        </p:nvSpPr>
-        <p:spPr/>
-        <p:txBody>
-          <a:bodyPr/>
-          <a:lstStyle/>
-          <a:p>
-            <a:endParaRPr lang="en-US"/>
-          </a:p>
-        </p:txBody>
-      </p:sp>
-    </p:spTree>
-    <p:extLst>
-      <p:ext uri="{BB962C8B-B14F-4D97-AF65-F5344CB8AC3E}">
-        <p14:creationId xmlns:p14="http://schemas.microsoft.com/office/powerpoint/2010/main" val="346083056"/>
-      </p:ext>
-    </p:extLst>
-  </p:cSld>
-  <p:clrMapOvr>
-    <a:masterClrMapping/>
-  </p:clrMapOvr>
-</p:sld>
-</file>
-
 <file path=ppt/slides/slide2.xml><?xml version="1.0" encoding="utf-8"?>
 <p:sld xmlns:a="http://schemas.openxmlformats.org/drawingml/2006/main" xmlns:r="http://schemas.openxmlformats.org/officeDocument/2006/relationships" xmlns:p="http://schemas.openxmlformats.org/presentationml/2006/main">
   <p:cSld>
@@ -3501,7 +4118,7 @@
           <p:cNvPr id="2" name="Title 1">
             <a:extLst>
               <a:ext uri="{FF2B5EF4-FFF2-40B4-BE49-F238E27FC236}">
-                <a16:creationId xmlns:a16="http://schemas.microsoft.com/office/drawing/2014/main" id="{BE0AAD93-A250-4304-87AB-60293EFA755A}"/>
+                <a16:creationId xmlns:a16="http://schemas.microsoft.com/office/drawing/2014/main" id="{1B7B4BB2-4FE5-43F3-AB17-BA31C3736854}"/>
               </a:ext>
             </a:extLst>
           </p:cNvPr>
@@ -3519,40 +4136,50 @@
           <a:p>
             <a:r>
               <a:rPr lang="en-US" dirty="0"/>
-              <a:t>User-end activities</a:t>
-            </a:r>
-          </a:p>
-        </p:txBody>
-      </p:sp>
-      <p:sp>
-        <p:nvSpPr>
-          <p:cNvPr id="3" name="Content Placeholder 2">
-            <a:extLst>
-              <a:ext uri="{FF2B5EF4-FFF2-40B4-BE49-F238E27FC236}">
-                <a16:creationId xmlns:a16="http://schemas.microsoft.com/office/drawing/2014/main" id="{B7AA7785-FFE9-4AB8-A373-FC8E93D8EB8F}"/>
-              </a:ext>
-            </a:extLst>
-          </p:cNvPr>
-          <p:cNvSpPr>
-            <a:spLocks noGrp="1"/>
-          </p:cNvSpPr>
+              <a:t>Admin-end activities</a:t>
+            </a:r>
+          </a:p>
+        </p:txBody>
+      </p:sp>
+      <p:pic>
+        <p:nvPicPr>
+          <p:cNvPr id="5" name="Content Placeholder 4">
+            <a:extLst>
+              <a:ext uri="{FF2B5EF4-FFF2-40B4-BE49-F238E27FC236}">
+                <a16:creationId xmlns:a16="http://schemas.microsoft.com/office/drawing/2014/main" id="{AF00F3FD-13BC-4D02-AAEE-DB6ADE1415CF}"/>
+              </a:ext>
+            </a:extLst>
+          </p:cNvPr>
+          <p:cNvPicPr>
+            <a:picLocks noGrp="1" noChangeAspect="1"/>
+          </p:cNvPicPr>
           <p:nvPr>
             <p:ph idx="1"/>
           </p:nvPr>
-        </p:nvSpPr>
-        <p:spPr/>
-        <p:txBody>
-          <a:bodyPr/>
-          <a:lstStyle/>
-          <a:p>
-            <a:endParaRPr lang="en-US" dirty="0"/>
-          </a:p>
-        </p:txBody>
-      </p:sp>
+        </p:nvPicPr>
+        <p:blipFill>
+          <a:blip r:embed="rId3">
+            <a:extLst>
+              <a:ext uri="{28A0092B-C50C-407E-A947-70E740481C1C}">
+                <a14:useLocalDpi xmlns:a14="http://schemas.microsoft.com/office/drawing/2010/main" val="0"/>
+              </a:ext>
+            </a:extLst>
+          </a:blip>
+          <a:stretch>
+            <a:fillRect/>
+          </a:stretch>
+        </p:blipFill>
+        <p:spPr>
+          <a:xfrm>
+            <a:off x="838200" y="2987544"/>
+            <a:ext cx="10515600" cy="2027499"/>
+          </a:xfrm>
+        </p:spPr>
+      </p:pic>
     </p:spTree>
     <p:extLst>
       <p:ext uri="{BB962C8B-B14F-4D97-AF65-F5344CB8AC3E}">
-        <p14:creationId xmlns:p14="http://schemas.microsoft.com/office/powerpoint/2010/main" val="3510311937"/>
+        <p14:creationId xmlns:p14="http://schemas.microsoft.com/office/powerpoint/2010/main" val="482051002"/>
       </p:ext>
     </p:extLst>
   </p:cSld>
@@ -3584,7 +4211,7 @@
           <p:cNvPr id="2" name="Title 1">
             <a:extLst>
               <a:ext uri="{FF2B5EF4-FFF2-40B4-BE49-F238E27FC236}">
-                <a16:creationId xmlns:a16="http://schemas.microsoft.com/office/drawing/2014/main" id="{1B7B4BB2-4FE5-43F3-AB17-BA31C3736854}"/>
+                <a16:creationId xmlns:a16="http://schemas.microsoft.com/office/drawing/2014/main" id="{E757FE7C-CE19-4A9D-A99C-0A2A23E0B17A}"/>
               </a:ext>
             </a:extLst>
           </p:cNvPr>
@@ -3602,40 +4229,50 @@
           <a:p>
             <a:r>
               <a:rPr lang="en-US" dirty="0"/>
-              <a:t>Admin-end activities</a:t>
-            </a:r>
-          </a:p>
-        </p:txBody>
-      </p:sp>
-      <p:sp>
-        <p:nvSpPr>
-          <p:cNvPr id="3" name="Content Placeholder 2">
-            <a:extLst>
-              <a:ext uri="{FF2B5EF4-FFF2-40B4-BE49-F238E27FC236}">
-                <a16:creationId xmlns:a16="http://schemas.microsoft.com/office/drawing/2014/main" id="{83AB1804-09D1-4C7B-BA1C-0A80FAFEE6AE}"/>
-              </a:ext>
-            </a:extLst>
-          </p:cNvPr>
-          <p:cNvSpPr>
-            <a:spLocks noGrp="1"/>
-          </p:cNvSpPr>
+              <a:t>Database Design</a:t>
+            </a:r>
+          </a:p>
+        </p:txBody>
+      </p:sp>
+      <p:pic>
+        <p:nvPicPr>
+          <p:cNvPr id="5" name="Content Placeholder 4">
+            <a:extLst>
+              <a:ext uri="{FF2B5EF4-FFF2-40B4-BE49-F238E27FC236}">
+                <a16:creationId xmlns:a16="http://schemas.microsoft.com/office/drawing/2014/main" id="{26A6C515-A8E2-4E96-B4AD-ED2E30311369}"/>
+              </a:ext>
+            </a:extLst>
+          </p:cNvPr>
+          <p:cNvPicPr>
+            <a:picLocks noGrp="1" noChangeAspect="1"/>
+          </p:cNvPicPr>
           <p:nvPr>
             <p:ph idx="1"/>
           </p:nvPr>
-        </p:nvSpPr>
-        <p:spPr/>
-        <p:txBody>
-          <a:bodyPr/>
-          <a:lstStyle/>
-          <a:p>
-            <a:endParaRPr lang="en-US"/>
-          </a:p>
-        </p:txBody>
-      </p:sp>
+        </p:nvPicPr>
+        <p:blipFill>
+          <a:blip r:embed="rId3">
+            <a:extLst>
+              <a:ext uri="{28A0092B-C50C-407E-A947-70E740481C1C}">
+                <a14:useLocalDpi xmlns:a14="http://schemas.microsoft.com/office/drawing/2010/main" val="0"/>
+              </a:ext>
+            </a:extLst>
+          </a:blip>
+          <a:stretch>
+            <a:fillRect/>
+          </a:stretch>
+        </p:blipFill>
+        <p:spPr>
+          <a:xfrm>
+            <a:off x="2185987" y="1690688"/>
+            <a:ext cx="7820025" cy="4963214"/>
+          </a:xfrm>
+        </p:spPr>
+      </p:pic>
     </p:spTree>
     <p:extLst>
       <p:ext uri="{BB962C8B-B14F-4D97-AF65-F5344CB8AC3E}">
-        <p14:creationId xmlns:p14="http://schemas.microsoft.com/office/powerpoint/2010/main" val="482051002"/>
+        <p14:creationId xmlns:p14="http://schemas.microsoft.com/office/powerpoint/2010/main" val="2520816941"/>
       </p:ext>
     </p:extLst>
   </p:cSld>
@@ -3667,7 +4304,7 @@
           <p:cNvPr id="2" name="Title 1">
             <a:extLst>
               <a:ext uri="{FF2B5EF4-FFF2-40B4-BE49-F238E27FC236}">
-                <a16:creationId xmlns:a16="http://schemas.microsoft.com/office/drawing/2014/main" id="{E757FE7C-CE19-4A9D-A99C-0A2A23E0B17A}"/>
+                <a16:creationId xmlns:a16="http://schemas.microsoft.com/office/drawing/2014/main" id="{6060D5DF-1D6A-4416-9A18-137D9DA4EB41}"/>
               </a:ext>
             </a:extLst>
           </p:cNvPr>
@@ -3685,40 +4322,50 @@
           <a:p>
             <a:r>
               <a:rPr lang="en-US" dirty="0"/>
-              <a:t>Database Design</a:t>
-            </a:r>
-          </a:p>
-        </p:txBody>
-      </p:sp>
-      <p:sp>
-        <p:nvSpPr>
-          <p:cNvPr id="3" name="Content Placeholder 2">
-            <a:extLst>
-              <a:ext uri="{FF2B5EF4-FFF2-40B4-BE49-F238E27FC236}">
-                <a16:creationId xmlns:a16="http://schemas.microsoft.com/office/drawing/2014/main" id="{6C08EA2E-6C4A-4F30-9C4E-7A0DE3B646A4}"/>
-              </a:ext>
-            </a:extLst>
-          </p:cNvPr>
-          <p:cNvSpPr>
-            <a:spLocks noGrp="1"/>
-          </p:cNvSpPr>
+              <a:t>User Registration page</a:t>
+            </a:r>
+          </a:p>
+        </p:txBody>
+      </p:sp>
+      <p:pic>
+        <p:nvPicPr>
+          <p:cNvPr id="6" name="Content Placeholder 5">
+            <a:extLst>
+              <a:ext uri="{FF2B5EF4-FFF2-40B4-BE49-F238E27FC236}">
+                <a16:creationId xmlns:a16="http://schemas.microsoft.com/office/drawing/2014/main" id="{2075CA61-26CF-4626-B2DA-DA247B360184}"/>
+              </a:ext>
+            </a:extLst>
+          </p:cNvPr>
+          <p:cNvPicPr>
+            <a:picLocks noGrp="1" noChangeAspect="1"/>
+          </p:cNvPicPr>
           <p:nvPr>
             <p:ph idx="1"/>
           </p:nvPr>
-        </p:nvSpPr>
-        <p:spPr/>
-        <p:txBody>
-          <a:bodyPr/>
-          <a:lstStyle/>
-          <a:p>
-            <a:endParaRPr lang="en-US"/>
-          </a:p>
-        </p:txBody>
-      </p:sp>
+        </p:nvPicPr>
+        <p:blipFill>
+          <a:blip r:embed="rId3">
+            <a:extLst>
+              <a:ext uri="{28A0092B-C50C-407E-A947-70E740481C1C}">
+                <a14:useLocalDpi xmlns:a14="http://schemas.microsoft.com/office/drawing/2010/main" val="0"/>
+              </a:ext>
+            </a:extLst>
+          </a:blip>
+          <a:stretch>
+            <a:fillRect/>
+          </a:stretch>
+        </p:blipFill>
+        <p:spPr>
+          <a:xfrm>
+            <a:off x="1143000" y="1410288"/>
+            <a:ext cx="9515475" cy="5403789"/>
+          </a:xfrm>
+        </p:spPr>
+      </p:pic>
     </p:spTree>
     <p:extLst>
       <p:ext uri="{BB962C8B-B14F-4D97-AF65-F5344CB8AC3E}">
-        <p14:creationId xmlns:p14="http://schemas.microsoft.com/office/powerpoint/2010/main" val="2520816941"/>
+        <p14:creationId xmlns:p14="http://schemas.microsoft.com/office/powerpoint/2010/main" val="448455109"/>
       </p:ext>
     </p:extLst>
   </p:cSld>
@@ -3750,7 +4397,7 @@
           <p:cNvPr id="2" name="Title 1">
             <a:extLst>
               <a:ext uri="{FF2B5EF4-FFF2-40B4-BE49-F238E27FC236}">
-                <a16:creationId xmlns:a16="http://schemas.microsoft.com/office/drawing/2014/main" id="{6060D5DF-1D6A-4416-9A18-137D9DA4EB41}"/>
+                <a16:creationId xmlns:a16="http://schemas.microsoft.com/office/drawing/2014/main" id="{3BC978F4-831A-416E-9A3B-431AEF059172}"/>
               </a:ext>
             </a:extLst>
           </p:cNvPr>
@@ -3761,15 +4408,21 @@
             <p:ph type="title"/>
           </p:nvPr>
         </p:nvSpPr>
-        <p:spPr/>
-        <p:txBody>
-          <a:bodyPr/>
-          <a:lstStyle/>
-          <a:p>
-            <a:r>
-              <a:rPr lang="en-US" dirty="0"/>
-              <a:t>User Registration page</a:t>
-            </a:r>
+        <p:spPr>
+          <a:xfrm>
+            <a:off x="838200" y="365125"/>
+            <a:ext cx="10515600" cy="1325563"/>
+          </a:xfrm>
+        </p:spPr>
+        <p:txBody>
+          <a:bodyPr/>
+          <a:lstStyle/>
+          <a:p>
+            <a:r>
+              <a:rPr lang="en-US"/>
+              <a:t>Login page</a:t>
+            </a:r>
+            <a:endParaRPr lang="en-US" dirty="0"/>
           </a:p>
         </p:txBody>
       </p:sp>
@@ -3778,7 +4431,7 @@
           <p:cNvPr id="7" name="Content Placeholder 6">
             <a:extLst>
               <a:ext uri="{FF2B5EF4-FFF2-40B4-BE49-F238E27FC236}">
-                <a16:creationId xmlns:a16="http://schemas.microsoft.com/office/drawing/2014/main" id="{4350BFFF-2C9F-40DC-8483-D1174A1B1373}"/>
+                <a16:creationId xmlns:a16="http://schemas.microsoft.com/office/drawing/2014/main" id="{7ABF1593-0E2B-4A39-90BF-6BF3BC42D94D}"/>
               </a:ext>
             </a:extLst>
           </p:cNvPr>
@@ -3790,7 +4443,7 @@
           </p:nvPr>
         </p:nvPicPr>
         <p:blipFill>
-          <a:blip r:embed="rId2">
+          <a:blip r:embed="rId3">
             <a:extLst>
               <a:ext uri="{28A0092B-C50C-407E-A947-70E740481C1C}">
                 <a14:useLocalDpi xmlns:a14="http://schemas.microsoft.com/office/drawing/2010/main" val="0"/>
@@ -3803,101 +4456,8 @@
         </p:blipFill>
         <p:spPr>
           <a:xfrm>
-            <a:off x="596819" y="1547795"/>
-            <a:ext cx="10998361" cy="4773629"/>
-          </a:xfrm>
-        </p:spPr>
-      </p:pic>
-    </p:spTree>
-    <p:extLst>
-      <p:ext uri="{BB962C8B-B14F-4D97-AF65-F5344CB8AC3E}">
-        <p14:creationId xmlns:p14="http://schemas.microsoft.com/office/powerpoint/2010/main" val="448455109"/>
-      </p:ext>
-    </p:extLst>
-  </p:cSld>
-  <p:clrMapOvr>
-    <a:masterClrMapping/>
-  </p:clrMapOvr>
-</p:sld>
-</file>
-
-<file path=ppt/slides/slide6.xml><?xml version="1.0" encoding="utf-8"?>
-<p:sld xmlns:a="http://schemas.openxmlformats.org/drawingml/2006/main" xmlns:r="http://schemas.openxmlformats.org/officeDocument/2006/relationships" xmlns:p="http://schemas.openxmlformats.org/presentationml/2006/main">
-  <p:cSld>
-    <p:spTree>
-      <p:nvGrpSpPr>
-        <p:cNvPr id="1" name=""/>
-        <p:cNvGrpSpPr/>
-        <p:nvPr/>
-      </p:nvGrpSpPr>
-      <p:grpSpPr>
-        <a:xfrm>
-          <a:off x="0" y="0"/>
-          <a:ext cx="0" cy="0"/>
-          <a:chOff x="0" y="0"/>
-          <a:chExt cx="0" cy="0"/>
-        </a:xfrm>
-      </p:grpSpPr>
-      <p:sp>
-        <p:nvSpPr>
-          <p:cNvPr id="2" name="Title 1">
-            <a:extLst>
-              <a:ext uri="{FF2B5EF4-FFF2-40B4-BE49-F238E27FC236}">
-                <a16:creationId xmlns:a16="http://schemas.microsoft.com/office/drawing/2014/main" id="{3BC978F4-831A-416E-9A3B-431AEF059172}"/>
-              </a:ext>
-            </a:extLst>
-          </p:cNvPr>
-          <p:cNvSpPr>
-            <a:spLocks noGrp="1"/>
-          </p:cNvSpPr>
-          <p:nvPr>
-            <p:ph type="title"/>
-          </p:nvPr>
-        </p:nvSpPr>
-        <p:spPr/>
-        <p:txBody>
-          <a:bodyPr/>
-          <a:lstStyle/>
-          <a:p>
-            <a:r>
-              <a:rPr lang="en-US" dirty="0"/>
-              <a:t>Login page</a:t>
-            </a:r>
-          </a:p>
-        </p:txBody>
-      </p:sp>
-      <p:pic>
-        <p:nvPicPr>
-          <p:cNvPr id="5" name="Content Placeholder 4">
-            <a:extLst>
-              <a:ext uri="{FF2B5EF4-FFF2-40B4-BE49-F238E27FC236}">
-                <a16:creationId xmlns:a16="http://schemas.microsoft.com/office/drawing/2014/main" id="{A1D2D65E-C9AB-4F60-B2CE-D08DE726277C}"/>
-              </a:ext>
-            </a:extLst>
-          </p:cNvPr>
-          <p:cNvPicPr>
-            <a:picLocks noGrp="1" noChangeAspect="1"/>
-          </p:cNvPicPr>
-          <p:nvPr>
-            <p:ph idx="1"/>
-          </p:nvPr>
-        </p:nvPicPr>
-        <p:blipFill>
-          <a:blip r:embed="rId2">
-            <a:extLst>
-              <a:ext uri="{28A0092B-C50C-407E-A947-70E740481C1C}">
-                <a14:useLocalDpi xmlns:a14="http://schemas.microsoft.com/office/drawing/2010/main" val="0"/>
-              </a:ext>
-            </a:extLst>
-          </a:blip>
-          <a:stretch>
-            <a:fillRect/>
-          </a:stretch>
-        </p:blipFill>
-        <p:spPr>
-          <a:xfrm>
-            <a:off x="2666999" y="2482117"/>
-            <a:ext cx="6157617" cy="2728058"/>
+            <a:off x="657535" y="1494692"/>
+            <a:ext cx="10876929" cy="5115892"/>
           </a:xfrm>
         </p:spPr>
       </p:pic>
@@ -3905,255 +4465,6 @@
     <p:extLst>
       <p:ext uri="{BB962C8B-B14F-4D97-AF65-F5344CB8AC3E}">
         <p14:creationId xmlns:p14="http://schemas.microsoft.com/office/powerpoint/2010/main" val="1698286532"/>
-      </p:ext>
-    </p:extLst>
-  </p:cSld>
-  <p:clrMapOvr>
-    <a:masterClrMapping/>
-  </p:clrMapOvr>
-</p:sld>
-</file>
-
-<file path=ppt/slides/slide7.xml><?xml version="1.0" encoding="utf-8"?>
-<p:sld xmlns:a="http://schemas.openxmlformats.org/drawingml/2006/main" xmlns:r="http://schemas.openxmlformats.org/officeDocument/2006/relationships" xmlns:p="http://schemas.openxmlformats.org/presentationml/2006/main">
-  <p:cSld>
-    <p:spTree>
-      <p:nvGrpSpPr>
-        <p:cNvPr id="1" name=""/>
-        <p:cNvGrpSpPr/>
-        <p:nvPr/>
-      </p:nvGrpSpPr>
-      <p:grpSpPr>
-        <a:xfrm>
-          <a:off x="0" y="0"/>
-          <a:ext cx="0" cy="0"/>
-          <a:chOff x="0" y="0"/>
-          <a:chExt cx="0" cy="0"/>
-        </a:xfrm>
-      </p:grpSpPr>
-      <p:sp>
-        <p:nvSpPr>
-          <p:cNvPr id="2" name="Title 1">
-            <a:extLst>
-              <a:ext uri="{FF2B5EF4-FFF2-40B4-BE49-F238E27FC236}">
-                <a16:creationId xmlns:a16="http://schemas.microsoft.com/office/drawing/2014/main" id="{0461D02F-C13F-48A6-A267-49F364EDD171}"/>
-              </a:ext>
-            </a:extLst>
-          </p:cNvPr>
-          <p:cNvSpPr>
-            <a:spLocks noGrp="1"/>
-          </p:cNvSpPr>
-          <p:nvPr>
-            <p:ph type="title"/>
-          </p:nvPr>
-        </p:nvSpPr>
-        <p:spPr/>
-        <p:txBody>
-          <a:bodyPr/>
-          <a:lstStyle/>
-          <a:p>
-            <a:r>
-              <a:rPr lang="en-US" dirty="0"/>
-              <a:t>Alexander Bridges’ contributions</a:t>
-            </a:r>
-          </a:p>
-        </p:txBody>
-      </p:sp>
-      <p:sp>
-        <p:nvSpPr>
-          <p:cNvPr id="3" name="Content Placeholder 2">
-            <a:extLst>
-              <a:ext uri="{FF2B5EF4-FFF2-40B4-BE49-F238E27FC236}">
-                <a16:creationId xmlns:a16="http://schemas.microsoft.com/office/drawing/2014/main" id="{766C9E6D-3163-44F9-ABED-02C3D28A847C}"/>
-              </a:ext>
-            </a:extLst>
-          </p:cNvPr>
-          <p:cNvSpPr>
-            <a:spLocks noGrp="1"/>
-          </p:cNvSpPr>
-          <p:nvPr>
-            <p:ph idx="1"/>
-          </p:nvPr>
-        </p:nvSpPr>
-        <p:spPr/>
-        <p:txBody>
-          <a:bodyPr/>
-          <a:lstStyle/>
-          <a:p>
-            <a:endParaRPr lang="en-US"/>
-          </a:p>
-        </p:txBody>
-      </p:sp>
-    </p:spTree>
-    <p:extLst>
-      <p:ext uri="{BB962C8B-B14F-4D97-AF65-F5344CB8AC3E}">
-        <p14:creationId xmlns:p14="http://schemas.microsoft.com/office/powerpoint/2010/main" val="2024707182"/>
-      </p:ext>
-    </p:extLst>
-  </p:cSld>
-  <p:clrMapOvr>
-    <a:masterClrMapping/>
-  </p:clrMapOvr>
-</p:sld>
-</file>
-
-<file path=ppt/slides/slide8.xml><?xml version="1.0" encoding="utf-8"?>
-<p:sld xmlns:a="http://schemas.openxmlformats.org/drawingml/2006/main" xmlns:r="http://schemas.openxmlformats.org/officeDocument/2006/relationships" xmlns:p="http://schemas.openxmlformats.org/presentationml/2006/main">
-  <p:cSld>
-    <p:spTree>
-      <p:nvGrpSpPr>
-        <p:cNvPr id="1" name=""/>
-        <p:cNvGrpSpPr/>
-        <p:nvPr/>
-      </p:nvGrpSpPr>
-      <p:grpSpPr>
-        <a:xfrm>
-          <a:off x="0" y="0"/>
-          <a:ext cx="0" cy="0"/>
-          <a:chOff x="0" y="0"/>
-          <a:chExt cx="0" cy="0"/>
-        </a:xfrm>
-      </p:grpSpPr>
-      <p:sp>
-        <p:nvSpPr>
-          <p:cNvPr id="2" name="Title 1">
-            <a:extLst>
-              <a:ext uri="{FF2B5EF4-FFF2-40B4-BE49-F238E27FC236}">
-                <a16:creationId xmlns:a16="http://schemas.microsoft.com/office/drawing/2014/main" id="{3D0EB865-FBEA-4DFB-8666-ED48D2F93016}"/>
-              </a:ext>
-            </a:extLst>
-          </p:cNvPr>
-          <p:cNvSpPr>
-            <a:spLocks noGrp="1"/>
-          </p:cNvSpPr>
-          <p:nvPr>
-            <p:ph type="title"/>
-          </p:nvPr>
-        </p:nvSpPr>
-        <p:spPr/>
-        <p:txBody>
-          <a:bodyPr/>
-          <a:lstStyle/>
-          <a:p>
-            <a:r>
-              <a:rPr lang="en-US" dirty="0"/>
-              <a:t>Jonathan Young’s contributions</a:t>
-            </a:r>
-          </a:p>
-        </p:txBody>
-      </p:sp>
-      <p:sp>
-        <p:nvSpPr>
-          <p:cNvPr id="3" name="Content Placeholder 2">
-            <a:extLst>
-              <a:ext uri="{FF2B5EF4-FFF2-40B4-BE49-F238E27FC236}">
-                <a16:creationId xmlns:a16="http://schemas.microsoft.com/office/drawing/2014/main" id="{AA82739F-6AAF-4FF4-A2FF-B43742DDE154}"/>
-              </a:ext>
-            </a:extLst>
-          </p:cNvPr>
-          <p:cNvSpPr>
-            <a:spLocks noGrp="1"/>
-          </p:cNvSpPr>
-          <p:nvPr>
-            <p:ph idx="1"/>
-          </p:nvPr>
-        </p:nvSpPr>
-        <p:spPr/>
-        <p:txBody>
-          <a:bodyPr/>
-          <a:lstStyle/>
-          <a:p>
-            <a:endParaRPr lang="en-US"/>
-          </a:p>
-        </p:txBody>
-      </p:sp>
-    </p:spTree>
-    <p:extLst>
-      <p:ext uri="{BB962C8B-B14F-4D97-AF65-F5344CB8AC3E}">
-        <p14:creationId xmlns:p14="http://schemas.microsoft.com/office/powerpoint/2010/main" val="1721404862"/>
-      </p:ext>
-    </p:extLst>
-  </p:cSld>
-  <p:clrMapOvr>
-    <a:masterClrMapping/>
-  </p:clrMapOvr>
-</p:sld>
-</file>
-
-<file path=ppt/slides/slide9.xml><?xml version="1.0" encoding="utf-8"?>
-<p:sld xmlns:a="http://schemas.openxmlformats.org/drawingml/2006/main" xmlns:r="http://schemas.openxmlformats.org/officeDocument/2006/relationships" xmlns:p="http://schemas.openxmlformats.org/presentationml/2006/main">
-  <p:cSld>
-    <p:spTree>
-      <p:nvGrpSpPr>
-        <p:cNvPr id="1" name=""/>
-        <p:cNvGrpSpPr/>
-        <p:nvPr/>
-      </p:nvGrpSpPr>
-      <p:grpSpPr>
-        <a:xfrm>
-          <a:off x="0" y="0"/>
-          <a:ext cx="0" cy="0"/>
-          <a:chOff x="0" y="0"/>
-          <a:chExt cx="0" cy="0"/>
-        </a:xfrm>
-      </p:grpSpPr>
-      <p:sp>
-        <p:nvSpPr>
-          <p:cNvPr id="2" name="Title 1">
-            <a:extLst>
-              <a:ext uri="{FF2B5EF4-FFF2-40B4-BE49-F238E27FC236}">
-                <a16:creationId xmlns:a16="http://schemas.microsoft.com/office/drawing/2014/main" id="{7FBEE893-10DC-40D9-A77D-D7257FC14F47}"/>
-              </a:ext>
-            </a:extLst>
-          </p:cNvPr>
-          <p:cNvSpPr>
-            <a:spLocks noGrp="1"/>
-          </p:cNvSpPr>
-          <p:nvPr>
-            <p:ph type="title"/>
-          </p:nvPr>
-        </p:nvSpPr>
-        <p:spPr/>
-        <p:txBody>
-          <a:bodyPr/>
-          <a:lstStyle/>
-          <a:p>
-            <a:r>
-              <a:rPr lang="en-US" dirty="0"/>
-              <a:t>Eric Strayer’s contributions</a:t>
-            </a:r>
-          </a:p>
-        </p:txBody>
-      </p:sp>
-      <p:sp>
-        <p:nvSpPr>
-          <p:cNvPr id="3" name="Content Placeholder 2">
-            <a:extLst>
-              <a:ext uri="{FF2B5EF4-FFF2-40B4-BE49-F238E27FC236}">
-                <a16:creationId xmlns:a16="http://schemas.microsoft.com/office/drawing/2014/main" id="{B6F54773-3415-49DC-8ED5-0C1C70AA4613}"/>
-              </a:ext>
-            </a:extLst>
-          </p:cNvPr>
-          <p:cNvSpPr>
-            <a:spLocks noGrp="1"/>
-          </p:cNvSpPr>
-          <p:nvPr>
-            <p:ph idx="1"/>
-          </p:nvPr>
-        </p:nvSpPr>
-        <p:spPr/>
-        <p:txBody>
-          <a:bodyPr/>
-          <a:lstStyle/>
-          <a:p>
-            <a:endParaRPr lang="en-US"/>
-          </a:p>
-        </p:txBody>
-      </p:sp>
-    </p:spTree>
-    <p:extLst>
-      <p:ext uri="{BB962C8B-B14F-4D97-AF65-F5344CB8AC3E}">
-        <p14:creationId xmlns:p14="http://schemas.microsoft.com/office/powerpoint/2010/main" val="1056819226"/>
       </p:ext>
     </p:extLst>
   </p:cSld>
@@ -4456,4 +4767,299 @@
     </a:ext>
   </a:extLst>
 </a:theme>
+</file>
+
+<file path=ppt/theme/theme2.xml><?xml version="1.0" encoding="utf-8"?>
+<a:theme xmlns:a="http://schemas.openxmlformats.org/drawingml/2006/main" name="Office Theme">
+  <a:themeElements>
+    <a:clrScheme name="Office">
+      <a:dk1>
+        <a:sysClr val="windowText" lastClr="000000"/>
+      </a:dk1>
+      <a:lt1>
+        <a:sysClr val="window" lastClr="FFFFFF"/>
+      </a:lt1>
+      <a:dk2>
+        <a:srgbClr val="44546A"/>
+      </a:dk2>
+      <a:lt2>
+        <a:srgbClr val="E7E6E6"/>
+      </a:lt2>
+      <a:accent1>
+        <a:srgbClr val="4472C4"/>
+      </a:accent1>
+      <a:accent2>
+        <a:srgbClr val="ED7D31"/>
+      </a:accent2>
+      <a:accent3>
+        <a:srgbClr val="A5A5A5"/>
+      </a:accent3>
+      <a:accent4>
+        <a:srgbClr val="FFC000"/>
+      </a:accent4>
+      <a:accent5>
+        <a:srgbClr val="5B9BD5"/>
+      </a:accent5>
+      <a:accent6>
+        <a:srgbClr val="70AD47"/>
+      </a:accent6>
+      <a:hlink>
+        <a:srgbClr val="0563C1"/>
+      </a:hlink>
+      <a:folHlink>
+        <a:srgbClr val="954F72"/>
+      </a:folHlink>
+    </a:clrScheme>
+    <a:fontScheme name="Office">
+      <a:majorFont>
+        <a:latin typeface="Calibri Light" panose="020F0302020204030204"/>
+        <a:ea typeface=""/>
+        <a:cs typeface=""/>
+        <a:font script="Jpan" typeface="游ゴシック Light"/>
+        <a:font script="Hang" typeface="맑은 고딕"/>
+        <a:font script="Hans" typeface="等线 Light"/>
+        <a:font script="Hant" typeface="新細明體"/>
+        <a:font script="Arab" typeface="Times New Roman"/>
+        <a:font script="Hebr" typeface="Times New Roman"/>
+        <a:font script="Thai" typeface="Angsana New"/>
+        <a:font script="Ethi" typeface="Nyala"/>
+        <a:font script="Beng" typeface="Vrinda"/>
+        <a:font script="Gujr" typeface="Shruti"/>
+        <a:font script="Khmr" typeface="MoolBoran"/>
+        <a:font script="Knda" typeface="Tunga"/>
+        <a:font script="Guru" typeface="Raavi"/>
+        <a:font script="Cans" typeface="Euphemia"/>
+        <a:font script="Cher" typeface="Plantagenet Cherokee"/>
+        <a:font script="Yiii" typeface="Microsoft Yi Baiti"/>
+        <a:font script="Tibt" typeface="Microsoft Himalaya"/>
+        <a:font script="Thaa" typeface="MV Boli"/>
+        <a:font script="Deva" typeface="Mangal"/>
+        <a:font script="Telu" typeface="Gautami"/>
+        <a:font script="Taml" typeface="Latha"/>
+        <a:font script="Syrc" typeface="Estrangelo Edessa"/>
+        <a:font script="Orya" typeface="Kalinga"/>
+        <a:font script="Mlym" typeface="Kartika"/>
+        <a:font script="Laoo" typeface="DokChampa"/>
+        <a:font script="Sinh" typeface="Iskoola Pota"/>
+        <a:font script="Mong" typeface="Mongolian Baiti"/>
+        <a:font script="Viet" typeface="Times New Roman"/>
+        <a:font script="Uigh" typeface="Microsoft Uighur"/>
+        <a:font script="Geor" typeface="Sylfaen"/>
+        <a:font script="Armn" typeface="Arial"/>
+        <a:font script="Bugi" typeface="Leelawadee UI"/>
+        <a:font script="Bopo" typeface="Microsoft JhengHei"/>
+        <a:font script="Java" typeface="Javanese Text"/>
+        <a:font script="Lisu" typeface="Segoe UI"/>
+        <a:font script="Mymr" typeface="Myanmar Text"/>
+        <a:font script="Nkoo" typeface="Ebrima"/>
+        <a:font script="Olck" typeface="Nirmala UI"/>
+        <a:font script="Osma" typeface="Ebrima"/>
+        <a:font script="Phag" typeface="Phagspa"/>
+        <a:font script="Syrn" typeface="Estrangelo Edessa"/>
+        <a:font script="Syrj" typeface="Estrangelo Edessa"/>
+        <a:font script="Syre" typeface="Estrangelo Edessa"/>
+        <a:font script="Sora" typeface="Nirmala UI"/>
+        <a:font script="Tale" typeface="Microsoft Tai Le"/>
+        <a:font script="Talu" typeface="Microsoft New Tai Lue"/>
+        <a:font script="Tfng" typeface="Ebrima"/>
+      </a:majorFont>
+      <a:minorFont>
+        <a:latin typeface="Calibri" panose="020F0502020204030204"/>
+        <a:ea typeface=""/>
+        <a:cs typeface=""/>
+        <a:font script="Jpan" typeface="游ゴシック"/>
+        <a:font script="Hang" typeface="맑은 고딕"/>
+        <a:font script="Hans" typeface="等线"/>
+        <a:font script="Hant" typeface="新細明體"/>
+        <a:font script="Arab" typeface="Arial"/>
+        <a:font script="Hebr" typeface="Arial"/>
+        <a:font script="Thai" typeface="Cordia New"/>
+        <a:font script="Ethi" typeface="Nyala"/>
+        <a:font script="Beng" typeface="Vrinda"/>
+        <a:font script="Gujr" typeface="Shruti"/>
+        <a:font script="Khmr" typeface="DaunPenh"/>
+        <a:font script="Knda" typeface="Tunga"/>
+        <a:font script="Guru" typeface="Raavi"/>
+        <a:font script="Cans" typeface="Euphemia"/>
+        <a:font script="Cher" typeface="Plantagenet Cherokee"/>
+        <a:font script="Yiii" typeface="Microsoft Yi Baiti"/>
+        <a:font script="Tibt" typeface="Microsoft Himalaya"/>
+        <a:font script="Thaa" typeface="MV Boli"/>
+        <a:font script="Deva" typeface="Mangal"/>
+        <a:font script="Telu" typeface="Gautami"/>
+        <a:font script="Taml" typeface="Latha"/>
+        <a:font script="Syrc" typeface="Estrangelo Edessa"/>
+        <a:font script="Orya" typeface="Kalinga"/>
+        <a:font script="Mlym" typeface="Kartika"/>
+        <a:font script="Laoo" typeface="DokChampa"/>
+        <a:font script="Sinh" typeface="Iskoola Pota"/>
+        <a:font script="Mong" typeface="Mongolian Baiti"/>
+        <a:font script="Viet" typeface="Arial"/>
+        <a:font script="Uigh" typeface="Microsoft Uighur"/>
+        <a:font script="Geor" typeface="Sylfaen"/>
+        <a:font script="Armn" typeface="Arial"/>
+        <a:font script="Bugi" typeface="Leelawadee UI"/>
+        <a:font script="Bopo" typeface="Microsoft JhengHei"/>
+        <a:font script="Java" typeface="Javanese Text"/>
+        <a:font script="Lisu" typeface="Segoe UI"/>
+        <a:font script="Mymr" typeface="Myanmar Text"/>
+        <a:font script="Nkoo" typeface="Ebrima"/>
+        <a:font script="Olck" typeface="Nirmala UI"/>
+        <a:font script="Osma" typeface="Ebrima"/>
+        <a:font script="Phag" typeface="Phagspa"/>
+        <a:font script="Syrn" typeface="Estrangelo Edessa"/>
+        <a:font script="Syrj" typeface="Estrangelo Edessa"/>
+        <a:font script="Syre" typeface="Estrangelo Edessa"/>
+        <a:font script="Sora" typeface="Nirmala UI"/>
+        <a:font script="Tale" typeface="Microsoft Tai Le"/>
+        <a:font script="Talu" typeface="Microsoft New Tai Lue"/>
+        <a:font script="Tfng" typeface="Ebrima"/>
+      </a:minorFont>
+    </a:fontScheme>
+    <a:fmtScheme name="Office">
+      <a:fillStyleLst>
+        <a:solidFill>
+          <a:schemeClr val="phClr"/>
+        </a:solidFill>
+        <a:gradFill rotWithShape="1">
+          <a:gsLst>
+            <a:gs pos="0">
+              <a:schemeClr val="phClr">
+                <a:lumMod val="110000"/>
+                <a:satMod val="105000"/>
+                <a:tint val="67000"/>
+              </a:schemeClr>
+            </a:gs>
+            <a:gs pos="50000">
+              <a:schemeClr val="phClr">
+                <a:lumMod val="105000"/>
+                <a:satMod val="103000"/>
+                <a:tint val="73000"/>
+              </a:schemeClr>
+            </a:gs>
+            <a:gs pos="100000">
+              <a:schemeClr val="phClr">
+                <a:lumMod val="105000"/>
+                <a:satMod val="109000"/>
+                <a:tint val="81000"/>
+              </a:schemeClr>
+            </a:gs>
+          </a:gsLst>
+          <a:lin ang="5400000" scaled="0"/>
+        </a:gradFill>
+        <a:gradFill rotWithShape="1">
+          <a:gsLst>
+            <a:gs pos="0">
+              <a:schemeClr val="phClr">
+                <a:satMod val="103000"/>
+                <a:lumMod val="102000"/>
+                <a:tint val="94000"/>
+              </a:schemeClr>
+            </a:gs>
+            <a:gs pos="50000">
+              <a:schemeClr val="phClr">
+                <a:satMod val="110000"/>
+                <a:lumMod val="100000"/>
+                <a:shade val="100000"/>
+              </a:schemeClr>
+            </a:gs>
+            <a:gs pos="100000">
+              <a:schemeClr val="phClr">
+                <a:lumMod val="99000"/>
+                <a:satMod val="120000"/>
+                <a:shade val="78000"/>
+              </a:schemeClr>
+            </a:gs>
+          </a:gsLst>
+          <a:lin ang="5400000" scaled="0"/>
+        </a:gradFill>
+      </a:fillStyleLst>
+      <a:lnStyleLst>
+        <a:ln w="6350" cap="flat" cmpd="sng" algn="ctr">
+          <a:solidFill>
+            <a:schemeClr val="phClr"/>
+          </a:solidFill>
+          <a:prstDash val="solid"/>
+          <a:miter lim="800000"/>
+        </a:ln>
+        <a:ln w="12700" cap="flat" cmpd="sng" algn="ctr">
+          <a:solidFill>
+            <a:schemeClr val="phClr"/>
+          </a:solidFill>
+          <a:prstDash val="solid"/>
+          <a:miter lim="800000"/>
+        </a:ln>
+        <a:ln w="19050" cap="flat" cmpd="sng" algn="ctr">
+          <a:solidFill>
+            <a:schemeClr val="phClr"/>
+          </a:solidFill>
+          <a:prstDash val="solid"/>
+          <a:miter lim="800000"/>
+        </a:ln>
+      </a:lnStyleLst>
+      <a:effectStyleLst>
+        <a:effectStyle>
+          <a:effectLst/>
+        </a:effectStyle>
+        <a:effectStyle>
+          <a:effectLst/>
+        </a:effectStyle>
+        <a:effectStyle>
+          <a:effectLst>
+            <a:outerShdw blurRad="57150" dist="19050" dir="5400000" algn="ctr" rotWithShape="0">
+              <a:srgbClr val="000000">
+                <a:alpha val="63000"/>
+              </a:srgbClr>
+            </a:outerShdw>
+          </a:effectLst>
+        </a:effectStyle>
+      </a:effectStyleLst>
+      <a:bgFillStyleLst>
+        <a:solidFill>
+          <a:schemeClr val="phClr"/>
+        </a:solidFill>
+        <a:solidFill>
+          <a:schemeClr val="phClr">
+            <a:tint val="95000"/>
+            <a:satMod val="170000"/>
+          </a:schemeClr>
+        </a:solidFill>
+        <a:gradFill rotWithShape="1">
+          <a:gsLst>
+            <a:gs pos="0">
+              <a:schemeClr val="phClr">
+                <a:tint val="93000"/>
+                <a:satMod val="150000"/>
+                <a:shade val="98000"/>
+                <a:lumMod val="102000"/>
+              </a:schemeClr>
+            </a:gs>
+            <a:gs pos="50000">
+              <a:schemeClr val="phClr">
+                <a:tint val="98000"/>
+                <a:satMod val="130000"/>
+                <a:shade val="90000"/>
+                <a:lumMod val="103000"/>
+              </a:schemeClr>
+            </a:gs>
+            <a:gs pos="100000">
+              <a:schemeClr val="phClr">
+                <a:shade val="63000"/>
+                <a:satMod val="120000"/>
+              </a:schemeClr>
+            </a:gs>
+          </a:gsLst>
+          <a:lin ang="5400000" scaled="0"/>
+        </a:gradFill>
+      </a:bgFillStyleLst>
+    </a:fmtScheme>
+  </a:themeElements>
+  <a:objectDefaults/>
+  <a:extraClrSchemeLst/>
+  <a:extLst>
+    <a:ext uri="{05A4C25C-085E-4340-85A3-A5531E510DB2}">
+      <thm15:themeFamily xmlns:thm15="http://schemas.microsoft.com/office/thememl/2012/main" name="Office Theme" id="{62F939B6-93AF-4DB8-9C6B-D6C7DFDC589F}" vid="{4A3C46E8-61CC-4603-A589-7422A47A8E4A}"/>
+    </a:ext>
+  </a:extLst>
+</a:theme>
 </file>
</xml_diff>

<commit_message>
Add reset password page and updated ppt
</commit_message>
<xml_diff>
--- a/Course Project Presentation 1.pptx
+++ b/Course Project Presentation 1.pptx
@@ -2,17 +2,19 @@
 <file path=ppt/presentation.xml><?xml version="1.0" encoding="utf-8"?>
 <p:presentation xmlns:a="http://schemas.openxmlformats.org/drawingml/2006/main" xmlns:r="http://schemas.openxmlformats.org/officeDocument/2006/relationships" xmlns:p="http://schemas.openxmlformats.org/presentationml/2006/main" saveSubsetFonts="1">
   <p:sldMasterIdLst>
-    <p:sldMasterId id="2147483648" r:id="rId1"/>
+    <p:sldMasterId id="2147483677" r:id="rId1"/>
   </p:sldMasterIdLst>
   <p:notesMasterIdLst>
-    <p:notesMasterId r:id="rId7"/>
+    <p:notesMasterId r:id="rId9"/>
   </p:notesMasterIdLst>
   <p:sldIdLst>
     <p:sldId id="256" r:id="rId2"/>
     <p:sldId id="258" r:id="rId3"/>
     <p:sldId id="259" r:id="rId4"/>
     <p:sldId id="260" r:id="rId5"/>
-    <p:sldId id="265" r:id="rId6"/>
+    <p:sldId id="267" r:id="rId6"/>
+    <p:sldId id="265" r:id="rId7"/>
+    <p:sldId id="266" r:id="rId8"/>
   </p:sldIdLst>
   <p:sldSz cx="12192000" cy="6858000"/>
   <p:notesSz cx="6858000" cy="9144000"/>
@@ -20,7 +22,7 @@
     <a:defPPr>
       <a:defRPr lang="en-US"/>
     </a:defPPr>
-    <a:lvl1pPr marL="0" algn="l" defTabSz="914400" rtl="0" eaLnBrk="1" latinLnBrk="0" hangingPunct="1">
+    <a:lvl1pPr marL="0" algn="l" defTabSz="457200" rtl="0" eaLnBrk="1" latinLnBrk="0" hangingPunct="1">
       <a:defRPr sz="1800" kern="1200">
         <a:solidFill>
           <a:schemeClr val="tx1"/>
@@ -30,7 +32,7 @@
         <a:cs typeface="+mn-cs"/>
       </a:defRPr>
     </a:lvl1pPr>
-    <a:lvl2pPr marL="457200" algn="l" defTabSz="914400" rtl="0" eaLnBrk="1" latinLnBrk="0" hangingPunct="1">
+    <a:lvl2pPr marL="457200" algn="l" defTabSz="457200" rtl="0" eaLnBrk="1" latinLnBrk="0" hangingPunct="1">
       <a:defRPr sz="1800" kern="1200">
         <a:solidFill>
           <a:schemeClr val="tx1"/>
@@ -40,7 +42,7 @@
         <a:cs typeface="+mn-cs"/>
       </a:defRPr>
     </a:lvl2pPr>
-    <a:lvl3pPr marL="914400" algn="l" defTabSz="914400" rtl="0" eaLnBrk="1" latinLnBrk="0" hangingPunct="1">
+    <a:lvl3pPr marL="914400" algn="l" defTabSz="457200" rtl="0" eaLnBrk="1" latinLnBrk="0" hangingPunct="1">
       <a:defRPr sz="1800" kern="1200">
         <a:solidFill>
           <a:schemeClr val="tx1"/>
@@ -50,7 +52,7 @@
         <a:cs typeface="+mn-cs"/>
       </a:defRPr>
     </a:lvl3pPr>
-    <a:lvl4pPr marL="1371600" algn="l" defTabSz="914400" rtl="0" eaLnBrk="1" latinLnBrk="0" hangingPunct="1">
+    <a:lvl4pPr marL="1371600" algn="l" defTabSz="457200" rtl="0" eaLnBrk="1" latinLnBrk="0" hangingPunct="1">
       <a:defRPr sz="1800" kern="1200">
         <a:solidFill>
           <a:schemeClr val="tx1"/>
@@ -60,7 +62,7 @@
         <a:cs typeface="+mn-cs"/>
       </a:defRPr>
     </a:lvl4pPr>
-    <a:lvl5pPr marL="1828800" algn="l" defTabSz="914400" rtl="0" eaLnBrk="1" latinLnBrk="0" hangingPunct="1">
+    <a:lvl5pPr marL="1828800" algn="l" defTabSz="457200" rtl="0" eaLnBrk="1" latinLnBrk="0" hangingPunct="1">
       <a:defRPr sz="1800" kern="1200">
         <a:solidFill>
           <a:schemeClr val="tx1"/>
@@ -70,7 +72,7 @@
         <a:cs typeface="+mn-cs"/>
       </a:defRPr>
     </a:lvl5pPr>
-    <a:lvl6pPr marL="2286000" algn="l" defTabSz="914400" rtl="0" eaLnBrk="1" latinLnBrk="0" hangingPunct="1">
+    <a:lvl6pPr marL="2286000" algn="l" defTabSz="457200" rtl="0" eaLnBrk="1" latinLnBrk="0" hangingPunct="1">
       <a:defRPr sz="1800" kern="1200">
         <a:solidFill>
           <a:schemeClr val="tx1"/>
@@ -80,7 +82,7 @@
         <a:cs typeface="+mn-cs"/>
       </a:defRPr>
     </a:lvl6pPr>
-    <a:lvl7pPr marL="2743200" algn="l" defTabSz="914400" rtl="0" eaLnBrk="1" latinLnBrk="0" hangingPunct="1">
+    <a:lvl7pPr marL="2743200" algn="l" defTabSz="457200" rtl="0" eaLnBrk="1" latinLnBrk="0" hangingPunct="1">
       <a:defRPr sz="1800" kern="1200">
         <a:solidFill>
           <a:schemeClr val="tx1"/>
@@ -90,7 +92,7 @@
         <a:cs typeface="+mn-cs"/>
       </a:defRPr>
     </a:lvl7pPr>
-    <a:lvl8pPr marL="3200400" algn="l" defTabSz="914400" rtl="0" eaLnBrk="1" latinLnBrk="0" hangingPunct="1">
+    <a:lvl8pPr marL="3200400" algn="l" defTabSz="457200" rtl="0" eaLnBrk="1" latinLnBrk="0" hangingPunct="1">
       <a:defRPr sz="1800" kern="1200">
         <a:solidFill>
           <a:schemeClr val="tx1"/>
@@ -100,7 +102,7 @@
         <a:cs typeface="+mn-cs"/>
       </a:defRPr>
     </a:lvl8pPr>
-    <a:lvl9pPr marL="3657600" algn="l" defTabSz="914400" rtl="0" eaLnBrk="1" latinLnBrk="0" hangingPunct="1">
+    <a:lvl9pPr marL="3657600" algn="l" defTabSz="457200" rtl="0" eaLnBrk="1" latinLnBrk="0" hangingPunct="1">
       <a:defRPr sz="1800" kern="1200">
         <a:solidFill>
           <a:schemeClr val="tx1"/>
@@ -775,7 +777,7 @@
           <a:p>
             <a:r>
               <a:rPr lang="en-US" dirty="0"/>
-              <a:t>Eric made the input boxes and label text. Alexander plugged that into a window, and applied the style.</a:t>
+              <a:t>Eric made all the input boxes and buttons.  Alexander got the add degree and remove degree buttons to work, with assistance from Jonathan. Alexander also made the header visible in the background, and the window the form is displayed in.</a:t>
             </a:r>
           </a:p>
         </p:txBody>
@@ -798,6 +800,93 @@
             <a:fld id="{6010D91D-3246-47C2-A380-84E50B05807D}" type="slidenum">
               <a:rPr lang="en-US" smtClean="0"/>
               <a:t>5</a:t>
+            </a:fld>
+            <a:endParaRPr lang="en-US"/>
+          </a:p>
+        </p:txBody>
+      </p:sp>
+    </p:spTree>
+    <p:extLst>
+      <p:ext uri="{BB962C8B-B14F-4D97-AF65-F5344CB8AC3E}">
+        <p14:creationId xmlns:p14="http://schemas.microsoft.com/office/powerpoint/2010/main" val="696057365"/>
+      </p:ext>
+    </p:extLst>
+  </p:cSld>
+  <p:clrMapOvr>
+    <a:masterClrMapping/>
+  </p:clrMapOvr>
+</p:notes>
+</file>
+
+<file path=ppt/notesSlides/notesSlide5.xml><?xml version="1.0" encoding="utf-8"?>
+<p:notes xmlns:a="http://schemas.openxmlformats.org/drawingml/2006/main" xmlns:r="http://schemas.openxmlformats.org/officeDocument/2006/relationships" xmlns:p="http://schemas.openxmlformats.org/presentationml/2006/main">
+  <p:cSld>
+    <p:spTree>
+      <p:nvGrpSpPr>
+        <p:cNvPr id="1" name=""/>
+        <p:cNvGrpSpPr/>
+        <p:nvPr/>
+      </p:nvGrpSpPr>
+      <p:grpSpPr>
+        <a:xfrm>
+          <a:off x="0" y="0"/>
+          <a:ext cx="0" cy="0"/>
+          <a:chOff x="0" y="0"/>
+          <a:chExt cx="0" cy="0"/>
+        </a:xfrm>
+      </p:grpSpPr>
+      <p:sp>
+        <p:nvSpPr>
+          <p:cNvPr id="2" name="Slide Image Placeholder 1"/>
+          <p:cNvSpPr>
+            <a:spLocks noGrp="1" noRot="1" noChangeAspect="1"/>
+          </p:cNvSpPr>
+          <p:nvPr>
+            <p:ph type="sldImg"/>
+          </p:nvPr>
+        </p:nvSpPr>
+        <p:spPr/>
+      </p:sp>
+      <p:sp>
+        <p:nvSpPr>
+          <p:cNvPr id="3" name="Notes Placeholder 2"/>
+          <p:cNvSpPr>
+            <a:spLocks noGrp="1"/>
+          </p:cNvSpPr>
+          <p:nvPr>
+            <p:ph type="body" idx="1"/>
+          </p:nvPr>
+        </p:nvSpPr>
+        <p:spPr/>
+        <p:txBody>
+          <a:bodyPr/>
+          <a:lstStyle/>
+          <a:p>
+            <a:r>
+              <a:rPr lang="en-US" dirty="0"/>
+              <a:t>Eric made the input boxes and label text. Alexander plugged that into a window, and applied the style.</a:t>
+            </a:r>
+          </a:p>
+        </p:txBody>
+      </p:sp>
+      <p:sp>
+        <p:nvSpPr>
+          <p:cNvPr id="4" name="Slide Number Placeholder 3"/>
+          <p:cNvSpPr>
+            <a:spLocks noGrp="1"/>
+          </p:cNvSpPr>
+          <p:nvPr>
+            <p:ph type="sldNum" sz="quarter" idx="5"/>
+          </p:nvPr>
+        </p:nvSpPr>
+        <p:spPr/>
+        <p:txBody>
+          <a:bodyPr/>
+          <a:lstStyle/>
+          <a:p>
+            <a:fld id="{6010D91D-3246-47C2-A380-84E50B05807D}" type="slidenum">
+              <a:rPr lang="en-US" smtClean="0"/>
+              <a:t>6</a:t>
             </a:fld>
             <a:endParaRPr lang="en-US"/>
           </a:p>
@@ -835,13 +924,7 @@
       </p:grpSpPr>
       <p:sp>
         <p:nvSpPr>
-          <p:cNvPr id="2" name="Title 1">
-            <a:extLst>
-              <a:ext uri="{FF2B5EF4-FFF2-40B4-BE49-F238E27FC236}">
-                <a16:creationId xmlns:a16="http://schemas.microsoft.com/office/drawing/2014/main" xmlns="" id="{830542FF-F89B-4A25-ADAA-2BE0A2F69D56}"/>
-              </a:ext>
-            </a:extLst>
-          </p:cNvPr>
+          <p:cNvPr id="2" name="Title 1"/>
           <p:cNvSpPr>
             <a:spLocks noGrp="1"/>
           </p:cNvSpPr>
@@ -851,15 +934,17 @@
         </p:nvSpPr>
         <p:spPr>
           <a:xfrm>
-            <a:off x="1524000" y="1122363"/>
-            <a:ext cx="9144000" cy="2387600"/>
-          </a:xfrm>
-        </p:spPr>
-        <p:txBody>
-          <a:bodyPr anchor="b"/>
+            <a:off x="2417779" y="802298"/>
+            <a:ext cx="8637073" cy="2541431"/>
+          </a:xfrm>
+        </p:spPr>
+        <p:txBody>
+          <a:bodyPr bIns="0" anchor="b">
+            <a:normAutofit/>
+          </a:bodyPr>
           <a:lstStyle>
-            <a:lvl1pPr algn="ctr">
-              <a:defRPr sz="6000"/>
+            <a:lvl1pPr algn="l">
+              <a:defRPr sz="6600"/>
             </a:lvl1pPr>
           </a:lstStyle>
           <a:p>
@@ -867,18 +952,13 @@
               <a:rPr lang="en-US"/>
               <a:t>Click to edit Master title style</a:t>
             </a:r>
-          </a:p>
-        </p:txBody>
-      </p:sp>
-      <p:sp>
-        <p:nvSpPr>
-          <p:cNvPr id="3" name="Subtitle 2">
-            <a:extLst>
-              <a:ext uri="{FF2B5EF4-FFF2-40B4-BE49-F238E27FC236}">
-                <a16:creationId xmlns:a16="http://schemas.microsoft.com/office/drawing/2014/main" xmlns="" id="{E3B954D0-D587-4AFF-8396-B2DB8E31DB1F}"/>
-              </a:ext>
-            </a:extLst>
-          </p:cNvPr>
+            <a:endParaRPr lang="en-US" dirty="0"/>
+          </a:p>
+        </p:txBody>
+      </p:sp>
+      <p:sp>
+        <p:nvSpPr>
+          <p:cNvPr id="3" name="Subtitle 2"/>
           <p:cNvSpPr>
             <a:spLocks noGrp="1"/>
           </p:cNvSpPr>
@@ -888,20 +968,26 @@
         </p:nvSpPr>
         <p:spPr>
           <a:xfrm>
-            <a:off x="1524000" y="3602038"/>
-            <a:ext cx="9144000" cy="1655762"/>
-          </a:xfrm>
-        </p:spPr>
-        <p:txBody>
-          <a:bodyPr/>
+            <a:off x="2417780" y="3531204"/>
+            <a:ext cx="8637072" cy="977621"/>
+          </a:xfrm>
+        </p:spPr>
+        <p:txBody>
+          <a:bodyPr tIns="91440" bIns="91440">
+            <a:normAutofit/>
+          </a:bodyPr>
           <a:lstStyle>
-            <a:lvl1pPr marL="0" indent="0" algn="ctr">
-              <a:buNone/>
-              <a:defRPr sz="2400"/>
+            <a:lvl1pPr marL="0" indent="0" algn="l">
+              <a:buNone/>
+              <a:defRPr sz="1800" b="0" cap="all" baseline="0">
+                <a:solidFill>
+                  <a:schemeClr val="tx1"/>
+                </a:solidFill>
+              </a:defRPr>
             </a:lvl1pPr>
             <a:lvl2pPr marL="457200" indent="0" algn="ctr">
               <a:buNone/>
-              <a:defRPr sz="2000"/>
+              <a:defRPr sz="1800"/>
             </a:lvl2pPr>
             <a:lvl3pPr marL="914400" indent="0" algn="ctr">
               <a:buNone/>
@@ -937,18 +1023,13 @@
               <a:rPr lang="en-US"/>
               <a:t>Click to edit Master subtitle style</a:t>
             </a:r>
-          </a:p>
-        </p:txBody>
-      </p:sp>
-      <p:sp>
-        <p:nvSpPr>
-          <p:cNvPr id="4" name="Date Placeholder 3">
-            <a:extLst>
-              <a:ext uri="{FF2B5EF4-FFF2-40B4-BE49-F238E27FC236}">
-                <a16:creationId xmlns:a16="http://schemas.microsoft.com/office/drawing/2014/main" xmlns="" id="{73777C45-1344-440E-869D-69B3AABF4692}"/>
-              </a:ext>
-            </a:extLst>
-          </p:cNvPr>
+            <a:endParaRPr lang="en-US" dirty="0"/>
+          </a:p>
+        </p:txBody>
+      </p:sp>
+      <p:sp>
+        <p:nvSpPr>
+          <p:cNvPr id="4" name="Date Placeholder 3"/>
           <p:cNvSpPr>
             <a:spLocks noGrp="1"/>
           </p:cNvSpPr>
@@ -971,13 +1052,7 @@
       </p:sp>
       <p:sp>
         <p:nvSpPr>
-          <p:cNvPr id="5" name="Footer Placeholder 4">
-            <a:extLst>
-              <a:ext uri="{FF2B5EF4-FFF2-40B4-BE49-F238E27FC236}">
-                <a16:creationId xmlns:a16="http://schemas.microsoft.com/office/drawing/2014/main" xmlns="" id="{B40BF8B3-4CF3-4129-AB8B-F089BE13DA99}"/>
-              </a:ext>
-            </a:extLst>
-          </p:cNvPr>
+          <p:cNvPr id="5" name="Footer Placeholder 4"/>
           <p:cNvSpPr>
             <a:spLocks noGrp="1"/>
           </p:cNvSpPr>
@@ -985,7 +1060,12 @@
             <p:ph type="ftr" sz="quarter" idx="11"/>
           </p:nvPr>
         </p:nvSpPr>
-        <p:spPr/>
+        <p:spPr>
+          <a:xfrm>
+            <a:off x="2416500" y="329307"/>
+            <a:ext cx="4973915" cy="309201"/>
+          </a:xfrm>
+        </p:spPr>
         <p:txBody>
           <a:bodyPr/>
           <a:lstStyle/>
@@ -996,13 +1076,7 @@
       </p:sp>
       <p:sp>
         <p:nvSpPr>
-          <p:cNvPr id="6" name="Slide Number Placeholder 5">
-            <a:extLst>
-              <a:ext uri="{FF2B5EF4-FFF2-40B4-BE49-F238E27FC236}">
-                <a16:creationId xmlns:a16="http://schemas.microsoft.com/office/drawing/2014/main" xmlns="" id="{53645F15-2766-49F0-82CD-A0F5D7B9C0D8}"/>
-              </a:ext>
-            </a:extLst>
-          </p:cNvPr>
+          <p:cNvPr id="6" name="Slide Number Placeholder 5"/>
           <p:cNvSpPr>
             <a:spLocks noGrp="1"/>
           </p:cNvSpPr>
@@ -1010,7 +1084,12 @@
             <p:ph type="sldNum" sz="quarter" idx="12"/>
           </p:nvPr>
         </p:nvSpPr>
-        <p:spPr/>
+        <p:spPr>
+          <a:xfrm>
+            <a:off x="1437664" y="798973"/>
+            <a:ext cx="811019" cy="503578"/>
+          </a:xfrm>
+        </p:spPr>
         <p:txBody>
           <a:bodyPr/>
           <a:lstStyle/>
@@ -1023,10 +1102,41 @@
           </a:p>
         </p:txBody>
       </p:sp>
+      <p:cxnSp>
+        <p:nvCxnSpPr>
+          <p:cNvPr id="15" name="Straight Connector 14"/>
+          <p:cNvCxnSpPr/>
+          <p:nvPr/>
+        </p:nvCxnSpPr>
+        <p:spPr>
+          <a:xfrm>
+            <a:off x="2417780" y="3528542"/>
+            <a:ext cx="8637072" cy="0"/>
+          </a:xfrm>
+          <a:prstGeom prst="line">
+            <a:avLst/>
+          </a:prstGeom>
+          <a:ln w="31750"/>
+        </p:spPr>
+        <p:style>
+          <a:lnRef idx="3">
+            <a:schemeClr val="accent1"/>
+          </a:lnRef>
+          <a:fillRef idx="0">
+            <a:schemeClr val="accent1"/>
+          </a:fillRef>
+          <a:effectRef idx="2">
+            <a:schemeClr val="accent1"/>
+          </a:effectRef>
+          <a:fontRef idx="minor">
+            <a:schemeClr val="tx1"/>
+          </a:fontRef>
+        </p:style>
+      </p:cxnSp>
     </p:spTree>
     <p:extLst>
       <p:ext uri="{BB962C8B-B14F-4D97-AF65-F5344CB8AC3E}">
-        <p14:creationId xmlns:p14="http://schemas.microsoft.com/office/powerpoint/2010/main" val="2429919361"/>
+        <p14:creationId xmlns:p14="http://schemas.microsoft.com/office/powerpoint/2010/main" val="24198298"/>
       </p:ext>
     </p:extLst>
   </p:cSld>
@@ -1055,13 +1165,7 @@
       </p:grpSpPr>
       <p:sp>
         <p:nvSpPr>
-          <p:cNvPr id="2" name="Title 1">
-            <a:extLst>
-              <a:ext uri="{FF2B5EF4-FFF2-40B4-BE49-F238E27FC236}">
-                <a16:creationId xmlns:a16="http://schemas.microsoft.com/office/drawing/2014/main" xmlns="" id="{345B8196-8EDC-4079-BC18-074936A4803C}"/>
-              </a:ext>
-            </a:extLst>
-          </p:cNvPr>
+          <p:cNvPr id="2" name="Title 1"/>
           <p:cNvSpPr>
             <a:spLocks noGrp="1"/>
           </p:cNvSpPr>
@@ -1078,18 +1182,13 @@
               <a:rPr lang="en-US"/>
               <a:t>Click to edit Master title style</a:t>
             </a:r>
-          </a:p>
-        </p:txBody>
-      </p:sp>
-      <p:sp>
-        <p:nvSpPr>
-          <p:cNvPr id="3" name="Vertical Text Placeholder 2">
-            <a:extLst>
-              <a:ext uri="{FF2B5EF4-FFF2-40B4-BE49-F238E27FC236}">
-                <a16:creationId xmlns:a16="http://schemas.microsoft.com/office/drawing/2014/main" xmlns="" id="{3875197D-47E6-43BF-8DB5-A17DC5B52C97}"/>
-              </a:ext>
-            </a:extLst>
-          </p:cNvPr>
+            <a:endParaRPr lang="en-US" dirty="0"/>
+          </a:p>
+        </p:txBody>
+      </p:sp>
+      <p:sp>
+        <p:nvSpPr>
+          <p:cNvPr id="3" name="Vertical Text Placeholder 2"/>
           <p:cNvSpPr>
             <a:spLocks noGrp="1"/>
           </p:cNvSpPr>
@@ -1135,18 +1234,13 @@
               <a:rPr lang="en-US"/>
               <a:t>Fifth level</a:t>
             </a:r>
-          </a:p>
-        </p:txBody>
-      </p:sp>
-      <p:sp>
-        <p:nvSpPr>
-          <p:cNvPr id="4" name="Date Placeholder 3">
-            <a:extLst>
-              <a:ext uri="{FF2B5EF4-FFF2-40B4-BE49-F238E27FC236}">
-                <a16:creationId xmlns:a16="http://schemas.microsoft.com/office/drawing/2014/main" xmlns="" id="{781F48C9-1003-465E-9DED-187A7A411908}"/>
-              </a:ext>
-            </a:extLst>
-          </p:cNvPr>
+            <a:endParaRPr lang="en-US" dirty="0"/>
+          </a:p>
+        </p:txBody>
+      </p:sp>
+      <p:sp>
+        <p:nvSpPr>
+          <p:cNvPr id="4" name="Date Placeholder 3"/>
           <p:cNvSpPr>
             <a:spLocks noGrp="1"/>
           </p:cNvSpPr>
@@ -1169,13 +1263,7 @@
       </p:sp>
       <p:sp>
         <p:nvSpPr>
-          <p:cNvPr id="5" name="Footer Placeholder 4">
-            <a:extLst>
-              <a:ext uri="{FF2B5EF4-FFF2-40B4-BE49-F238E27FC236}">
-                <a16:creationId xmlns:a16="http://schemas.microsoft.com/office/drawing/2014/main" xmlns="" id="{9544C51E-0907-4D80-A5F7-EE895B2523F6}"/>
-              </a:ext>
-            </a:extLst>
-          </p:cNvPr>
+          <p:cNvPr id="5" name="Footer Placeholder 4"/>
           <p:cNvSpPr>
             <a:spLocks noGrp="1"/>
           </p:cNvSpPr>
@@ -1194,13 +1282,7 @@
       </p:sp>
       <p:sp>
         <p:nvSpPr>
-          <p:cNvPr id="6" name="Slide Number Placeholder 5">
-            <a:extLst>
-              <a:ext uri="{FF2B5EF4-FFF2-40B4-BE49-F238E27FC236}">
-                <a16:creationId xmlns:a16="http://schemas.microsoft.com/office/drawing/2014/main" xmlns="" id="{50BA73CE-9312-4D9B-BE4C-DB06D6F39DC9}"/>
-              </a:ext>
-            </a:extLst>
-          </p:cNvPr>
+          <p:cNvPr id="6" name="Slide Number Placeholder 5"/>
           <p:cNvSpPr>
             <a:spLocks noGrp="1"/>
           </p:cNvSpPr>
@@ -1221,10 +1303,41 @@
           </a:p>
         </p:txBody>
       </p:sp>
+      <p:cxnSp>
+        <p:nvCxnSpPr>
+          <p:cNvPr id="26" name="Straight Connector 25"/>
+          <p:cNvCxnSpPr/>
+          <p:nvPr/>
+        </p:nvCxnSpPr>
+        <p:spPr>
+          <a:xfrm>
+            <a:off x="1453896" y="1847088"/>
+            <a:ext cx="9607522" cy="0"/>
+          </a:xfrm>
+          <a:prstGeom prst="line">
+            <a:avLst/>
+          </a:prstGeom>
+          <a:ln w="31750"/>
+        </p:spPr>
+        <p:style>
+          <a:lnRef idx="3">
+            <a:schemeClr val="accent1"/>
+          </a:lnRef>
+          <a:fillRef idx="0">
+            <a:schemeClr val="accent1"/>
+          </a:fillRef>
+          <a:effectRef idx="2">
+            <a:schemeClr val="accent1"/>
+          </a:effectRef>
+          <a:fontRef idx="minor">
+            <a:schemeClr val="tx1"/>
+          </a:fontRef>
+        </p:style>
+      </p:cxnSp>
     </p:spTree>
     <p:extLst>
       <p:ext uri="{BB962C8B-B14F-4D97-AF65-F5344CB8AC3E}">
-        <p14:creationId xmlns:p14="http://schemas.microsoft.com/office/powerpoint/2010/main" val="1283401466"/>
+        <p14:creationId xmlns:p14="http://schemas.microsoft.com/office/powerpoint/2010/main" val="29224719"/>
       </p:ext>
     </p:extLst>
   </p:cSld>
@@ -1253,13 +1366,7 @@
       </p:grpSpPr>
       <p:sp>
         <p:nvSpPr>
-          <p:cNvPr id="2" name="Vertical Title 1">
-            <a:extLst>
-              <a:ext uri="{FF2B5EF4-FFF2-40B4-BE49-F238E27FC236}">
-                <a16:creationId xmlns:a16="http://schemas.microsoft.com/office/drawing/2014/main" xmlns="" id="{7982306C-AFCE-4736-A102-F4B6D3660429}"/>
-              </a:ext>
-            </a:extLst>
-          </p:cNvPr>
+          <p:cNvPr id="2" name="Vertical Title 1"/>
           <p:cNvSpPr>
             <a:spLocks noGrp="1"/>
           </p:cNvSpPr>
@@ -1269,30 +1376,29 @@
         </p:nvSpPr>
         <p:spPr>
           <a:xfrm>
-            <a:off x="8724900" y="365125"/>
-            <a:ext cx="2628900" cy="5811838"/>
+            <a:off x="9439111" y="798973"/>
+            <a:ext cx="1615742" cy="4659889"/>
           </a:xfrm>
         </p:spPr>
         <p:txBody>
           <a:bodyPr vert="eaVert"/>
-          <a:lstStyle/>
+          <a:lstStyle>
+            <a:lvl1pPr algn="l">
+              <a:defRPr/>
+            </a:lvl1pPr>
+          </a:lstStyle>
           <a:p>
             <a:r>
               <a:rPr lang="en-US"/>
               <a:t>Click to edit Master title style</a:t>
             </a:r>
-          </a:p>
-        </p:txBody>
-      </p:sp>
-      <p:sp>
-        <p:nvSpPr>
-          <p:cNvPr id="3" name="Vertical Text Placeholder 2">
-            <a:extLst>
-              <a:ext uri="{FF2B5EF4-FFF2-40B4-BE49-F238E27FC236}">
-                <a16:creationId xmlns:a16="http://schemas.microsoft.com/office/drawing/2014/main" xmlns="" id="{4B5862B2-4AFB-489A-B8D3-23168CC765B6}"/>
-              </a:ext>
-            </a:extLst>
-          </p:cNvPr>
+            <a:endParaRPr lang="en-US" dirty="0"/>
+          </a:p>
+        </p:txBody>
+      </p:sp>
+      <p:sp>
+        <p:nvSpPr>
+          <p:cNvPr id="3" name="Vertical Text Placeholder 2"/>
           <p:cNvSpPr>
             <a:spLocks noGrp="1"/>
           </p:cNvSpPr>
@@ -1302,8 +1408,8 @@
         </p:nvSpPr>
         <p:spPr>
           <a:xfrm>
-            <a:off x="838200" y="365125"/>
-            <a:ext cx="7734300" cy="5811838"/>
+            <a:off x="1444672" y="798973"/>
+            <a:ext cx="7828830" cy="4659889"/>
           </a:xfrm>
         </p:spPr>
         <p:txBody>
@@ -1343,18 +1449,13 @@
               <a:rPr lang="en-US"/>
               <a:t>Fifth level</a:t>
             </a:r>
-          </a:p>
-        </p:txBody>
-      </p:sp>
-      <p:sp>
-        <p:nvSpPr>
-          <p:cNvPr id="4" name="Date Placeholder 3">
-            <a:extLst>
-              <a:ext uri="{FF2B5EF4-FFF2-40B4-BE49-F238E27FC236}">
-                <a16:creationId xmlns:a16="http://schemas.microsoft.com/office/drawing/2014/main" xmlns="" id="{E7DC84C1-BDF7-46BF-AFF7-0CF0EB30E93F}"/>
-              </a:ext>
-            </a:extLst>
-          </p:cNvPr>
+            <a:endParaRPr lang="en-US" dirty="0"/>
+          </a:p>
+        </p:txBody>
+      </p:sp>
+      <p:sp>
+        <p:nvSpPr>
+          <p:cNvPr id="4" name="Date Placeholder 3"/>
           <p:cNvSpPr>
             <a:spLocks noGrp="1"/>
           </p:cNvSpPr>
@@ -1377,13 +1478,7 @@
       </p:sp>
       <p:sp>
         <p:nvSpPr>
-          <p:cNvPr id="5" name="Footer Placeholder 4">
-            <a:extLst>
-              <a:ext uri="{FF2B5EF4-FFF2-40B4-BE49-F238E27FC236}">
-                <a16:creationId xmlns:a16="http://schemas.microsoft.com/office/drawing/2014/main" xmlns="" id="{8A8BD21D-115F-4988-8AE9-B22305B34238}"/>
-              </a:ext>
-            </a:extLst>
-          </p:cNvPr>
+          <p:cNvPr id="5" name="Footer Placeholder 4"/>
           <p:cNvSpPr>
             <a:spLocks noGrp="1"/>
           </p:cNvSpPr>
@@ -1402,13 +1497,7 @@
       </p:sp>
       <p:sp>
         <p:nvSpPr>
-          <p:cNvPr id="6" name="Slide Number Placeholder 5">
-            <a:extLst>
-              <a:ext uri="{FF2B5EF4-FFF2-40B4-BE49-F238E27FC236}">
-                <a16:creationId xmlns:a16="http://schemas.microsoft.com/office/drawing/2014/main" xmlns="" id="{0CC31E18-242E-4A04-93CE-0FE82C3C6266}"/>
-              </a:ext>
-            </a:extLst>
-          </p:cNvPr>
+          <p:cNvPr id="6" name="Slide Number Placeholder 5"/>
           <p:cNvSpPr>
             <a:spLocks noGrp="1"/>
           </p:cNvSpPr>
@@ -1429,10 +1518,41 @@
           </a:p>
         </p:txBody>
       </p:sp>
+      <p:cxnSp>
+        <p:nvCxnSpPr>
+          <p:cNvPr id="15" name="Straight Connector 14"/>
+          <p:cNvCxnSpPr/>
+          <p:nvPr/>
+        </p:nvCxnSpPr>
+        <p:spPr>
+          <a:xfrm>
+            <a:off x="9439111" y="798973"/>
+            <a:ext cx="0" cy="4659889"/>
+          </a:xfrm>
+          <a:prstGeom prst="line">
+            <a:avLst/>
+          </a:prstGeom>
+          <a:ln w="31750"/>
+        </p:spPr>
+        <p:style>
+          <a:lnRef idx="3">
+            <a:schemeClr val="accent1"/>
+          </a:lnRef>
+          <a:fillRef idx="0">
+            <a:schemeClr val="accent1"/>
+          </a:fillRef>
+          <a:effectRef idx="2">
+            <a:schemeClr val="accent1"/>
+          </a:effectRef>
+          <a:fontRef idx="minor">
+            <a:schemeClr val="tx1"/>
+          </a:fontRef>
+        </p:style>
+      </p:cxnSp>
     </p:spTree>
     <p:extLst>
       <p:ext uri="{BB962C8B-B14F-4D97-AF65-F5344CB8AC3E}">
-        <p14:creationId xmlns:p14="http://schemas.microsoft.com/office/powerpoint/2010/main" val="3076301396"/>
+        <p14:creationId xmlns:p14="http://schemas.microsoft.com/office/powerpoint/2010/main" val="4175534913"/>
       </p:ext>
     </p:extLst>
   </p:cSld>
@@ -1461,13 +1581,7 @@
       </p:grpSpPr>
       <p:sp>
         <p:nvSpPr>
-          <p:cNvPr id="2" name="Title 1">
-            <a:extLst>
-              <a:ext uri="{FF2B5EF4-FFF2-40B4-BE49-F238E27FC236}">
-                <a16:creationId xmlns:a16="http://schemas.microsoft.com/office/drawing/2014/main" xmlns="" id="{DC804D77-0A47-4AE2-8785-750A5CE7F60B}"/>
-              </a:ext>
-            </a:extLst>
-          </p:cNvPr>
+          <p:cNvPr id="2" name="Title 1"/>
           <p:cNvSpPr>
             <a:spLocks noGrp="1"/>
           </p:cNvSpPr>
@@ -1484,18 +1598,13 @@
               <a:rPr lang="en-US"/>
               <a:t>Click to edit Master title style</a:t>
             </a:r>
-          </a:p>
-        </p:txBody>
-      </p:sp>
-      <p:sp>
-        <p:nvSpPr>
-          <p:cNvPr id="3" name="Content Placeholder 2">
-            <a:extLst>
-              <a:ext uri="{FF2B5EF4-FFF2-40B4-BE49-F238E27FC236}">
-                <a16:creationId xmlns:a16="http://schemas.microsoft.com/office/drawing/2014/main" xmlns="" id="{AE9BE0B3-FA2A-43C3-9D84-D0EBD4CDD805}"/>
-              </a:ext>
-            </a:extLst>
-          </p:cNvPr>
+            <a:endParaRPr lang="en-US" dirty="0"/>
+          </a:p>
+        </p:txBody>
+      </p:sp>
+      <p:sp>
+        <p:nvSpPr>
+          <p:cNvPr id="3" name="Content Placeholder 2"/>
           <p:cNvSpPr>
             <a:spLocks noGrp="1"/>
           </p:cNvSpPr>
@@ -1505,7 +1614,7 @@
         </p:nvSpPr>
         <p:spPr/>
         <p:txBody>
-          <a:bodyPr/>
+          <a:bodyPr anchor="t"/>
           <a:lstStyle/>
           <a:p>
             <a:pPr lvl="0"/>
@@ -1541,18 +1650,13 @@
               <a:rPr lang="en-US"/>
               <a:t>Fifth level</a:t>
             </a:r>
-          </a:p>
-        </p:txBody>
-      </p:sp>
-      <p:sp>
-        <p:nvSpPr>
-          <p:cNvPr id="4" name="Date Placeholder 3">
-            <a:extLst>
-              <a:ext uri="{FF2B5EF4-FFF2-40B4-BE49-F238E27FC236}">
-                <a16:creationId xmlns:a16="http://schemas.microsoft.com/office/drawing/2014/main" xmlns="" id="{9C1DCC57-1120-4B4E-AD2A-41001A08654B}"/>
-              </a:ext>
-            </a:extLst>
-          </p:cNvPr>
+            <a:endParaRPr lang="en-US" dirty="0"/>
+          </a:p>
+        </p:txBody>
+      </p:sp>
+      <p:sp>
+        <p:nvSpPr>
+          <p:cNvPr id="4" name="Date Placeholder 3"/>
           <p:cNvSpPr>
             <a:spLocks noGrp="1"/>
           </p:cNvSpPr>
@@ -1575,13 +1679,7 @@
       </p:sp>
       <p:sp>
         <p:nvSpPr>
-          <p:cNvPr id="5" name="Footer Placeholder 4">
-            <a:extLst>
-              <a:ext uri="{FF2B5EF4-FFF2-40B4-BE49-F238E27FC236}">
-                <a16:creationId xmlns:a16="http://schemas.microsoft.com/office/drawing/2014/main" xmlns="" id="{38F65C08-E7B3-4595-96D5-11A1027FB297}"/>
-              </a:ext>
-            </a:extLst>
-          </p:cNvPr>
+          <p:cNvPr id="5" name="Footer Placeholder 4"/>
           <p:cNvSpPr>
             <a:spLocks noGrp="1"/>
           </p:cNvSpPr>
@@ -1600,13 +1698,7 @@
       </p:sp>
       <p:sp>
         <p:nvSpPr>
-          <p:cNvPr id="6" name="Slide Number Placeholder 5">
-            <a:extLst>
-              <a:ext uri="{FF2B5EF4-FFF2-40B4-BE49-F238E27FC236}">
-                <a16:creationId xmlns:a16="http://schemas.microsoft.com/office/drawing/2014/main" xmlns="" id="{BEB01781-8E31-46C8-8032-90AEEF10E3B8}"/>
-              </a:ext>
-            </a:extLst>
-          </p:cNvPr>
+          <p:cNvPr id="6" name="Slide Number Placeholder 5"/>
           <p:cNvSpPr>
             <a:spLocks noGrp="1"/>
           </p:cNvSpPr>
@@ -1627,10 +1719,41 @@
           </a:p>
         </p:txBody>
       </p:sp>
+      <p:cxnSp>
+        <p:nvCxnSpPr>
+          <p:cNvPr id="33" name="Straight Connector 32"/>
+          <p:cNvCxnSpPr/>
+          <p:nvPr/>
+        </p:nvCxnSpPr>
+        <p:spPr>
+          <a:xfrm>
+            <a:off x="1453896" y="1847088"/>
+            <a:ext cx="9607522" cy="0"/>
+          </a:xfrm>
+          <a:prstGeom prst="line">
+            <a:avLst/>
+          </a:prstGeom>
+          <a:ln w="31750"/>
+        </p:spPr>
+        <p:style>
+          <a:lnRef idx="3">
+            <a:schemeClr val="accent1"/>
+          </a:lnRef>
+          <a:fillRef idx="0">
+            <a:schemeClr val="accent1"/>
+          </a:fillRef>
+          <a:effectRef idx="2">
+            <a:schemeClr val="accent1"/>
+          </a:effectRef>
+          <a:fontRef idx="minor">
+            <a:schemeClr val="tx1"/>
+          </a:fontRef>
+        </p:style>
+      </p:cxnSp>
     </p:spTree>
     <p:extLst>
       <p:ext uri="{BB962C8B-B14F-4D97-AF65-F5344CB8AC3E}">
-        <p14:creationId xmlns:p14="http://schemas.microsoft.com/office/powerpoint/2010/main" val="560627847"/>
+        <p14:creationId xmlns:p14="http://schemas.microsoft.com/office/powerpoint/2010/main" val="3082894314"/>
       </p:ext>
     </p:extLst>
   </p:cSld>
@@ -1659,13 +1782,7 @@
       </p:grpSpPr>
       <p:sp>
         <p:nvSpPr>
-          <p:cNvPr id="2" name="Title 1">
-            <a:extLst>
-              <a:ext uri="{FF2B5EF4-FFF2-40B4-BE49-F238E27FC236}">
-                <a16:creationId xmlns:a16="http://schemas.microsoft.com/office/drawing/2014/main" xmlns="" id="{621368A3-9098-44BB-AED2-C45BDC454DC8}"/>
-              </a:ext>
-            </a:extLst>
-          </p:cNvPr>
+          <p:cNvPr id="2" name="Title 1"/>
           <p:cNvSpPr>
             <a:spLocks noGrp="1"/>
           </p:cNvSpPr>
@@ -1675,15 +1792,17 @@
         </p:nvSpPr>
         <p:spPr>
           <a:xfrm>
-            <a:off x="831850" y="1709738"/>
-            <a:ext cx="10515600" cy="2852737"/>
-          </a:xfrm>
-        </p:spPr>
-        <p:txBody>
-          <a:bodyPr anchor="b"/>
+            <a:off x="1454239" y="1756130"/>
+            <a:ext cx="8643154" cy="1887950"/>
+          </a:xfrm>
+        </p:spPr>
+        <p:txBody>
+          <a:bodyPr anchor="b">
+            <a:normAutofit/>
+          </a:bodyPr>
           <a:lstStyle>
-            <a:lvl1pPr>
-              <a:defRPr sz="6000"/>
+            <a:lvl1pPr algn="l">
+              <a:defRPr sz="3600"/>
             </a:lvl1pPr>
           </a:lstStyle>
           <a:p>
@@ -1691,18 +1810,13 @@
               <a:rPr lang="en-US"/>
               <a:t>Click to edit Master title style</a:t>
             </a:r>
-          </a:p>
-        </p:txBody>
-      </p:sp>
-      <p:sp>
-        <p:nvSpPr>
-          <p:cNvPr id="3" name="Text Placeholder 2">
-            <a:extLst>
-              <a:ext uri="{FF2B5EF4-FFF2-40B4-BE49-F238E27FC236}">
-                <a16:creationId xmlns:a16="http://schemas.microsoft.com/office/drawing/2014/main" xmlns="" id="{CFE47598-94C1-4FF8-BB15-5680518EC9E7}"/>
-              </a:ext>
-            </a:extLst>
-          </p:cNvPr>
+            <a:endParaRPr lang="en-US" dirty="0"/>
+          </a:p>
+        </p:txBody>
+      </p:sp>
+      <p:sp>
+        <p:nvSpPr>
+          <p:cNvPr id="3" name="Text Placeholder 2"/>
           <p:cNvSpPr>
             <a:spLocks noGrp="1"/>
           </p:cNvSpPr>
@@ -1712,26 +1826,26 @@
         </p:nvSpPr>
         <p:spPr>
           <a:xfrm>
-            <a:off x="831850" y="4589463"/>
-            <a:ext cx="10515600" cy="1500187"/>
-          </a:xfrm>
-        </p:spPr>
-        <p:txBody>
-          <a:bodyPr/>
+            <a:off x="1454239" y="3806195"/>
+            <a:ext cx="8630446" cy="1012929"/>
+          </a:xfrm>
+        </p:spPr>
+        <p:txBody>
+          <a:bodyPr tIns="91440">
+            <a:normAutofit/>
+          </a:bodyPr>
           <a:lstStyle>
-            <a:lvl1pPr marL="0" indent="0">
-              <a:buNone/>
-              <a:defRPr sz="2400">
+            <a:lvl1pPr marL="0" indent="0" algn="l">
+              <a:buNone/>
+              <a:defRPr sz="1800">
                 <a:solidFill>
-                  <a:schemeClr val="tx1">
-                    <a:tint val="75000"/>
-                  </a:schemeClr>
+                  <a:schemeClr val="tx1"/>
                 </a:solidFill>
               </a:defRPr>
             </a:lvl1pPr>
             <a:lvl2pPr marL="457200" indent="0">
               <a:buNone/>
-              <a:defRPr sz="2000">
+              <a:defRPr sz="1800">
                 <a:solidFill>
                   <a:schemeClr val="tx1">
                     <a:tint val="75000"/>
@@ -1821,13 +1935,7 @@
       </p:sp>
       <p:sp>
         <p:nvSpPr>
-          <p:cNvPr id="4" name="Date Placeholder 3">
-            <a:extLst>
-              <a:ext uri="{FF2B5EF4-FFF2-40B4-BE49-F238E27FC236}">
-                <a16:creationId xmlns:a16="http://schemas.microsoft.com/office/drawing/2014/main" xmlns="" id="{B412CEEE-CA8F-42EB-B744-33F373812B83}"/>
-              </a:ext>
-            </a:extLst>
-          </p:cNvPr>
+          <p:cNvPr id="4" name="Date Placeholder 3"/>
           <p:cNvSpPr>
             <a:spLocks noGrp="1"/>
           </p:cNvSpPr>
@@ -1850,13 +1958,7 @@
       </p:sp>
       <p:sp>
         <p:nvSpPr>
-          <p:cNvPr id="5" name="Footer Placeholder 4">
-            <a:extLst>
-              <a:ext uri="{FF2B5EF4-FFF2-40B4-BE49-F238E27FC236}">
-                <a16:creationId xmlns:a16="http://schemas.microsoft.com/office/drawing/2014/main" xmlns="" id="{B5934B1E-E18D-42B1-8A15-E064C64F9C37}"/>
-              </a:ext>
-            </a:extLst>
-          </p:cNvPr>
+          <p:cNvPr id="5" name="Footer Placeholder 4"/>
           <p:cNvSpPr>
             <a:spLocks noGrp="1"/>
           </p:cNvSpPr>
@@ -1875,13 +1977,7 @@
       </p:sp>
       <p:sp>
         <p:nvSpPr>
-          <p:cNvPr id="6" name="Slide Number Placeholder 5">
-            <a:extLst>
-              <a:ext uri="{FF2B5EF4-FFF2-40B4-BE49-F238E27FC236}">
-                <a16:creationId xmlns:a16="http://schemas.microsoft.com/office/drawing/2014/main" xmlns="" id="{95F47FC4-49E1-4B31-8D85-3503E91186FE}"/>
-              </a:ext>
-            </a:extLst>
-          </p:cNvPr>
+          <p:cNvPr id="6" name="Slide Number Placeholder 5"/>
           <p:cNvSpPr>
             <a:spLocks noGrp="1"/>
           </p:cNvSpPr>
@@ -1902,10 +1998,41 @@
           </a:p>
         </p:txBody>
       </p:sp>
+      <p:cxnSp>
+        <p:nvCxnSpPr>
+          <p:cNvPr id="15" name="Straight Connector 14"/>
+          <p:cNvCxnSpPr/>
+          <p:nvPr/>
+        </p:nvCxnSpPr>
+        <p:spPr>
+          <a:xfrm>
+            <a:off x="1454239" y="3804985"/>
+            <a:ext cx="8630446" cy="0"/>
+          </a:xfrm>
+          <a:prstGeom prst="line">
+            <a:avLst/>
+          </a:prstGeom>
+          <a:ln w="31750"/>
+        </p:spPr>
+        <p:style>
+          <a:lnRef idx="3">
+            <a:schemeClr val="accent1"/>
+          </a:lnRef>
+          <a:fillRef idx="0">
+            <a:schemeClr val="accent1"/>
+          </a:fillRef>
+          <a:effectRef idx="2">
+            <a:schemeClr val="accent1"/>
+          </a:effectRef>
+          <a:fontRef idx="minor">
+            <a:schemeClr val="tx1"/>
+          </a:fontRef>
+        </p:style>
+      </p:cxnSp>
     </p:spTree>
     <p:extLst>
       <p:ext uri="{BB962C8B-B14F-4D97-AF65-F5344CB8AC3E}">
-        <p14:creationId xmlns:p14="http://schemas.microsoft.com/office/powerpoint/2010/main" val="547492729"/>
+        <p14:creationId xmlns:p14="http://schemas.microsoft.com/office/powerpoint/2010/main" val="1194999888"/>
       </p:ext>
     </p:extLst>
   </p:cSld>
@@ -1934,13 +2061,7 @@
       </p:grpSpPr>
       <p:sp>
         <p:nvSpPr>
-          <p:cNvPr id="2" name="Title 1">
-            <a:extLst>
-              <a:ext uri="{FF2B5EF4-FFF2-40B4-BE49-F238E27FC236}">
-                <a16:creationId xmlns:a16="http://schemas.microsoft.com/office/drawing/2014/main" xmlns="" id="{EBBD004C-18EC-4F0D-B6DA-401A5247A5FC}"/>
-              </a:ext>
-            </a:extLst>
-          </p:cNvPr>
+          <p:cNvPr id="2" name="Title 1"/>
           <p:cNvSpPr>
             <a:spLocks noGrp="1"/>
           </p:cNvSpPr>
@@ -1948,7 +2069,12 @@
             <p:ph type="title"/>
           </p:nvPr>
         </p:nvSpPr>
-        <p:spPr/>
+        <p:spPr>
+          <a:xfrm>
+            <a:off x="1449217" y="804889"/>
+            <a:ext cx="9605635" cy="1059305"/>
+          </a:xfrm>
+        </p:spPr>
         <p:txBody>
           <a:bodyPr/>
           <a:lstStyle/>
@@ -1957,18 +2083,13 @@
               <a:rPr lang="en-US"/>
               <a:t>Click to edit Master title style</a:t>
             </a:r>
-          </a:p>
-        </p:txBody>
-      </p:sp>
-      <p:sp>
-        <p:nvSpPr>
-          <p:cNvPr id="3" name="Content Placeholder 2">
-            <a:extLst>
-              <a:ext uri="{FF2B5EF4-FFF2-40B4-BE49-F238E27FC236}">
-                <a16:creationId xmlns:a16="http://schemas.microsoft.com/office/drawing/2014/main" xmlns="" id="{A45403D8-7504-466A-9042-036B36D362DA}"/>
-              </a:ext>
-            </a:extLst>
-          </p:cNvPr>
+            <a:endParaRPr lang="en-US" dirty="0"/>
+          </a:p>
+        </p:txBody>
+      </p:sp>
+      <p:sp>
+        <p:nvSpPr>
+          <p:cNvPr id="3" name="Content Placeholder 2"/>
           <p:cNvSpPr>
             <a:spLocks noGrp="1"/>
           </p:cNvSpPr>
@@ -1978,8 +2099,8 @@
         </p:nvSpPr>
         <p:spPr>
           <a:xfrm>
-            <a:off x="838200" y="1825625"/>
-            <a:ext cx="5181600" cy="4351338"/>
+            <a:off x="1447331" y="2010878"/>
+            <a:ext cx="4645152" cy="3448595"/>
           </a:xfrm>
         </p:spPr>
         <p:txBody>
@@ -2019,18 +2140,13 @@
               <a:rPr lang="en-US"/>
               <a:t>Fifth level</a:t>
             </a:r>
-          </a:p>
-        </p:txBody>
-      </p:sp>
-      <p:sp>
-        <p:nvSpPr>
-          <p:cNvPr id="4" name="Content Placeholder 3">
-            <a:extLst>
-              <a:ext uri="{FF2B5EF4-FFF2-40B4-BE49-F238E27FC236}">
-                <a16:creationId xmlns:a16="http://schemas.microsoft.com/office/drawing/2014/main" xmlns="" id="{09A6EDB0-269E-4864-8AFB-1825397D2CC9}"/>
-              </a:ext>
-            </a:extLst>
-          </p:cNvPr>
+            <a:endParaRPr lang="en-US" dirty="0"/>
+          </a:p>
+        </p:txBody>
+      </p:sp>
+      <p:sp>
+        <p:nvSpPr>
+          <p:cNvPr id="4" name="Content Placeholder 3"/>
           <p:cNvSpPr>
             <a:spLocks noGrp="1"/>
           </p:cNvSpPr>
@@ -2040,8 +2156,8 @@
         </p:nvSpPr>
         <p:spPr>
           <a:xfrm>
-            <a:off x="6172200" y="1825625"/>
-            <a:ext cx="5181600" cy="4351338"/>
+            <a:off x="6413771" y="2017343"/>
+            <a:ext cx="4645152" cy="3441520"/>
           </a:xfrm>
         </p:spPr>
         <p:txBody>
@@ -2081,18 +2197,13 @@
               <a:rPr lang="en-US"/>
               <a:t>Fifth level</a:t>
             </a:r>
-          </a:p>
-        </p:txBody>
-      </p:sp>
-      <p:sp>
-        <p:nvSpPr>
-          <p:cNvPr id="5" name="Date Placeholder 4">
-            <a:extLst>
-              <a:ext uri="{FF2B5EF4-FFF2-40B4-BE49-F238E27FC236}">
-                <a16:creationId xmlns:a16="http://schemas.microsoft.com/office/drawing/2014/main" xmlns="" id="{AF418FB1-8DDB-4870-B9EF-B6E9C0B50580}"/>
-              </a:ext>
-            </a:extLst>
-          </p:cNvPr>
+            <a:endParaRPr lang="en-US" dirty="0"/>
+          </a:p>
+        </p:txBody>
+      </p:sp>
+      <p:sp>
+        <p:nvSpPr>
+          <p:cNvPr id="5" name="Date Placeholder 4"/>
           <p:cNvSpPr>
             <a:spLocks noGrp="1"/>
           </p:cNvSpPr>
@@ -2115,13 +2226,7 @@
       </p:sp>
       <p:sp>
         <p:nvSpPr>
-          <p:cNvPr id="6" name="Footer Placeholder 5">
-            <a:extLst>
-              <a:ext uri="{FF2B5EF4-FFF2-40B4-BE49-F238E27FC236}">
-                <a16:creationId xmlns:a16="http://schemas.microsoft.com/office/drawing/2014/main" xmlns="" id="{B170F998-6EE8-447E-9D5A-697F9750AE81}"/>
-              </a:ext>
-            </a:extLst>
-          </p:cNvPr>
+          <p:cNvPr id="6" name="Footer Placeholder 5"/>
           <p:cNvSpPr>
             <a:spLocks noGrp="1"/>
           </p:cNvSpPr>
@@ -2140,13 +2245,7 @@
       </p:sp>
       <p:sp>
         <p:nvSpPr>
-          <p:cNvPr id="7" name="Slide Number Placeholder 6">
-            <a:extLst>
-              <a:ext uri="{FF2B5EF4-FFF2-40B4-BE49-F238E27FC236}">
-                <a16:creationId xmlns:a16="http://schemas.microsoft.com/office/drawing/2014/main" xmlns="" id="{9E783CE4-61C8-4166-A29E-A8F305BC601F}"/>
-              </a:ext>
-            </a:extLst>
-          </p:cNvPr>
+          <p:cNvPr id="7" name="Slide Number Placeholder 6"/>
           <p:cNvSpPr>
             <a:spLocks noGrp="1"/>
           </p:cNvSpPr>
@@ -2167,10 +2266,41 @@
           </a:p>
         </p:txBody>
       </p:sp>
+      <p:cxnSp>
+        <p:nvCxnSpPr>
+          <p:cNvPr id="35" name="Straight Connector 34"/>
+          <p:cNvCxnSpPr/>
+          <p:nvPr/>
+        </p:nvCxnSpPr>
+        <p:spPr>
+          <a:xfrm>
+            <a:off x="1453896" y="1847088"/>
+            <a:ext cx="9607522" cy="0"/>
+          </a:xfrm>
+          <a:prstGeom prst="line">
+            <a:avLst/>
+          </a:prstGeom>
+          <a:ln w="31750"/>
+        </p:spPr>
+        <p:style>
+          <a:lnRef idx="3">
+            <a:schemeClr val="accent1"/>
+          </a:lnRef>
+          <a:fillRef idx="0">
+            <a:schemeClr val="accent1"/>
+          </a:fillRef>
+          <a:effectRef idx="2">
+            <a:schemeClr val="accent1"/>
+          </a:effectRef>
+          <a:fontRef idx="minor">
+            <a:schemeClr val="tx1"/>
+          </a:fontRef>
+        </p:style>
+      </p:cxnSp>
     </p:spTree>
     <p:extLst>
       <p:ext uri="{BB962C8B-B14F-4D97-AF65-F5344CB8AC3E}">
-        <p14:creationId xmlns:p14="http://schemas.microsoft.com/office/powerpoint/2010/main" val="244869523"/>
+        <p14:creationId xmlns:p14="http://schemas.microsoft.com/office/powerpoint/2010/main" val="4003590724"/>
       </p:ext>
     </p:extLst>
   </p:cSld>
@@ -2199,13 +2329,7 @@
       </p:grpSpPr>
       <p:sp>
         <p:nvSpPr>
-          <p:cNvPr id="2" name="Title 1">
-            <a:extLst>
-              <a:ext uri="{FF2B5EF4-FFF2-40B4-BE49-F238E27FC236}">
-                <a16:creationId xmlns:a16="http://schemas.microsoft.com/office/drawing/2014/main" xmlns="" id="{09AFCD48-5A3A-4EF2-945E-BFEAE4E6E745}"/>
-              </a:ext>
-            </a:extLst>
-          </p:cNvPr>
+          <p:cNvPr id="2" name="Title 1"/>
           <p:cNvSpPr>
             <a:spLocks noGrp="1"/>
           </p:cNvSpPr>
@@ -2215,8 +2339,8 @@
         </p:nvSpPr>
         <p:spPr>
           <a:xfrm>
-            <a:off x="839788" y="365125"/>
-            <a:ext cx="10515600" cy="1325563"/>
+            <a:off x="1447191" y="804163"/>
+            <a:ext cx="9607661" cy="1056319"/>
           </a:xfrm>
         </p:spPr>
         <p:txBody>
@@ -2227,18 +2351,13 @@
               <a:rPr lang="en-US"/>
               <a:t>Click to edit Master title style</a:t>
             </a:r>
-          </a:p>
-        </p:txBody>
-      </p:sp>
-      <p:sp>
-        <p:nvSpPr>
-          <p:cNvPr id="3" name="Text Placeholder 2">
-            <a:extLst>
-              <a:ext uri="{FF2B5EF4-FFF2-40B4-BE49-F238E27FC236}">
-                <a16:creationId xmlns:a16="http://schemas.microsoft.com/office/drawing/2014/main" xmlns="" id="{B0DAFBB0-E80F-4DD5-899E-75E126AB2DFB}"/>
-              </a:ext>
-            </a:extLst>
-          </p:cNvPr>
+            <a:endParaRPr lang="en-US" dirty="0"/>
+          </a:p>
+        </p:txBody>
+      </p:sp>
+      <p:sp>
+        <p:nvSpPr>
+          <p:cNvPr id="3" name="Text Placeholder 2"/>
           <p:cNvSpPr>
             <a:spLocks noGrp="1"/>
           </p:cNvSpPr>
@@ -2248,16 +2367,25 @@
         </p:nvSpPr>
         <p:spPr>
           <a:xfrm>
-            <a:off x="839788" y="1681163"/>
-            <a:ext cx="5157787" cy="823912"/>
-          </a:xfrm>
-        </p:spPr>
-        <p:txBody>
-          <a:bodyPr anchor="b"/>
+            <a:off x="1447191" y="2019549"/>
+            <a:ext cx="4645152" cy="801943"/>
+          </a:xfrm>
+        </p:spPr>
+        <p:txBody>
+          <a:bodyPr anchor="b">
+            <a:normAutofit/>
+          </a:bodyPr>
           <a:lstStyle>
             <a:lvl1pPr marL="0" indent="0">
-              <a:buNone/>
-              <a:defRPr sz="2400" b="1"/>
+              <a:lnSpc>
+                <a:spcPct val="100000"/>
+              </a:lnSpc>
+              <a:buNone/>
+              <a:defRPr sz="2200" b="0" cap="all" baseline="0">
+                <a:solidFill>
+                  <a:schemeClr val="accent1"/>
+                </a:solidFill>
+              </a:defRPr>
             </a:lvl1pPr>
             <a:lvl2pPr marL="457200" indent="0">
               <a:buNone/>
@@ -2303,13 +2431,7 @@
       </p:sp>
       <p:sp>
         <p:nvSpPr>
-          <p:cNvPr id="4" name="Content Placeholder 3">
-            <a:extLst>
-              <a:ext uri="{FF2B5EF4-FFF2-40B4-BE49-F238E27FC236}">
-                <a16:creationId xmlns:a16="http://schemas.microsoft.com/office/drawing/2014/main" xmlns="" id="{695924EE-390D-470D-A44D-8DBCCC91A286}"/>
-              </a:ext>
-            </a:extLst>
-          </p:cNvPr>
+          <p:cNvPr id="4" name="Content Placeholder 3"/>
           <p:cNvSpPr>
             <a:spLocks noGrp="1"/>
           </p:cNvSpPr>
@@ -2319,8 +2441,8 @@
         </p:nvSpPr>
         <p:spPr>
           <a:xfrm>
-            <a:off x="839788" y="2505075"/>
-            <a:ext cx="5157787" cy="3684588"/>
+            <a:off x="1447191" y="2824269"/>
+            <a:ext cx="4645152" cy="2644457"/>
           </a:xfrm>
         </p:spPr>
         <p:txBody>
@@ -2360,18 +2482,13 @@
               <a:rPr lang="en-US"/>
               <a:t>Fifth level</a:t>
             </a:r>
-          </a:p>
-        </p:txBody>
-      </p:sp>
-      <p:sp>
-        <p:nvSpPr>
-          <p:cNvPr id="5" name="Text Placeholder 4">
-            <a:extLst>
-              <a:ext uri="{FF2B5EF4-FFF2-40B4-BE49-F238E27FC236}">
-                <a16:creationId xmlns:a16="http://schemas.microsoft.com/office/drawing/2014/main" xmlns="" id="{B3F4860C-447D-4B7F-A063-F76C462325E1}"/>
-              </a:ext>
-            </a:extLst>
-          </p:cNvPr>
+            <a:endParaRPr lang="en-US" dirty="0"/>
+          </a:p>
+        </p:txBody>
+      </p:sp>
+      <p:sp>
+        <p:nvSpPr>
+          <p:cNvPr id="5" name="Text Placeholder 4"/>
           <p:cNvSpPr>
             <a:spLocks noGrp="1"/>
           </p:cNvSpPr>
@@ -2381,16 +2498,25 @@
         </p:nvSpPr>
         <p:spPr>
           <a:xfrm>
-            <a:off x="6172200" y="1681163"/>
-            <a:ext cx="5183188" cy="823912"/>
-          </a:xfrm>
-        </p:spPr>
-        <p:txBody>
-          <a:bodyPr anchor="b"/>
+            <a:off x="6412362" y="2023003"/>
+            <a:ext cx="4645152" cy="802237"/>
+          </a:xfrm>
+        </p:spPr>
+        <p:txBody>
+          <a:bodyPr anchor="b">
+            <a:normAutofit/>
+          </a:bodyPr>
           <a:lstStyle>
             <a:lvl1pPr marL="0" indent="0">
-              <a:buNone/>
-              <a:defRPr sz="2400" b="1"/>
+              <a:lnSpc>
+                <a:spcPct val="100000"/>
+              </a:lnSpc>
+              <a:buNone/>
+              <a:defRPr sz="2200" b="0" cap="all" baseline="0">
+                <a:solidFill>
+                  <a:schemeClr val="accent1"/>
+                </a:solidFill>
+              </a:defRPr>
             </a:lvl1pPr>
             <a:lvl2pPr marL="457200" indent="0">
               <a:buNone/>
@@ -2436,13 +2562,7 @@
       </p:sp>
       <p:sp>
         <p:nvSpPr>
-          <p:cNvPr id="6" name="Content Placeholder 5">
-            <a:extLst>
-              <a:ext uri="{FF2B5EF4-FFF2-40B4-BE49-F238E27FC236}">
-                <a16:creationId xmlns:a16="http://schemas.microsoft.com/office/drawing/2014/main" xmlns="" id="{7E74E4B1-E31D-464A-BF8D-D199C6E3FF67}"/>
-              </a:ext>
-            </a:extLst>
-          </p:cNvPr>
+          <p:cNvPr id="6" name="Content Placeholder 5"/>
           <p:cNvSpPr>
             <a:spLocks noGrp="1"/>
           </p:cNvSpPr>
@@ -2452,8 +2572,8 @@
         </p:nvSpPr>
         <p:spPr>
           <a:xfrm>
-            <a:off x="6172200" y="2505075"/>
-            <a:ext cx="5183188" cy="3684588"/>
+            <a:off x="6412362" y="2821491"/>
+            <a:ext cx="4645152" cy="2637371"/>
           </a:xfrm>
         </p:spPr>
         <p:txBody>
@@ -2493,18 +2613,13 @@
               <a:rPr lang="en-US"/>
               <a:t>Fifth level</a:t>
             </a:r>
-          </a:p>
-        </p:txBody>
-      </p:sp>
-      <p:sp>
-        <p:nvSpPr>
-          <p:cNvPr id="7" name="Date Placeholder 6">
-            <a:extLst>
-              <a:ext uri="{FF2B5EF4-FFF2-40B4-BE49-F238E27FC236}">
-                <a16:creationId xmlns:a16="http://schemas.microsoft.com/office/drawing/2014/main" xmlns="" id="{44F33DEC-9AA2-4AD2-A98A-D9C8C11F9A04}"/>
-              </a:ext>
-            </a:extLst>
-          </p:cNvPr>
+            <a:endParaRPr lang="en-US" dirty="0"/>
+          </a:p>
+        </p:txBody>
+      </p:sp>
+      <p:sp>
+        <p:nvSpPr>
+          <p:cNvPr id="7" name="Date Placeholder 6"/>
           <p:cNvSpPr>
             <a:spLocks noGrp="1"/>
           </p:cNvSpPr>
@@ -2527,13 +2642,7 @@
       </p:sp>
       <p:sp>
         <p:nvSpPr>
-          <p:cNvPr id="8" name="Footer Placeholder 7">
-            <a:extLst>
-              <a:ext uri="{FF2B5EF4-FFF2-40B4-BE49-F238E27FC236}">
-                <a16:creationId xmlns:a16="http://schemas.microsoft.com/office/drawing/2014/main" xmlns="" id="{03D549D3-DD69-4532-A674-41130A066FD4}"/>
-              </a:ext>
-            </a:extLst>
-          </p:cNvPr>
+          <p:cNvPr id="8" name="Footer Placeholder 7"/>
           <p:cNvSpPr>
             <a:spLocks noGrp="1"/>
           </p:cNvSpPr>
@@ -2552,13 +2661,7 @@
       </p:sp>
       <p:sp>
         <p:nvSpPr>
-          <p:cNvPr id="9" name="Slide Number Placeholder 8">
-            <a:extLst>
-              <a:ext uri="{FF2B5EF4-FFF2-40B4-BE49-F238E27FC236}">
-                <a16:creationId xmlns:a16="http://schemas.microsoft.com/office/drawing/2014/main" xmlns="" id="{9A34ABDF-8465-4828-9575-719E2A621D4F}"/>
-              </a:ext>
-            </a:extLst>
-          </p:cNvPr>
+          <p:cNvPr id="9" name="Slide Number Placeholder 8"/>
           <p:cNvSpPr>
             <a:spLocks noGrp="1"/>
           </p:cNvSpPr>
@@ -2579,10 +2682,41 @@
           </a:p>
         </p:txBody>
       </p:sp>
+      <p:cxnSp>
+        <p:nvCxnSpPr>
+          <p:cNvPr id="29" name="Straight Connector 28"/>
+          <p:cNvCxnSpPr/>
+          <p:nvPr/>
+        </p:nvCxnSpPr>
+        <p:spPr>
+          <a:xfrm>
+            <a:off x="1453896" y="1847088"/>
+            <a:ext cx="9607522" cy="0"/>
+          </a:xfrm>
+          <a:prstGeom prst="line">
+            <a:avLst/>
+          </a:prstGeom>
+          <a:ln w="31750"/>
+        </p:spPr>
+        <p:style>
+          <a:lnRef idx="3">
+            <a:schemeClr val="accent1"/>
+          </a:lnRef>
+          <a:fillRef idx="0">
+            <a:schemeClr val="accent1"/>
+          </a:fillRef>
+          <a:effectRef idx="2">
+            <a:schemeClr val="accent1"/>
+          </a:effectRef>
+          <a:fontRef idx="minor">
+            <a:schemeClr val="tx1"/>
+          </a:fontRef>
+        </p:style>
+      </p:cxnSp>
     </p:spTree>
     <p:extLst>
       <p:ext uri="{BB962C8B-B14F-4D97-AF65-F5344CB8AC3E}">
-        <p14:creationId xmlns:p14="http://schemas.microsoft.com/office/powerpoint/2010/main" val="953586180"/>
+        <p14:creationId xmlns:p14="http://schemas.microsoft.com/office/powerpoint/2010/main" val="439151884"/>
       </p:ext>
     </p:extLst>
   </p:cSld>
@@ -2611,13 +2745,7 @@
       </p:grpSpPr>
       <p:sp>
         <p:nvSpPr>
-          <p:cNvPr id="2" name="Title 1">
-            <a:extLst>
-              <a:ext uri="{FF2B5EF4-FFF2-40B4-BE49-F238E27FC236}">
-                <a16:creationId xmlns:a16="http://schemas.microsoft.com/office/drawing/2014/main" xmlns="" id="{820B9EAF-4057-4C2F-B550-818C2A326941}"/>
-              </a:ext>
-            </a:extLst>
-          </p:cNvPr>
+          <p:cNvPr id="2" name="Title 1"/>
           <p:cNvSpPr>
             <a:spLocks noGrp="1"/>
           </p:cNvSpPr>
@@ -2634,18 +2762,13 @@
               <a:rPr lang="en-US"/>
               <a:t>Click to edit Master title style</a:t>
             </a:r>
-          </a:p>
-        </p:txBody>
-      </p:sp>
-      <p:sp>
-        <p:nvSpPr>
-          <p:cNvPr id="3" name="Date Placeholder 2">
-            <a:extLst>
-              <a:ext uri="{FF2B5EF4-FFF2-40B4-BE49-F238E27FC236}">
-                <a16:creationId xmlns:a16="http://schemas.microsoft.com/office/drawing/2014/main" xmlns="" id="{AB0F8921-3296-4437-A9B6-92E106498035}"/>
-              </a:ext>
-            </a:extLst>
-          </p:cNvPr>
+            <a:endParaRPr lang="en-US" dirty="0"/>
+          </a:p>
+        </p:txBody>
+      </p:sp>
+      <p:sp>
+        <p:nvSpPr>
+          <p:cNvPr id="3" name="Date Placeholder 2"/>
           <p:cNvSpPr>
             <a:spLocks noGrp="1"/>
           </p:cNvSpPr>
@@ -2668,13 +2791,7 @@
       </p:sp>
       <p:sp>
         <p:nvSpPr>
-          <p:cNvPr id="4" name="Footer Placeholder 3">
-            <a:extLst>
-              <a:ext uri="{FF2B5EF4-FFF2-40B4-BE49-F238E27FC236}">
-                <a16:creationId xmlns:a16="http://schemas.microsoft.com/office/drawing/2014/main" xmlns="" id="{89352DD9-33CE-4DBC-9C7A-6DC7F4757B7D}"/>
-              </a:ext>
-            </a:extLst>
-          </p:cNvPr>
+          <p:cNvPr id="4" name="Footer Placeholder 3"/>
           <p:cNvSpPr>
             <a:spLocks noGrp="1"/>
           </p:cNvSpPr>
@@ -2693,13 +2810,7 @@
       </p:sp>
       <p:sp>
         <p:nvSpPr>
-          <p:cNvPr id="5" name="Slide Number Placeholder 4">
-            <a:extLst>
-              <a:ext uri="{FF2B5EF4-FFF2-40B4-BE49-F238E27FC236}">
-                <a16:creationId xmlns:a16="http://schemas.microsoft.com/office/drawing/2014/main" xmlns="" id="{CF8E8A97-34F9-434E-A1E4-2223E83E36CC}"/>
-              </a:ext>
-            </a:extLst>
-          </p:cNvPr>
+          <p:cNvPr id="5" name="Slide Number Placeholder 4"/>
           <p:cNvSpPr>
             <a:spLocks noGrp="1"/>
           </p:cNvSpPr>
@@ -2720,10 +2831,41 @@
           </a:p>
         </p:txBody>
       </p:sp>
+      <p:cxnSp>
+        <p:nvCxnSpPr>
+          <p:cNvPr id="25" name="Straight Connector 24"/>
+          <p:cNvCxnSpPr/>
+          <p:nvPr/>
+        </p:nvCxnSpPr>
+        <p:spPr>
+          <a:xfrm>
+            <a:off x="1453896" y="1847088"/>
+            <a:ext cx="9607522" cy="0"/>
+          </a:xfrm>
+          <a:prstGeom prst="line">
+            <a:avLst/>
+          </a:prstGeom>
+          <a:ln w="31750"/>
+        </p:spPr>
+        <p:style>
+          <a:lnRef idx="3">
+            <a:schemeClr val="accent1"/>
+          </a:lnRef>
+          <a:fillRef idx="0">
+            <a:schemeClr val="accent1"/>
+          </a:fillRef>
+          <a:effectRef idx="2">
+            <a:schemeClr val="accent1"/>
+          </a:effectRef>
+          <a:fontRef idx="minor">
+            <a:schemeClr val="tx1"/>
+          </a:fontRef>
+        </p:style>
+      </p:cxnSp>
     </p:spTree>
     <p:extLst>
       <p:ext uri="{BB962C8B-B14F-4D97-AF65-F5344CB8AC3E}">
-        <p14:creationId xmlns:p14="http://schemas.microsoft.com/office/powerpoint/2010/main" val="1627026714"/>
+        <p14:creationId xmlns:p14="http://schemas.microsoft.com/office/powerpoint/2010/main" val="108174886"/>
       </p:ext>
     </p:extLst>
   </p:cSld>
@@ -2752,13 +2894,7 @@
       </p:grpSpPr>
       <p:sp>
         <p:nvSpPr>
-          <p:cNvPr id="2" name="Date Placeholder 1">
-            <a:extLst>
-              <a:ext uri="{FF2B5EF4-FFF2-40B4-BE49-F238E27FC236}">
-                <a16:creationId xmlns:a16="http://schemas.microsoft.com/office/drawing/2014/main" xmlns="" id="{B3A01A4B-C80E-48FD-A795-48181E076E33}"/>
-              </a:ext>
-            </a:extLst>
-          </p:cNvPr>
+          <p:cNvPr id="2" name="Date Placeholder 1"/>
           <p:cNvSpPr>
             <a:spLocks noGrp="1"/>
           </p:cNvSpPr>
@@ -2781,13 +2917,7 @@
       </p:sp>
       <p:sp>
         <p:nvSpPr>
-          <p:cNvPr id="3" name="Footer Placeholder 2">
-            <a:extLst>
-              <a:ext uri="{FF2B5EF4-FFF2-40B4-BE49-F238E27FC236}">
-                <a16:creationId xmlns:a16="http://schemas.microsoft.com/office/drawing/2014/main" xmlns="" id="{71186BBE-6583-4C0E-87CA-96E661012A4F}"/>
-              </a:ext>
-            </a:extLst>
-          </p:cNvPr>
+          <p:cNvPr id="3" name="Footer Placeholder 2"/>
           <p:cNvSpPr>
             <a:spLocks noGrp="1"/>
           </p:cNvSpPr>
@@ -2806,13 +2936,7 @@
       </p:sp>
       <p:sp>
         <p:nvSpPr>
-          <p:cNvPr id="4" name="Slide Number Placeholder 3">
-            <a:extLst>
-              <a:ext uri="{FF2B5EF4-FFF2-40B4-BE49-F238E27FC236}">
-                <a16:creationId xmlns:a16="http://schemas.microsoft.com/office/drawing/2014/main" xmlns="" id="{AAC50512-00B0-44EC-998B-04EE70899241}"/>
-              </a:ext>
-            </a:extLst>
-          </p:cNvPr>
+          <p:cNvPr id="4" name="Slide Number Placeholder 3"/>
           <p:cNvSpPr>
             <a:spLocks noGrp="1"/>
           </p:cNvSpPr>
@@ -2836,7 +2960,7 @@
     </p:spTree>
     <p:extLst>
       <p:ext uri="{BB962C8B-B14F-4D97-AF65-F5344CB8AC3E}">
-        <p14:creationId xmlns:p14="http://schemas.microsoft.com/office/powerpoint/2010/main" val="2446405186"/>
+        <p14:creationId xmlns:p14="http://schemas.microsoft.com/office/powerpoint/2010/main" val="902148056"/>
       </p:ext>
     </p:extLst>
   </p:cSld>
@@ -2865,13 +2989,7 @@
       </p:grpSpPr>
       <p:sp>
         <p:nvSpPr>
-          <p:cNvPr id="2" name="Title 1">
-            <a:extLst>
-              <a:ext uri="{FF2B5EF4-FFF2-40B4-BE49-F238E27FC236}">
-                <a16:creationId xmlns:a16="http://schemas.microsoft.com/office/drawing/2014/main" xmlns="" id="{B8A85D98-B584-45BB-B644-28516DFC5F24}"/>
-              </a:ext>
-            </a:extLst>
-          </p:cNvPr>
+          <p:cNvPr id="2" name="Title 1"/>
           <p:cNvSpPr>
             <a:spLocks noGrp="1"/>
           </p:cNvSpPr>
@@ -2881,15 +2999,17 @@
         </p:nvSpPr>
         <p:spPr>
           <a:xfrm>
-            <a:off x="839788" y="457200"/>
-            <a:ext cx="3932237" cy="1600200"/>
-          </a:xfrm>
-        </p:spPr>
-        <p:txBody>
-          <a:bodyPr anchor="b"/>
+            <a:off x="1444671" y="798973"/>
+            <a:ext cx="3273099" cy="2247117"/>
+          </a:xfrm>
+        </p:spPr>
+        <p:txBody>
+          <a:bodyPr anchor="b">
+            <a:normAutofit/>
+          </a:bodyPr>
           <a:lstStyle>
-            <a:lvl1pPr>
-              <a:defRPr sz="3200"/>
+            <a:lvl1pPr algn="l">
+              <a:defRPr sz="2400"/>
             </a:lvl1pPr>
           </a:lstStyle>
           <a:p>
@@ -2897,18 +3017,13 @@
               <a:rPr lang="en-US"/>
               <a:t>Click to edit Master title style</a:t>
             </a:r>
-          </a:p>
-        </p:txBody>
-      </p:sp>
-      <p:sp>
-        <p:nvSpPr>
-          <p:cNvPr id="3" name="Content Placeholder 2">
-            <a:extLst>
-              <a:ext uri="{FF2B5EF4-FFF2-40B4-BE49-F238E27FC236}">
-                <a16:creationId xmlns:a16="http://schemas.microsoft.com/office/drawing/2014/main" xmlns="" id="{48E1196B-80DE-458F-B38A-7E6A17EA41A2}"/>
-              </a:ext>
-            </a:extLst>
-          </p:cNvPr>
+            <a:endParaRPr lang="en-US" dirty="0"/>
+          </a:p>
+        </p:txBody>
+      </p:sp>
+      <p:sp>
+        <p:nvSpPr>
+          <p:cNvPr id="3" name="Content Placeholder 2"/>
           <p:cNvSpPr>
             <a:spLocks noGrp="1"/>
           </p:cNvSpPr>
@@ -2918,104 +3033,71 @@
         </p:nvSpPr>
         <p:spPr>
           <a:xfrm>
-            <a:off x="5183188" y="987425"/>
-            <a:ext cx="6172200" cy="4873625"/>
+            <a:off x="5043714" y="798974"/>
+            <a:ext cx="6012470" cy="4658826"/>
+          </a:xfrm>
+        </p:spPr>
+        <p:txBody>
+          <a:bodyPr anchor="ctr"/>
+          <a:lstStyle/>
+          <a:p>
+            <a:pPr lvl="0"/>
+            <a:r>
+              <a:rPr lang="en-US"/>
+              <a:t>Edit Master text styles</a:t>
+            </a:r>
+          </a:p>
+          <a:p>
+            <a:pPr lvl="1"/>
+            <a:r>
+              <a:rPr lang="en-US"/>
+              <a:t>Second level</a:t>
+            </a:r>
+          </a:p>
+          <a:p>
+            <a:pPr lvl="2"/>
+            <a:r>
+              <a:rPr lang="en-US"/>
+              <a:t>Third level</a:t>
+            </a:r>
+          </a:p>
+          <a:p>
+            <a:pPr lvl="3"/>
+            <a:r>
+              <a:rPr lang="en-US"/>
+              <a:t>Fourth level</a:t>
+            </a:r>
+          </a:p>
+          <a:p>
+            <a:pPr lvl="4"/>
+            <a:r>
+              <a:rPr lang="en-US"/>
+              <a:t>Fifth level</a:t>
+            </a:r>
+            <a:endParaRPr lang="en-US" dirty="0"/>
+          </a:p>
+        </p:txBody>
+      </p:sp>
+      <p:sp>
+        <p:nvSpPr>
+          <p:cNvPr id="4" name="Text Placeholder 3"/>
+          <p:cNvSpPr>
+            <a:spLocks noGrp="1"/>
+          </p:cNvSpPr>
+          <p:nvPr>
+            <p:ph type="body" sz="half" idx="2"/>
+          </p:nvPr>
+        </p:nvSpPr>
+        <p:spPr>
+          <a:xfrm>
+            <a:off x="1444671" y="3205491"/>
+            <a:ext cx="3275013" cy="2248181"/>
           </a:xfrm>
         </p:spPr>
         <p:txBody>
           <a:bodyPr/>
           <a:lstStyle>
-            <a:lvl1pPr>
-              <a:defRPr sz="3200"/>
-            </a:lvl1pPr>
-            <a:lvl2pPr>
-              <a:defRPr sz="2800"/>
-            </a:lvl2pPr>
-            <a:lvl3pPr>
-              <a:defRPr sz="2400"/>
-            </a:lvl3pPr>
-            <a:lvl4pPr>
-              <a:defRPr sz="2000"/>
-            </a:lvl4pPr>
-            <a:lvl5pPr>
-              <a:defRPr sz="2000"/>
-            </a:lvl5pPr>
-            <a:lvl6pPr>
-              <a:defRPr sz="2000"/>
-            </a:lvl6pPr>
-            <a:lvl7pPr>
-              <a:defRPr sz="2000"/>
-            </a:lvl7pPr>
-            <a:lvl8pPr>
-              <a:defRPr sz="2000"/>
-            </a:lvl8pPr>
-            <a:lvl9pPr>
-              <a:defRPr sz="2000"/>
-            </a:lvl9pPr>
-          </a:lstStyle>
-          <a:p>
-            <a:pPr lvl="0"/>
-            <a:r>
-              <a:rPr lang="en-US"/>
-              <a:t>Edit Master text styles</a:t>
-            </a:r>
-          </a:p>
-          <a:p>
-            <a:pPr lvl="1"/>
-            <a:r>
-              <a:rPr lang="en-US"/>
-              <a:t>Second level</a:t>
-            </a:r>
-          </a:p>
-          <a:p>
-            <a:pPr lvl="2"/>
-            <a:r>
-              <a:rPr lang="en-US"/>
-              <a:t>Third level</a:t>
-            </a:r>
-          </a:p>
-          <a:p>
-            <a:pPr lvl="3"/>
-            <a:r>
-              <a:rPr lang="en-US"/>
-              <a:t>Fourth level</a:t>
-            </a:r>
-          </a:p>
-          <a:p>
-            <a:pPr lvl="4"/>
-            <a:r>
-              <a:rPr lang="en-US"/>
-              <a:t>Fifth level</a:t>
-            </a:r>
-          </a:p>
-        </p:txBody>
-      </p:sp>
-      <p:sp>
-        <p:nvSpPr>
-          <p:cNvPr id="4" name="Text Placeholder 3">
-            <a:extLst>
-              <a:ext uri="{FF2B5EF4-FFF2-40B4-BE49-F238E27FC236}">
-                <a16:creationId xmlns:a16="http://schemas.microsoft.com/office/drawing/2014/main" xmlns="" id="{29EBA1D3-2BD4-470F-853A-B692757497D3}"/>
-              </a:ext>
-            </a:extLst>
-          </p:cNvPr>
-          <p:cNvSpPr>
-            <a:spLocks noGrp="1"/>
-          </p:cNvSpPr>
-          <p:nvPr>
-            <p:ph type="body" sz="half" idx="2"/>
-          </p:nvPr>
-        </p:nvSpPr>
-        <p:spPr>
-          <a:xfrm>
-            <a:off x="839788" y="2057400"/>
-            <a:ext cx="3932237" cy="3811588"/>
-          </a:xfrm>
-        </p:spPr>
-        <p:txBody>
-          <a:bodyPr/>
-          <a:lstStyle>
-            <a:lvl1pPr marL="0" indent="0">
+            <a:lvl1pPr marL="0" indent="0" algn="l">
               <a:buNone/>
               <a:defRPr sz="1600"/>
             </a:lvl1pPr>
@@ -3063,13 +3145,7 @@
       </p:sp>
       <p:sp>
         <p:nvSpPr>
-          <p:cNvPr id="5" name="Date Placeholder 4">
-            <a:extLst>
-              <a:ext uri="{FF2B5EF4-FFF2-40B4-BE49-F238E27FC236}">
-                <a16:creationId xmlns:a16="http://schemas.microsoft.com/office/drawing/2014/main" xmlns="" id="{14577CA2-E57C-4617-BB10-F877DB3B980E}"/>
-              </a:ext>
-            </a:extLst>
-          </p:cNvPr>
+          <p:cNvPr id="5" name="Date Placeholder 4"/>
           <p:cNvSpPr>
             <a:spLocks noGrp="1"/>
           </p:cNvSpPr>
@@ -3092,13 +3168,7 @@
       </p:sp>
       <p:sp>
         <p:nvSpPr>
-          <p:cNvPr id="6" name="Footer Placeholder 5">
-            <a:extLst>
-              <a:ext uri="{FF2B5EF4-FFF2-40B4-BE49-F238E27FC236}">
-                <a16:creationId xmlns:a16="http://schemas.microsoft.com/office/drawing/2014/main" xmlns="" id="{81D6E0D4-5BDE-4A1F-B478-25C44BC80371}"/>
-              </a:ext>
-            </a:extLst>
-          </p:cNvPr>
+          <p:cNvPr id="6" name="Footer Placeholder 5"/>
           <p:cNvSpPr>
             <a:spLocks noGrp="1"/>
           </p:cNvSpPr>
@@ -3117,13 +3187,7 @@
       </p:sp>
       <p:sp>
         <p:nvSpPr>
-          <p:cNvPr id="7" name="Slide Number Placeholder 6">
-            <a:extLst>
-              <a:ext uri="{FF2B5EF4-FFF2-40B4-BE49-F238E27FC236}">
-                <a16:creationId xmlns:a16="http://schemas.microsoft.com/office/drawing/2014/main" xmlns="" id="{499DFC39-825C-4B65-A272-5E4AEAAF1FBF}"/>
-              </a:ext>
-            </a:extLst>
-          </p:cNvPr>
+          <p:cNvPr id="7" name="Slide Number Placeholder 6"/>
           <p:cNvSpPr>
             <a:spLocks noGrp="1"/>
           </p:cNvSpPr>
@@ -3144,10 +3208,41 @@
           </a:p>
         </p:txBody>
       </p:sp>
+      <p:cxnSp>
+        <p:nvCxnSpPr>
+          <p:cNvPr id="17" name="Straight Connector 16"/>
+          <p:cNvCxnSpPr/>
+          <p:nvPr/>
+        </p:nvCxnSpPr>
+        <p:spPr>
+          <a:xfrm>
+            <a:off x="1448280" y="3205491"/>
+            <a:ext cx="3269490" cy="0"/>
+          </a:xfrm>
+          <a:prstGeom prst="line">
+            <a:avLst/>
+          </a:prstGeom>
+          <a:ln w="31750"/>
+        </p:spPr>
+        <p:style>
+          <a:lnRef idx="3">
+            <a:schemeClr val="accent1"/>
+          </a:lnRef>
+          <a:fillRef idx="0">
+            <a:schemeClr val="accent1"/>
+          </a:fillRef>
+          <a:effectRef idx="2">
+            <a:schemeClr val="accent1"/>
+          </a:effectRef>
+          <a:fontRef idx="minor">
+            <a:schemeClr val="tx1"/>
+          </a:fontRef>
+        </p:style>
+      </p:cxnSp>
     </p:spTree>
     <p:extLst>
       <p:ext uri="{BB962C8B-B14F-4D97-AF65-F5344CB8AC3E}">
-        <p14:creationId xmlns:p14="http://schemas.microsoft.com/office/powerpoint/2010/main" val="3417693063"/>
+        <p14:creationId xmlns:p14="http://schemas.microsoft.com/office/powerpoint/2010/main" val="939029148"/>
       </p:ext>
     </p:extLst>
   </p:cSld>
@@ -3174,15 +3269,143 @@
           <a:chExt cx="0" cy="0"/>
         </a:xfrm>
       </p:grpSpPr>
-      <p:sp>
-        <p:nvSpPr>
-          <p:cNvPr id="2" name="Title 1">
-            <a:extLst>
-              <a:ext uri="{FF2B5EF4-FFF2-40B4-BE49-F238E27FC236}">
-                <a16:creationId xmlns:a16="http://schemas.microsoft.com/office/drawing/2014/main" xmlns="" id="{17778804-800D-4200-9DC6-C3FB8C10011E}"/>
-              </a:ext>
-            </a:extLst>
-          </p:cNvPr>
+      <p:grpSp>
+        <p:nvGrpSpPr>
+          <p:cNvPr id="8" name="Group 7"/>
+          <p:cNvGrpSpPr/>
+          <p:nvPr/>
+        </p:nvGrpSpPr>
+        <p:grpSpPr>
+          <a:xfrm>
+            <a:off x="7477387" y="482170"/>
+            <a:ext cx="4074533" cy="5149101"/>
+            <a:chOff x="7477387" y="482170"/>
+            <a:chExt cx="4074533" cy="5149101"/>
+          </a:xfrm>
+        </p:grpSpPr>
+        <p:sp>
+          <p:nvSpPr>
+            <p:cNvPr id="18" name="Rectangle 17"/>
+            <p:cNvSpPr/>
+            <p:nvPr/>
+          </p:nvSpPr>
+          <p:spPr bwMode="black">
+            <a:xfrm>
+              <a:off x="7477387" y="482170"/>
+              <a:ext cx="4074533" cy="5149101"/>
+            </a:xfrm>
+            <a:prstGeom prst="rect">
+              <a:avLst/>
+            </a:prstGeom>
+            <a:gradFill>
+              <a:gsLst>
+                <a:gs pos="0">
+                  <a:srgbClr val="000001"/>
+                </a:gs>
+                <a:gs pos="100000">
+                  <a:srgbClr val="191919"/>
+                </a:gs>
+              </a:gsLst>
+            </a:gradFill>
+            <a:ln w="76200" cmpd="sng">
+              <a:noFill/>
+              <a:miter lim="800000"/>
+            </a:ln>
+            <a:effectLst>
+              <a:outerShdw blurRad="127000" dist="228600" dir="4740000" sx="98000" sy="98000" algn="tl" rotWithShape="0">
+                <a:srgbClr val="000000">
+                  <a:alpha val="34000"/>
+                </a:srgbClr>
+              </a:outerShdw>
+            </a:effectLst>
+            <a:scene3d>
+              <a:camera prst="orthographicFront"/>
+              <a:lightRig rig="threePt" dir="t"/>
+            </a:scene3d>
+            <a:sp3d>
+              <a:bevelT w="152400" h="50800" prst="softRound"/>
+            </a:sp3d>
+          </p:spPr>
+          <p:style>
+            <a:lnRef idx="1">
+              <a:schemeClr val="accent1"/>
+            </a:lnRef>
+            <a:fillRef idx="3">
+              <a:schemeClr val="accent1"/>
+            </a:fillRef>
+            <a:effectRef idx="2">
+              <a:schemeClr val="accent1"/>
+            </a:effectRef>
+            <a:fontRef idx="minor">
+              <a:schemeClr val="lt1"/>
+            </a:fontRef>
+          </p:style>
+        </p:sp>
+        <p:sp>
+          <p:nvSpPr>
+            <p:cNvPr id="19" name="Rectangle 18"/>
+            <p:cNvSpPr/>
+            <p:nvPr/>
+          </p:nvSpPr>
+          <p:spPr bwMode="blackWhite">
+            <a:xfrm>
+              <a:off x="7790446" y="812506"/>
+              <a:ext cx="3450289" cy="4466452"/>
+            </a:xfrm>
+            <a:prstGeom prst="rect">
+              <a:avLst/>
+            </a:prstGeom>
+            <a:gradFill>
+              <a:gsLst>
+                <a:gs pos="0">
+                  <a:srgbClr val="DADADA"/>
+                </a:gs>
+                <a:gs pos="100000">
+                  <a:srgbClr val="FFFFFE"/>
+                </a:gs>
+              </a:gsLst>
+              <a:lin ang="16200000" scaled="0"/>
+            </a:gradFill>
+            <a:ln w="50800" cmpd="sng">
+              <a:solidFill>
+                <a:srgbClr val="191919"/>
+              </a:solidFill>
+              <a:miter lim="800000"/>
+            </a:ln>
+            <a:effectLst>
+              <a:innerShdw blurRad="63500" dist="88900" dir="14100000">
+                <a:srgbClr val="000000">
+                  <a:alpha val="30000"/>
+                </a:srgbClr>
+              </a:innerShdw>
+            </a:effectLst>
+            <a:scene3d>
+              <a:camera prst="orthographicFront"/>
+              <a:lightRig rig="threePt" dir="t"/>
+            </a:scene3d>
+            <a:sp3d>
+              <a:bevelT prst="relaxedInset"/>
+            </a:sp3d>
+          </p:spPr>
+          <p:style>
+            <a:lnRef idx="1">
+              <a:schemeClr val="accent1"/>
+            </a:lnRef>
+            <a:fillRef idx="3">
+              <a:schemeClr val="accent1"/>
+            </a:fillRef>
+            <a:effectRef idx="2">
+              <a:schemeClr val="accent1"/>
+            </a:effectRef>
+            <a:fontRef idx="minor">
+              <a:schemeClr val="lt1"/>
+            </a:fontRef>
+          </p:style>
+        </p:sp>
+      </p:grpSp>
+      <p:sp>
+        <p:nvSpPr>
+          <p:cNvPr id="2" name="Title 1"/>
           <p:cNvSpPr>
             <a:spLocks noGrp="1"/>
           </p:cNvSpPr>
@@ -3192,12 +3415,14 @@
         </p:nvSpPr>
         <p:spPr>
           <a:xfrm>
-            <a:off x="839788" y="457200"/>
-            <a:ext cx="3932237" cy="1600200"/>
-          </a:xfrm>
-        </p:spPr>
-        <p:txBody>
-          <a:bodyPr anchor="b"/>
+            <a:off x="1451206" y="1129513"/>
+            <a:ext cx="5532328" cy="1830584"/>
+          </a:xfrm>
+        </p:spPr>
+        <p:txBody>
+          <a:bodyPr anchor="b">
+            <a:normAutofit/>
+          </a:bodyPr>
           <a:lstStyle>
             <a:lvl1pPr>
               <a:defRPr sz="3200"/>
@@ -3208,20 +3433,15 @@
               <a:rPr lang="en-US"/>
               <a:t>Click to edit Master title style</a:t>
             </a:r>
-          </a:p>
-        </p:txBody>
-      </p:sp>
-      <p:sp>
-        <p:nvSpPr>
-          <p:cNvPr id="3" name="Picture Placeholder 2">
-            <a:extLst>
-              <a:ext uri="{FF2B5EF4-FFF2-40B4-BE49-F238E27FC236}">
-                <a16:creationId xmlns:a16="http://schemas.microsoft.com/office/drawing/2014/main" xmlns="" id="{41945219-52D1-4AA4-A533-1FD54935EFCC}"/>
-              </a:ext>
-            </a:extLst>
-          </p:cNvPr>
-          <p:cNvSpPr>
-            <a:spLocks noGrp="1"/>
+            <a:endParaRPr lang="en-US" dirty="0"/>
+          </a:p>
+        </p:txBody>
+      </p:sp>
+      <p:sp>
+        <p:nvSpPr>
+          <p:cNvPr id="3" name="Picture Placeholder 2"/>
+          <p:cNvSpPr>
+            <a:spLocks noGrp="1" noChangeAspect="1"/>
           </p:cNvSpPr>
           <p:nvPr>
             <p:ph type="pic" idx="1"/>
@@ -3229,14 +3449,24 @@
         </p:nvSpPr>
         <p:spPr>
           <a:xfrm>
-            <a:off x="5183188" y="987425"/>
-            <a:ext cx="6172200" cy="4873625"/>
-          </a:xfrm>
-        </p:spPr>
-        <p:txBody>
-          <a:bodyPr/>
+            <a:off x="8124389" y="1122542"/>
+            <a:ext cx="2791171" cy="3866327"/>
+          </a:xfrm>
+          <a:solidFill>
+            <a:schemeClr val="bg1">
+              <a:lumMod val="85000"/>
+            </a:schemeClr>
+          </a:solidFill>
+          <a:ln w="9525" cap="sq">
+            <a:noFill/>
+            <a:miter lim="800000"/>
+          </a:ln>
+          <a:effectLst/>
+        </p:spPr>
+        <p:txBody>
+          <a:bodyPr anchor="t"/>
           <a:lstStyle>
-            <a:lvl1pPr marL="0" indent="0">
+            <a:lvl1pPr marL="0" indent="0" algn="ctr">
               <a:buNone/>
               <a:defRPr sz="3200"/>
             </a:lvl1pPr>
@@ -3274,19 +3504,17 @@
             </a:lvl9pPr>
           </a:lstStyle>
           <a:p>
-            <a:endParaRPr lang="en-US"/>
-          </a:p>
-        </p:txBody>
-      </p:sp>
-      <p:sp>
-        <p:nvSpPr>
-          <p:cNvPr id="4" name="Text Placeholder 3">
-            <a:extLst>
-              <a:ext uri="{FF2B5EF4-FFF2-40B4-BE49-F238E27FC236}">
-                <a16:creationId xmlns:a16="http://schemas.microsoft.com/office/drawing/2014/main" xmlns="" id="{5C567563-D1CB-4342-A63B-F90DECA516F6}"/>
-              </a:ext>
-            </a:extLst>
-          </p:cNvPr>
+            <a:r>
+              <a:rPr lang="en-US"/>
+              <a:t>Click icon to add picture</a:t>
+            </a:r>
+            <a:endParaRPr lang="en-US" dirty="0"/>
+          </a:p>
+        </p:txBody>
+      </p:sp>
+      <p:sp>
+        <p:nvSpPr>
+          <p:cNvPr id="4" name="Text Placeholder 3"/>
           <p:cNvSpPr>
             <a:spLocks noGrp="1"/>
           </p:cNvSpPr>
@@ -3296,16 +3524,18 @@
         </p:nvSpPr>
         <p:spPr>
           <a:xfrm>
-            <a:off x="839788" y="2057400"/>
-            <a:ext cx="3932237" cy="3811588"/>
-          </a:xfrm>
-        </p:spPr>
-        <p:txBody>
-          <a:bodyPr/>
+            <a:off x="1450329" y="3145992"/>
+            <a:ext cx="5524404" cy="2003742"/>
+          </a:xfrm>
+        </p:spPr>
+        <p:txBody>
+          <a:bodyPr>
+            <a:normAutofit/>
+          </a:bodyPr>
           <a:lstStyle>
-            <a:lvl1pPr marL="0" indent="0">
-              <a:buNone/>
-              <a:defRPr sz="1600"/>
+            <a:lvl1pPr marL="0" indent="0" algn="l">
+              <a:buNone/>
+              <a:defRPr sz="1800"/>
             </a:lvl1pPr>
             <a:lvl2pPr marL="457200" indent="0">
               <a:buNone/>
@@ -3351,13 +3581,7 @@
       </p:sp>
       <p:sp>
         <p:nvSpPr>
-          <p:cNvPr id="5" name="Date Placeholder 4">
-            <a:extLst>
-              <a:ext uri="{FF2B5EF4-FFF2-40B4-BE49-F238E27FC236}">
-                <a16:creationId xmlns:a16="http://schemas.microsoft.com/office/drawing/2014/main" xmlns="" id="{EB903004-CFA4-4AA9-A6C9-E81F7196933C}"/>
-              </a:ext>
-            </a:extLst>
-          </p:cNvPr>
+          <p:cNvPr id="5" name="Date Placeholder 4"/>
           <p:cNvSpPr>
             <a:spLocks noGrp="1"/>
           </p:cNvSpPr>
@@ -3365,10 +3589,19 @@
             <p:ph type="dt" sz="half" idx="10"/>
           </p:nvPr>
         </p:nvSpPr>
-        <p:spPr/>
-        <p:txBody>
-          <a:bodyPr/>
-          <a:lstStyle/>
+        <p:spPr>
+          <a:xfrm>
+            <a:off x="1447382" y="5469856"/>
+            <a:ext cx="5527351" cy="320123"/>
+          </a:xfrm>
+        </p:spPr>
+        <p:txBody>
+          <a:bodyPr/>
+          <a:lstStyle>
+            <a:lvl1pPr algn="l">
+              <a:defRPr/>
+            </a:lvl1pPr>
+          </a:lstStyle>
           <a:p>
             <a:fld id="{F5419309-CD7D-4A31-A808-F6632611B59D}" type="datetimeFigureOut">
               <a:rPr lang="en-US" smtClean="0"/>
@@ -3380,13 +3613,7 @@
       </p:sp>
       <p:sp>
         <p:nvSpPr>
-          <p:cNvPr id="6" name="Footer Placeholder 5">
-            <a:extLst>
-              <a:ext uri="{FF2B5EF4-FFF2-40B4-BE49-F238E27FC236}">
-                <a16:creationId xmlns:a16="http://schemas.microsoft.com/office/drawing/2014/main" xmlns="" id="{FFF6FEE8-D6B3-4EDD-AB0D-B810B758A71D}"/>
-              </a:ext>
-            </a:extLst>
-          </p:cNvPr>
+          <p:cNvPr id="6" name="Footer Placeholder 5"/>
           <p:cNvSpPr>
             <a:spLocks noGrp="1"/>
           </p:cNvSpPr>
@@ -3394,7 +3621,12 @@
             <p:ph type="ftr" sz="quarter" idx="11"/>
           </p:nvPr>
         </p:nvSpPr>
-        <p:spPr/>
+        <p:spPr>
+          <a:xfrm>
+            <a:off x="1447382" y="318640"/>
+            <a:ext cx="5541004" cy="320931"/>
+          </a:xfrm>
+        </p:spPr>
         <p:txBody>
           <a:bodyPr/>
           <a:lstStyle/>
@@ -3405,13 +3637,7 @@
       </p:sp>
       <p:sp>
         <p:nvSpPr>
-          <p:cNvPr id="7" name="Slide Number Placeholder 6">
-            <a:extLst>
-              <a:ext uri="{FF2B5EF4-FFF2-40B4-BE49-F238E27FC236}">
-                <a16:creationId xmlns:a16="http://schemas.microsoft.com/office/drawing/2014/main" xmlns="" id="{18DA9315-2E11-4609-A3E4-338823003FDC}"/>
-              </a:ext>
-            </a:extLst>
-          </p:cNvPr>
+          <p:cNvPr id="7" name="Slide Number Placeholder 6"/>
           <p:cNvSpPr>
             <a:spLocks noGrp="1"/>
           </p:cNvSpPr>
@@ -3432,10 +3658,41 @@
           </a:p>
         </p:txBody>
       </p:sp>
+      <p:cxnSp>
+        <p:nvCxnSpPr>
+          <p:cNvPr id="31" name="Straight Connector 30"/>
+          <p:cNvCxnSpPr/>
+          <p:nvPr/>
+        </p:nvCxnSpPr>
+        <p:spPr>
+          <a:xfrm>
+            <a:off x="1447382" y="3143605"/>
+            <a:ext cx="5527351" cy="0"/>
+          </a:xfrm>
+          <a:prstGeom prst="line">
+            <a:avLst/>
+          </a:prstGeom>
+          <a:ln w="31750"/>
+        </p:spPr>
+        <p:style>
+          <a:lnRef idx="3">
+            <a:schemeClr val="accent1"/>
+          </a:lnRef>
+          <a:fillRef idx="0">
+            <a:schemeClr val="accent1"/>
+          </a:fillRef>
+          <a:effectRef idx="2">
+            <a:schemeClr val="accent1"/>
+          </a:effectRef>
+          <a:fontRef idx="minor">
+            <a:schemeClr val="tx1"/>
+          </a:fontRef>
+        </p:style>
+      </p:cxnSp>
     </p:spTree>
     <p:extLst>
       <p:ext uri="{BB962C8B-B14F-4D97-AF65-F5344CB8AC3E}">
-        <p14:creationId xmlns:p14="http://schemas.microsoft.com/office/powerpoint/2010/main" val="484722937"/>
+        <p14:creationId xmlns:p14="http://schemas.microsoft.com/office/powerpoint/2010/main" val="1468479207"/>
       </p:ext>
     </p:extLst>
   </p:cSld>
@@ -3449,8 +3706,8 @@
 <p:sldMaster xmlns:a="http://schemas.openxmlformats.org/drawingml/2006/main" xmlns:r="http://schemas.openxmlformats.org/officeDocument/2006/relationships" xmlns:p="http://schemas.openxmlformats.org/presentationml/2006/main">
   <p:cSld>
     <p:bg>
-      <p:bgRef idx="1001">
-        <a:schemeClr val="bg1"/>
+      <p:bgRef idx="1003">
+        <a:schemeClr val="bg2"/>
       </p:bgRef>
     </p:bg>
     <p:spTree>
@@ -3469,67 +3726,134 @@
       </p:grpSpPr>
       <p:sp>
         <p:nvSpPr>
-          <p:cNvPr id="2" name="Title Placeholder 1">
-            <a:extLst>
-              <a:ext uri="{FF2B5EF4-FFF2-40B4-BE49-F238E27FC236}">
-                <a16:creationId xmlns:a16="http://schemas.microsoft.com/office/drawing/2014/main" xmlns="" id="{9202F0A8-F297-49F8-A1EA-39899F6CD225}"/>
-              </a:ext>
-            </a:extLst>
-          </p:cNvPr>
-          <p:cNvSpPr>
-            <a:spLocks noGrp="1"/>
-          </p:cNvSpPr>
-          <p:nvPr>
-            <p:ph type="title"/>
-          </p:nvPr>
+          <p:cNvPr id="8" name="Rectangle 7"/>
+          <p:cNvSpPr/>
+          <p:nvPr/>
         </p:nvSpPr>
         <p:spPr>
           <a:xfrm>
-            <a:off x="838200" y="365125"/>
-            <a:ext cx="10515600" cy="1325563"/>
+            <a:off x="0" y="2019476"/>
+            <a:ext cx="12192000" cy="4105941"/>
           </a:xfrm>
           <a:prstGeom prst="rect">
             <a:avLst/>
           </a:prstGeom>
-        </p:spPr>
-        <p:txBody>
-          <a:bodyPr vert="horz" lIns="91440" tIns="45720" rIns="91440" bIns="45720" rtlCol="0" anchor="ctr">
-            <a:normAutofit/>
-          </a:bodyPr>
-          <a:lstStyle/>
-          <a:p>
-            <a:r>
-              <a:rPr lang="en-US"/>
-              <a:t>Click to edit Master title style</a:t>
-            </a:r>
-          </a:p>
-        </p:txBody>
-      </p:sp>
-      <p:sp>
-        <p:nvSpPr>
-          <p:cNvPr id="3" name="Text Placeholder 2">
+          <a:gradFill flip="none" rotWithShape="1">
+            <a:gsLst>
+              <a:gs pos="0">
+                <a:schemeClr val="bg2">
+                  <a:alpha val="0"/>
+                </a:schemeClr>
+              </a:gs>
+              <a:gs pos="100000">
+                <a:schemeClr val="bg2"/>
+              </a:gs>
+            </a:gsLst>
+            <a:lin ang="5400000" scaled="0"/>
+            <a:tileRect/>
+          </a:gradFill>
+          <a:ln>
+            <a:noFill/>
+          </a:ln>
+        </p:spPr>
+        <p:style>
+          <a:lnRef idx="2">
+            <a:schemeClr val="accent1">
+              <a:shade val="50000"/>
+            </a:schemeClr>
+          </a:lnRef>
+          <a:fillRef idx="1">
+            <a:schemeClr val="accent1"/>
+          </a:fillRef>
+          <a:effectRef idx="0">
+            <a:schemeClr val="accent1"/>
+          </a:effectRef>
+          <a:fontRef idx="minor">
+            <a:schemeClr val="lt1"/>
+          </a:fontRef>
+        </p:style>
+      </p:sp>
+      <p:pic>
+        <p:nvPicPr>
+          <p:cNvPr id="7" name="Picture 6"/>
+          <p:cNvPicPr>
+            <a:picLocks noChangeAspect="1"/>
+          </p:cNvPicPr>
+          <p:nvPr/>
+        </p:nvPicPr>
+        <p:blipFill rotWithShape="1">
+          <a:blip r:embed="rId13">
             <a:extLst>
-              <a:ext uri="{FF2B5EF4-FFF2-40B4-BE49-F238E27FC236}">
-                <a16:creationId xmlns:a16="http://schemas.microsoft.com/office/drawing/2014/main" xmlns="" id="{B5C4EE37-B94A-4B90-82D8-FB2424922B94}"/>
+              <a:ext uri="{28A0092B-C50C-407E-A947-70E740481C1C}">
+                <a14:useLocalDpi xmlns:a14="http://schemas.microsoft.com/office/drawing/2010/main" val="0"/>
               </a:ext>
             </a:extLst>
-          </p:cNvPr>
-          <p:cNvSpPr>
-            <a:spLocks noGrp="1"/>
-          </p:cNvSpPr>
-          <p:nvPr>
-            <p:ph type="body" idx="1"/>
-          </p:nvPr>
-        </p:nvSpPr>
-        <p:spPr>
-          <a:xfrm>
-            <a:off x="838200" y="1825625"/>
-            <a:ext cx="10515600" cy="4351338"/>
+          </a:blip>
+          <a:srcRect t="1538" b="-1538"/>
+          <a:stretch/>
+        </p:blipFill>
+        <p:spPr bwMode="black">
+          <a:xfrm>
+            <a:off x="0" y="6126480"/>
+            <a:ext cx="12192000" cy="742950"/>
           </a:xfrm>
           <a:prstGeom prst="rect">
             <a:avLst/>
           </a:prstGeom>
         </p:spPr>
+      </p:pic>
+      <p:sp>
+        <p:nvSpPr>
+          <p:cNvPr id="2" name="Title Placeholder 1"/>
+          <p:cNvSpPr>
+            <a:spLocks noGrp="1"/>
+          </p:cNvSpPr>
+          <p:nvPr>
+            <p:ph type="title"/>
+          </p:nvPr>
+        </p:nvSpPr>
+        <p:spPr>
+          <a:xfrm>
+            <a:off x="1451579" y="804519"/>
+            <a:ext cx="9603275" cy="1049235"/>
+          </a:xfrm>
+          <a:prstGeom prst="rect">
+            <a:avLst/>
+          </a:prstGeom>
+        </p:spPr>
+        <p:txBody>
+          <a:bodyPr vert="horz" lIns="91440" tIns="45720" rIns="91440" bIns="45720" rtlCol="0" anchor="t">
+            <a:normAutofit/>
+          </a:bodyPr>
+          <a:lstStyle/>
+          <a:p>
+            <a:r>
+              <a:rPr lang="en-US"/>
+              <a:t>Click to edit Master title style</a:t>
+            </a:r>
+            <a:endParaRPr lang="en-US" dirty="0"/>
+          </a:p>
+        </p:txBody>
+      </p:sp>
+      <p:sp>
+        <p:nvSpPr>
+          <p:cNvPr id="3" name="Text Placeholder 2"/>
+          <p:cNvSpPr>
+            <a:spLocks noGrp="1"/>
+          </p:cNvSpPr>
+          <p:nvPr>
+            <p:ph type="body" idx="1"/>
+          </p:nvPr>
+        </p:nvSpPr>
+        <p:spPr>
+          <a:xfrm>
+            <a:off x="1451579" y="2015732"/>
+            <a:ext cx="9603275" cy="3450613"/>
+          </a:xfrm>
+          <a:prstGeom prst="rect">
+            <a:avLst/>
+          </a:prstGeom>
+        </p:spPr>
         <p:txBody>
           <a:bodyPr vert="horz" lIns="91440" tIns="45720" rIns="91440" bIns="45720" rtlCol="0">
             <a:normAutofit/>
@@ -3538,35 +3862,35 @@
           <a:p>
             <a:pPr lvl="0"/>
             <a:r>
-              <a:rPr lang="en-US"/>
+              <a:rPr lang="en-US" dirty="0"/>
               <a:t>Edit Master text styles</a:t>
             </a:r>
           </a:p>
           <a:p>
             <a:pPr lvl="1"/>
             <a:r>
-              <a:rPr lang="en-US"/>
+              <a:rPr lang="en-US" dirty="0"/>
               <a:t>Second level</a:t>
             </a:r>
           </a:p>
           <a:p>
             <a:pPr lvl="2"/>
             <a:r>
-              <a:rPr lang="en-US"/>
+              <a:rPr lang="en-US" dirty="0"/>
               <a:t>Third level</a:t>
             </a:r>
           </a:p>
           <a:p>
             <a:pPr lvl="3"/>
             <a:r>
-              <a:rPr lang="en-US"/>
+              <a:rPr lang="en-US" dirty="0"/>
               <a:t>Fourth level</a:t>
             </a:r>
           </a:p>
           <a:p>
             <a:pPr lvl="4"/>
             <a:r>
-              <a:rPr lang="en-US"/>
+              <a:rPr lang="en-US" dirty="0"/>
               <a:t>Fifth level</a:t>
             </a:r>
           </a:p>
@@ -3574,13 +3898,7 @@
       </p:sp>
       <p:sp>
         <p:nvSpPr>
-          <p:cNvPr id="4" name="Date Placeholder 3">
-            <a:extLst>
-              <a:ext uri="{FF2B5EF4-FFF2-40B4-BE49-F238E27FC236}">
-                <a16:creationId xmlns:a16="http://schemas.microsoft.com/office/drawing/2014/main" xmlns="" id="{EBC0809D-2597-4425-B624-522251C88989}"/>
-              </a:ext>
-            </a:extLst>
-          </p:cNvPr>
+          <p:cNvPr id="4" name="Date Placeholder 3"/>
           <p:cNvSpPr>
             <a:spLocks noGrp="1"/>
           </p:cNvSpPr>
@@ -3590,8 +3908,8 @@
         </p:nvSpPr>
         <p:spPr>
           <a:xfrm>
-            <a:off x="838200" y="6356350"/>
-            <a:ext cx="2743200" cy="365125"/>
+            <a:off x="7554138" y="330370"/>
+            <a:ext cx="3500715" cy="309201"/>
           </a:xfrm>
           <a:prstGeom prst="rect">
             <a:avLst/>
@@ -3600,8 +3918,8 @@
         <p:txBody>
           <a:bodyPr vert="horz" lIns="91440" tIns="45720" rIns="91440" bIns="45720" rtlCol="0" anchor="ctr"/>
           <a:lstStyle>
-            <a:lvl1pPr algn="l">
-              <a:defRPr sz="1200">
+            <a:lvl1pPr algn="r">
+              <a:defRPr sz="1000">
                 <a:solidFill>
                   <a:schemeClr val="tx1">
                     <a:tint val="75000"/>
@@ -3621,13 +3939,7 @@
       </p:sp>
       <p:sp>
         <p:nvSpPr>
-          <p:cNvPr id="5" name="Footer Placeholder 4">
-            <a:extLst>
-              <a:ext uri="{FF2B5EF4-FFF2-40B4-BE49-F238E27FC236}">
-                <a16:creationId xmlns:a16="http://schemas.microsoft.com/office/drawing/2014/main" xmlns="" id="{CE67E97C-11F8-4B22-8214-90468B863B2C}"/>
-              </a:ext>
-            </a:extLst>
-          </p:cNvPr>
+          <p:cNvPr id="5" name="Footer Placeholder 4"/>
           <p:cNvSpPr>
             <a:spLocks noGrp="1"/>
           </p:cNvSpPr>
@@ -3637,8 +3949,8 @@
         </p:nvSpPr>
         <p:spPr>
           <a:xfrm>
-            <a:off x="4038600" y="6356350"/>
-            <a:ext cx="4114800" cy="365125"/>
+            <a:off x="1451579" y="329307"/>
+            <a:ext cx="5938836" cy="309201"/>
           </a:xfrm>
           <a:prstGeom prst="rect">
             <a:avLst/>
@@ -3647,8 +3959,8 @@
         <p:txBody>
           <a:bodyPr vert="horz" lIns="91440" tIns="45720" rIns="91440" bIns="45720" rtlCol="0" anchor="ctr"/>
           <a:lstStyle>
-            <a:lvl1pPr algn="ctr">
-              <a:defRPr sz="1200">
+            <a:lvl1pPr algn="l">
+              <a:defRPr sz="1000">
                 <a:solidFill>
                   <a:schemeClr val="tx1">
                     <a:tint val="75000"/>
@@ -3664,13 +3976,7 @@
       </p:sp>
       <p:sp>
         <p:nvSpPr>
-          <p:cNvPr id="6" name="Slide Number Placeholder 5">
-            <a:extLst>
-              <a:ext uri="{FF2B5EF4-FFF2-40B4-BE49-F238E27FC236}">
-                <a16:creationId xmlns:a16="http://schemas.microsoft.com/office/drawing/2014/main" xmlns="" id="{E6524BC9-1F29-481D-8795-411C357B4139}"/>
-              </a:ext>
-            </a:extLst>
-          </p:cNvPr>
+          <p:cNvPr id="6" name="Slide Number Placeholder 5"/>
           <p:cNvSpPr>
             <a:spLocks noGrp="1"/>
           </p:cNvSpPr>
@@ -3680,22 +3986,20 @@
         </p:nvSpPr>
         <p:spPr>
           <a:xfrm>
-            <a:off x="8610600" y="6356350"/>
-            <a:ext cx="2743200" cy="365125"/>
+            <a:off x="480060" y="798973"/>
+            <a:ext cx="811019" cy="503578"/>
           </a:xfrm>
           <a:prstGeom prst="rect">
             <a:avLst/>
           </a:prstGeom>
         </p:spPr>
         <p:txBody>
-          <a:bodyPr vert="horz" lIns="91440" tIns="45720" rIns="91440" bIns="45720" rtlCol="0" anchor="ctr"/>
+          <a:bodyPr vert="horz" lIns="91440" tIns="45720" rIns="91440" bIns="45720" rtlCol="0" anchor="t"/>
           <a:lstStyle>
             <a:lvl1pPr algn="r">
-              <a:defRPr sz="1200">
+              <a:defRPr sz="2800">
                 <a:solidFill>
-                  <a:schemeClr val="tx1">
-                    <a:tint val="75000"/>
-                  </a:schemeClr>
+                  <a:schemeClr val="accent1"/>
                 </a:solidFill>
               </a:defRPr>
             </a:lvl1pPr>
@@ -3709,26 +4013,63 @@
           </a:p>
         </p:txBody>
       </p:sp>
+      <p:cxnSp>
+        <p:nvCxnSpPr>
+          <p:cNvPr id="10" name="Straight Connector 9"/>
+          <p:cNvCxnSpPr/>
+          <p:nvPr/>
+        </p:nvCxnSpPr>
+        <p:spPr>
+          <a:xfrm>
+            <a:off x="0" y="6128413"/>
+            <a:ext cx="12192000" cy="0"/>
+          </a:xfrm>
+          <a:prstGeom prst="line">
+            <a:avLst/>
+          </a:prstGeom>
+          <a:ln w="12700">
+            <a:solidFill>
+              <a:srgbClr val="000001">
+                <a:alpha val="20000"/>
+              </a:srgbClr>
+            </a:solidFill>
+          </a:ln>
+        </p:spPr>
+        <p:style>
+          <a:lnRef idx="1">
+            <a:schemeClr val="accent1"/>
+          </a:lnRef>
+          <a:fillRef idx="0">
+            <a:schemeClr val="accent1"/>
+          </a:fillRef>
+          <a:effectRef idx="0">
+            <a:schemeClr val="accent1"/>
+          </a:effectRef>
+          <a:fontRef idx="minor">
+            <a:schemeClr val="tx1"/>
+          </a:fontRef>
+        </p:style>
+      </p:cxnSp>
     </p:spTree>
     <p:extLst>
       <p:ext uri="{BB962C8B-B14F-4D97-AF65-F5344CB8AC3E}">
-        <p14:creationId xmlns:p14="http://schemas.microsoft.com/office/powerpoint/2010/main" val="2545433633"/>
+        <p14:creationId xmlns:p14="http://schemas.microsoft.com/office/powerpoint/2010/main" val="604582793"/>
       </p:ext>
     </p:extLst>
   </p:cSld>
   <p:clrMap bg1="lt1" tx1="dk1" bg2="lt2" tx2="dk2" accent1="accent1" accent2="accent2" accent3="accent3" accent4="accent4" accent5="accent5" accent6="accent6" hlink="hlink" folHlink="folHlink"/>
   <p:sldLayoutIdLst>
-    <p:sldLayoutId id="2147483649" r:id="rId1"/>
-    <p:sldLayoutId id="2147483650" r:id="rId2"/>
-    <p:sldLayoutId id="2147483651" r:id="rId3"/>
-    <p:sldLayoutId id="2147483652" r:id="rId4"/>
-    <p:sldLayoutId id="2147483653" r:id="rId5"/>
-    <p:sldLayoutId id="2147483654" r:id="rId6"/>
-    <p:sldLayoutId id="2147483655" r:id="rId7"/>
-    <p:sldLayoutId id="2147483656" r:id="rId8"/>
-    <p:sldLayoutId id="2147483657" r:id="rId9"/>
-    <p:sldLayoutId id="2147483658" r:id="rId10"/>
-    <p:sldLayoutId id="2147483659" r:id="rId11"/>
+    <p:sldLayoutId id="2147483678" r:id="rId1"/>
+    <p:sldLayoutId id="2147483679" r:id="rId2"/>
+    <p:sldLayoutId id="2147483680" r:id="rId3"/>
+    <p:sldLayoutId id="2147483681" r:id="rId4"/>
+    <p:sldLayoutId id="2147483682" r:id="rId5"/>
+    <p:sldLayoutId id="2147483683" r:id="rId6"/>
+    <p:sldLayoutId id="2147483684" r:id="rId7"/>
+    <p:sldLayoutId id="2147483685" r:id="rId8"/>
+    <p:sldLayoutId id="2147483686" r:id="rId9"/>
+    <p:sldLayoutId id="2147483687" r:id="rId10"/>
+    <p:sldLayoutId id="2147483688" r:id="rId11"/>
   </p:sldLayoutIdLst>
   <p:txStyles>
     <p:titleStyle>
@@ -3740,10 +4081,11 @@
           <a:spcPct val="0"/>
         </a:spcBef>
         <a:buNone/>
-        <a:defRPr sz="4400" kern="1200">
+        <a:defRPr sz="3200" b="0" i="0" kern="1200" cap="all">
           <a:solidFill>
             <a:schemeClr val="tx1"/>
           </a:solidFill>
+          <a:effectLst/>
           <a:latin typeface="+mj-lt"/>
           <a:ea typeface="+mj-ea"/>
           <a:cs typeface="+mj-cs"/>
@@ -3753,17 +4095,22 @@
     <p:bodyStyle>
       <a:lvl1pPr marL="228600" indent="-228600" algn="l" defTabSz="914400" rtl="0" eaLnBrk="1" latinLnBrk="0" hangingPunct="1">
         <a:lnSpc>
-          <a:spcPct val="90000"/>
+          <a:spcPct val="120000"/>
         </a:lnSpc>
         <a:spcBef>
           <a:spcPts val="1000"/>
         </a:spcBef>
+        <a:buClr>
+          <a:schemeClr val="accent1"/>
+        </a:buClr>
+        <a:buSzPct val="100000"/>
         <a:buFont typeface="Arial" panose="020B0604020202020204" pitchFamily="34" charset="0"/>
         <a:buChar char="•"/>
-        <a:defRPr sz="2800" kern="1200">
+        <a:defRPr sz="2000" kern="1200">
           <a:solidFill>
             <a:schemeClr val="tx1"/>
           </a:solidFill>
+          <a:effectLst/>
           <a:latin typeface="+mn-lt"/>
           <a:ea typeface="+mn-ea"/>
           <a:cs typeface="+mn-cs"/>
@@ -3771,17 +4118,22 @@
       </a:lvl1pPr>
       <a:lvl2pPr marL="685800" indent="-228600" algn="l" defTabSz="914400" rtl="0" eaLnBrk="1" latinLnBrk="0" hangingPunct="1">
         <a:lnSpc>
-          <a:spcPct val="90000"/>
+          <a:spcPct val="120000"/>
         </a:lnSpc>
         <a:spcBef>
           <a:spcPts val="500"/>
         </a:spcBef>
+        <a:buClr>
+          <a:schemeClr val="accent1"/>
+        </a:buClr>
+        <a:buSzPct val="100000"/>
         <a:buFont typeface="Arial" panose="020B0604020202020204" pitchFamily="34" charset="0"/>
         <a:buChar char="•"/>
-        <a:defRPr sz="2400" kern="1200">
+        <a:defRPr sz="1800" kern="1200" cap="none" baseline="0">
           <a:solidFill>
             <a:schemeClr val="tx1"/>
           </a:solidFill>
+          <a:effectLst/>
           <a:latin typeface="+mn-lt"/>
           <a:ea typeface="+mn-ea"/>
           <a:cs typeface="+mn-cs"/>
@@ -3789,17 +4141,22 @@
       </a:lvl2pPr>
       <a:lvl3pPr marL="1143000" indent="-228600" algn="l" defTabSz="914400" rtl="0" eaLnBrk="1" latinLnBrk="0" hangingPunct="1">
         <a:lnSpc>
-          <a:spcPct val="90000"/>
+          <a:spcPct val="120000"/>
         </a:lnSpc>
         <a:spcBef>
           <a:spcPts val="500"/>
         </a:spcBef>
+        <a:buClr>
+          <a:schemeClr val="accent1"/>
+        </a:buClr>
+        <a:buSzPct val="100000"/>
         <a:buFont typeface="Arial" panose="020B0604020202020204" pitchFamily="34" charset="0"/>
         <a:buChar char="•"/>
-        <a:defRPr sz="2000" kern="1200">
+        <a:defRPr sz="1600" kern="1200">
           <a:solidFill>
             <a:schemeClr val="tx1"/>
           </a:solidFill>
+          <a:effectLst/>
           <a:latin typeface="+mn-lt"/>
           <a:ea typeface="+mn-ea"/>
           <a:cs typeface="+mn-cs"/>
@@ -3807,17 +4164,22 @@
       </a:lvl3pPr>
       <a:lvl4pPr marL="1600200" indent="-228600" algn="l" defTabSz="914400" rtl="0" eaLnBrk="1" latinLnBrk="0" hangingPunct="1">
         <a:lnSpc>
-          <a:spcPct val="90000"/>
+          <a:spcPct val="120000"/>
         </a:lnSpc>
         <a:spcBef>
           <a:spcPts val="500"/>
         </a:spcBef>
+        <a:buClr>
+          <a:schemeClr val="accent1"/>
+        </a:buClr>
+        <a:buSzPct val="100000"/>
         <a:buFont typeface="Arial" panose="020B0604020202020204" pitchFamily="34" charset="0"/>
         <a:buChar char="•"/>
-        <a:defRPr sz="1800" kern="1200">
+        <a:defRPr sz="1400" kern="1200" cap="none" baseline="0">
           <a:solidFill>
             <a:schemeClr val="tx1"/>
           </a:solidFill>
+          <a:effectLst/>
           <a:latin typeface="+mn-lt"/>
           <a:ea typeface="+mn-ea"/>
           <a:cs typeface="+mn-cs"/>
@@ -3825,17 +4187,22 @@
       </a:lvl4pPr>
       <a:lvl5pPr marL="2057400" indent="-228600" algn="l" defTabSz="914400" rtl="0" eaLnBrk="1" latinLnBrk="0" hangingPunct="1">
         <a:lnSpc>
-          <a:spcPct val="90000"/>
+          <a:spcPct val="120000"/>
         </a:lnSpc>
         <a:spcBef>
           <a:spcPts val="500"/>
         </a:spcBef>
+        <a:buClr>
+          <a:schemeClr val="accent1"/>
+        </a:buClr>
+        <a:buSzPct val="100000"/>
         <a:buFont typeface="Arial" panose="020B0604020202020204" pitchFamily="34" charset="0"/>
         <a:buChar char="•"/>
-        <a:defRPr sz="1800" kern="1200">
+        <a:defRPr sz="1200" kern="1200">
           <a:solidFill>
             <a:schemeClr val="tx1"/>
           </a:solidFill>
+          <a:effectLst/>
           <a:latin typeface="+mn-lt"/>
           <a:ea typeface="+mn-ea"/>
           <a:cs typeface="+mn-cs"/>
@@ -3843,17 +4210,22 @@
       </a:lvl5pPr>
       <a:lvl6pPr marL="2514600" indent="-228600" algn="l" defTabSz="914400" rtl="0" eaLnBrk="1" latinLnBrk="0" hangingPunct="1">
         <a:lnSpc>
-          <a:spcPct val="90000"/>
+          <a:spcPct val="120000"/>
         </a:lnSpc>
         <a:spcBef>
           <a:spcPts val="500"/>
         </a:spcBef>
+        <a:buClr>
+          <a:schemeClr val="accent1"/>
+        </a:buClr>
+        <a:buSzPct val="100000"/>
         <a:buFont typeface="Arial" panose="020B0604020202020204" pitchFamily="34" charset="0"/>
         <a:buChar char="•"/>
-        <a:defRPr sz="1800" kern="1200">
+        <a:defRPr sz="1200" kern="1200">
           <a:solidFill>
             <a:schemeClr val="tx1"/>
           </a:solidFill>
+          <a:effectLst/>
           <a:latin typeface="+mn-lt"/>
           <a:ea typeface="+mn-ea"/>
           <a:cs typeface="+mn-cs"/>
@@ -3861,17 +4233,22 @@
       </a:lvl6pPr>
       <a:lvl7pPr marL="2971800" indent="-228600" algn="l" defTabSz="914400" rtl="0" eaLnBrk="1" latinLnBrk="0" hangingPunct="1">
         <a:lnSpc>
-          <a:spcPct val="90000"/>
+          <a:spcPct val="120000"/>
         </a:lnSpc>
         <a:spcBef>
           <a:spcPts val="500"/>
         </a:spcBef>
+        <a:buClr>
+          <a:schemeClr val="accent1"/>
+        </a:buClr>
+        <a:buSzPct val="100000"/>
         <a:buFont typeface="Arial" panose="020B0604020202020204" pitchFamily="34" charset="0"/>
         <a:buChar char="•"/>
-        <a:defRPr sz="1800" kern="1200">
+        <a:defRPr sz="1200" kern="1200">
           <a:solidFill>
             <a:schemeClr val="tx1"/>
           </a:solidFill>
+          <a:effectLst/>
           <a:latin typeface="+mn-lt"/>
           <a:ea typeface="+mn-ea"/>
           <a:cs typeface="+mn-cs"/>
@@ -3879,17 +4256,22 @@
       </a:lvl7pPr>
       <a:lvl8pPr marL="3429000" indent="-228600" algn="l" defTabSz="914400" rtl="0" eaLnBrk="1" latinLnBrk="0" hangingPunct="1">
         <a:lnSpc>
-          <a:spcPct val="90000"/>
+          <a:spcPct val="120000"/>
         </a:lnSpc>
         <a:spcBef>
           <a:spcPts val="500"/>
         </a:spcBef>
+        <a:buClr>
+          <a:schemeClr val="accent1"/>
+        </a:buClr>
+        <a:buSzPct val="100000"/>
         <a:buFont typeface="Arial" panose="020B0604020202020204" pitchFamily="34" charset="0"/>
         <a:buChar char="•"/>
-        <a:defRPr sz="1800" kern="1200">
+        <a:defRPr sz="1200" kern="1200" baseline="0">
           <a:solidFill>
             <a:schemeClr val="tx1"/>
           </a:solidFill>
+          <a:effectLst/>
           <a:latin typeface="+mn-lt"/>
           <a:ea typeface="+mn-ea"/>
           <a:cs typeface="+mn-cs"/>
@@ -3897,17 +4279,22 @@
       </a:lvl8pPr>
       <a:lvl9pPr marL="3886200" indent="-228600" algn="l" defTabSz="914400" rtl="0" eaLnBrk="1" latinLnBrk="0" hangingPunct="1">
         <a:lnSpc>
-          <a:spcPct val="90000"/>
+          <a:spcPct val="120000"/>
         </a:lnSpc>
         <a:spcBef>
           <a:spcPts val="500"/>
         </a:spcBef>
+        <a:buClr>
+          <a:schemeClr val="accent1"/>
+        </a:buClr>
+        <a:buSzPct val="100000"/>
         <a:buFont typeface="Arial" panose="020B0604020202020204" pitchFamily="34" charset="0"/>
         <a:buChar char="•"/>
-        <a:defRPr sz="1800" kern="1200">
+        <a:defRPr sz="1200" kern="1200" baseline="0">
           <a:solidFill>
             <a:schemeClr val="tx1"/>
           </a:solidFill>
+          <a:effectLst/>
           <a:latin typeface="+mn-lt"/>
           <a:ea typeface="+mn-ea"/>
           <a:cs typeface="+mn-cs"/>
@@ -4035,7 +4422,7 @@
           <p:cNvPr id="2" name="Title 1">
             <a:extLst>
               <a:ext uri="{FF2B5EF4-FFF2-40B4-BE49-F238E27FC236}">
-                <a16:creationId xmlns:a16="http://schemas.microsoft.com/office/drawing/2014/main" xmlns="" id="{A7F485D5-0B00-49C1-9F6F-46050B8DAA99}"/>
+                <a16:creationId xmlns:a16="http://schemas.microsoft.com/office/drawing/2014/main" id="{A7F485D5-0B00-49C1-9F6F-46050B8DAA99}"/>
               </a:ext>
             </a:extLst>
           </p:cNvPr>
@@ -4051,6 +4438,10 @@
           <a:bodyPr/>
           <a:lstStyle/>
           <a:p>
+            <a:r>
+              <a:rPr lang="en-US" dirty="0" err="1"/>
+              <a:t>BAConnect</a:t>
+            </a:r>
             <a:endParaRPr lang="en-US" dirty="0"/>
           </a:p>
         </p:txBody>
@@ -4060,7 +4451,7 @@
           <p:cNvPr id="3" name="Subtitle 2">
             <a:extLst>
               <a:ext uri="{FF2B5EF4-FFF2-40B4-BE49-F238E27FC236}">
-                <a16:creationId xmlns:a16="http://schemas.microsoft.com/office/drawing/2014/main" xmlns="" id="{AEDAAC9A-CDF0-4561-A1C4-1D8623AC383E}"/>
+                <a16:creationId xmlns:a16="http://schemas.microsoft.com/office/drawing/2014/main" id="{AEDAAC9A-CDF0-4561-A1C4-1D8623AC383E}"/>
               </a:ext>
             </a:extLst>
           </p:cNvPr>
@@ -4093,13 +4484,6 @@
   <p:clrMapOvr>
     <a:masterClrMapping/>
   </p:clrMapOvr>
-  <p:timing>
-    <p:tnLst>
-      <p:par>
-        <p:cTn id="1" dur="indefinite" restart="never" nodeType="tmRoot"/>
-      </p:par>
-    </p:tnLst>
-  </p:timing>
 </p:sld>
 </file>
 
@@ -4125,7 +4509,7 @@
           <p:cNvPr id="2" name="Title 1">
             <a:extLst>
               <a:ext uri="{FF2B5EF4-FFF2-40B4-BE49-F238E27FC236}">
-                <a16:creationId xmlns:a16="http://schemas.microsoft.com/office/drawing/2014/main" xmlns="" id="{1B7B4BB2-4FE5-43F3-AB17-BA31C3736854}"/>
+                <a16:creationId xmlns:a16="http://schemas.microsoft.com/office/drawing/2014/main" id="{1B7B4BB2-4FE5-43F3-AB17-BA31C3736854}"/>
               </a:ext>
             </a:extLst>
           </p:cNvPr>
@@ -4155,11 +4539,13 @@
       </p:sp>
       <p:pic>
         <p:nvPicPr>
-          <p:cNvPr id="7" name="Picture 6"/>
+          <p:cNvPr id="11" name="Content Placeholder 10"/>
           <p:cNvPicPr>
-            <a:picLocks noChangeAspect="1"/>
+            <a:picLocks noGrp="1" noChangeAspect="1"/>
           </p:cNvPicPr>
-          <p:nvPr/>
+          <p:nvPr>
+            <p:ph idx="1"/>
+          </p:nvPr>
         </p:nvPicPr>
         <p:blipFill>
           <a:blip r:embed="rId3" cstate="print">
@@ -4175,23 +4561,18 @@
         </p:blipFill>
         <p:spPr>
           <a:xfrm>
-            <a:off x="4010023" y="935213"/>
-            <a:ext cx="3857625" cy="6858000"/>
-          </a:xfrm>
-          <a:prstGeom prst="rect">
-            <a:avLst/>
-          </a:prstGeom>
+            <a:off x="152399" y="935213"/>
+            <a:ext cx="3857624" cy="6858000"/>
+          </a:xfrm>
         </p:spPr>
       </p:pic>
       <p:pic>
         <p:nvPicPr>
-          <p:cNvPr id="11" name="Content Placeholder 10"/>
+          <p:cNvPr id="7" name="Picture 6"/>
           <p:cNvPicPr>
-            <a:picLocks noGrp="1" noChangeAspect="1"/>
+            <a:picLocks noChangeAspect="1"/>
           </p:cNvPicPr>
-          <p:nvPr>
-            <p:ph idx="1"/>
-          </p:nvPr>
+          <p:nvPr/>
         </p:nvPicPr>
         <p:blipFill>
           <a:blip r:embed="rId4" cstate="print">
@@ -4207,9 +4588,12 @@
         </p:blipFill>
         <p:spPr>
           <a:xfrm>
-            <a:off x="152399" y="935213"/>
-            <a:ext cx="3857624" cy="6858000"/>
-          </a:xfrm>
+            <a:off x="4010023" y="935213"/>
+            <a:ext cx="3857625" cy="6858000"/>
+          </a:xfrm>
+          <a:prstGeom prst="rect">
+            <a:avLst/>
+          </a:prstGeom>
         </p:spPr>
       </p:pic>
       <p:pic>
@@ -4280,8 +4664,8 @@
         </p:nvSpPr>
         <p:spPr>
           <a:xfrm>
-            <a:off x="6109646" y="489681"/>
-            <a:ext cx="2177104" cy="369332"/>
+            <a:off x="6109645" y="489681"/>
+            <a:ext cx="2766565" cy="369332"/>
           </a:xfrm>
           <a:prstGeom prst="rect">
             <a:avLst/>
@@ -4295,7 +4679,7 @@
           <a:lstStyle/>
           <a:p>
             <a:r>
-              <a:rPr lang="en-US" dirty="0" smtClean="0">
+              <a:rPr lang="en-US" dirty="0">
                 <a:hlinkClick r:id="rId7"/>
               </a:rPr>
               <a:t>http://baconnect.tk/</a:t>
@@ -4314,13 +4698,6 @@
   <p:clrMapOvr>
     <a:masterClrMapping/>
   </p:clrMapOvr>
-  <p:timing>
-    <p:tnLst>
-      <p:par>
-        <p:cTn id="1" dur="indefinite" restart="never" nodeType="tmRoot"/>
-      </p:par>
-    </p:tnLst>
-  </p:timing>
 </p:sld>
 </file>
 
@@ -4346,7 +4723,7 @@
           <p:cNvPr id="2" name="Title 1">
             <a:extLst>
               <a:ext uri="{FF2B5EF4-FFF2-40B4-BE49-F238E27FC236}">
-                <a16:creationId xmlns:a16="http://schemas.microsoft.com/office/drawing/2014/main" xmlns="" id="{E757FE7C-CE19-4A9D-A99C-0A2A23E0B17A}"/>
+                <a16:creationId xmlns:a16="http://schemas.microsoft.com/office/drawing/2014/main" id="{E757FE7C-CE19-4A9D-A99C-0A2A23E0B17A}"/>
               </a:ext>
             </a:extLst>
           </p:cNvPr>
@@ -4374,7 +4751,7 @@
           <p:cNvPr id="5" name="Content Placeholder 4">
             <a:extLst>
               <a:ext uri="{FF2B5EF4-FFF2-40B4-BE49-F238E27FC236}">
-                <a16:creationId xmlns:a16="http://schemas.microsoft.com/office/drawing/2014/main" xmlns="" id="{26A6C515-A8E2-4E96-B4AD-ED2E30311369}"/>
+                <a16:creationId xmlns:a16="http://schemas.microsoft.com/office/drawing/2014/main" id="{26A6C515-A8E2-4E96-B4AD-ED2E30311369}"/>
               </a:ext>
             </a:extLst>
           </p:cNvPr>
@@ -4399,8 +4776,8 @@
         </p:blipFill>
         <p:spPr>
           <a:xfrm>
-            <a:off x="2185987" y="1690688"/>
-            <a:ext cx="7820025" cy="4963214"/>
+            <a:off x="3535543" y="2016125"/>
+            <a:ext cx="5435238" cy="3449638"/>
           </a:xfrm>
         </p:spPr>
       </p:pic>
@@ -4414,13 +4791,6 @@
   <p:clrMapOvr>
     <a:masterClrMapping/>
   </p:clrMapOvr>
-  <p:timing>
-    <p:tnLst>
-      <p:par>
-        <p:cTn id="1" dur="indefinite" restart="never" nodeType="tmRoot"/>
-      </p:par>
-    </p:tnLst>
-  </p:timing>
 </p:sld>
 </file>
 
@@ -4446,7 +4816,7 @@
           <p:cNvPr id="2" name="Title 1">
             <a:extLst>
               <a:ext uri="{FF2B5EF4-FFF2-40B4-BE49-F238E27FC236}">
-                <a16:creationId xmlns:a16="http://schemas.microsoft.com/office/drawing/2014/main" xmlns="" id="{6060D5DF-1D6A-4416-9A18-137D9DA4EB41}"/>
+                <a16:creationId xmlns:a16="http://schemas.microsoft.com/office/drawing/2014/main" id="{6060D5DF-1D6A-4416-9A18-137D9DA4EB41}"/>
               </a:ext>
             </a:extLst>
           </p:cNvPr>
@@ -4471,10 +4841,10 @@
       </p:sp>
       <p:pic>
         <p:nvPicPr>
-          <p:cNvPr id="6" name="Content Placeholder 5">
+          <p:cNvPr id="5" name="Content Placeholder 4">
             <a:extLst>
               <a:ext uri="{FF2B5EF4-FFF2-40B4-BE49-F238E27FC236}">
-                <a16:creationId xmlns:a16="http://schemas.microsoft.com/office/drawing/2014/main" xmlns="" id="{2075CA61-26CF-4626-B2DA-DA247B360184}"/>
+                <a16:creationId xmlns:a16="http://schemas.microsoft.com/office/drawing/2014/main" id="{CE7BE85F-A21D-40D9-B336-2036033F218B}"/>
               </a:ext>
             </a:extLst>
           </p:cNvPr>
@@ -4486,22 +4856,19 @@
           </p:nvPr>
         </p:nvPicPr>
         <p:blipFill>
-          <a:blip r:embed="rId3">
-            <a:extLst>
-              <a:ext uri="{28A0092B-C50C-407E-A947-70E740481C1C}">
-                <a14:useLocalDpi xmlns:a14="http://schemas.microsoft.com/office/drawing/2010/main" val="0"/>
-              </a:ext>
-            </a:extLst>
-          </a:blip>
+          <a:blip r:embed="rId3"/>
           <a:stretch>
             <a:fillRect/>
           </a:stretch>
         </p:blipFill>
         <p:spPr>
           <a:xfrm>
-            <a:off x="1143000" y="1410288"/>
-            <a:ext cx="9515475" cy="5403789"/>
-          </a:xfrm>
+            <a:off x="3453649" y="2016125"/>
+            <a:ext cx="5599027" cy="3449638"/>
+          </a:xfrm>
+          <a:prstGeom prst="rect">
+            <a:avLst/>
+          </a:prstGeom>
         </p:spPr>
       </p:pic>
     </p:spTree>
@@ -4514,13 +4881,6 @@
   <p:clrMapOvr>
     <a:masterClrMapping/>
   </p:clrMapOvr>
-  <p:timing>
-    <p:tnLst>
-      <p:par>
-        <p:cTn id="1" dur="indefinite" restart="never" nodeType="tmRoot"/>
-      </p:par>
-    </p:tnLst>
-  </p:timing>
 </p:sld>
 </file>
 
@@ -4546,7 +4906,7 @@
           <p:cNvPr id="2" name="Title 1">
             <a:extLst>
               <a:ext uri="{FF2B5EF4-FFF2-40B4-BE49-F238E27FC236}">
-                <a16:creationId xmlns:a16="http://schemas.microsoft.com/office/drawing/2014/main" xmlns="" id="{3BC978F4-831A-416E-9A3B-431AEF059172}"/>
+                <a16:creationId xmlns:a16="http://schemas.microsoft.com/office/drawing/2014/main" id="{6060D5DF-1D6A-4416-9A18-137D9DA4EB41}"/>
               </a:ext>
             </a:extLst>
           </p:cNvPr>
@@ -4557,30 +4917,24 @@
             <p:ph type="title"/>
           </p:nvPr>
         </p:nvSpPr>
-        <p:spPr>
-          <a:xfrm>
-            <a:off x="838200" y="365125"/>
-            <a:ext cx="10515600" cy="1325563"/>
-          </a:xfrm>
-        </p:spPr>
-        <p:txBody>
-          <a:bodyPr/>
-          <a:lstStyle/>
-          <a:p>
-            <a:r>
-              <a:rPr lang="en-US"/>
-              <a:t>Login page</a:t>
-            </a:r>
-            <a:endParaRPr lang="en-US" dirty="0"/>
+        <p:spPr/>
+        <p:txBody>
+          <a:bodyPr/>
+          <a:lstStyle/>
+          <a:p>
+            <a:r>
+              <a:rPr lang="en-US" dirty="0"/>
+              <a:t>User Registration page</a:t>
+            </a:r>
           </a:p>
         </p:txBody>
       </p:sp>
       <p:pic>
         <p:nvPicPr>
-          <p:cNvPr id="7" name="Content Placeholder 6">
+          <p:cNvPr id="6" name="Content Placeholder 5">
             <a:extLst>
               <a:ext uri="{FF2B5EF4-FFF2-40B4-BE49-F238E27FC236}">
-                <a16:creationId xmlns:a16="http://schemas.microsoft.com/office/drawing/2014/main" xmlns="" id="{7ABF1593-0E2B-4A39-90BF-6BF3BC42D94D}"/>
+                <a16:creationId xmlns:a16="http://schemas.microsoft.com/office/drawing/2014/main" id="{42674F34-D3B4-4D0C-9E9E-3734D6108C55}"/>
               </a:ext>
             </a:extLst>
           </p:cNvPr>
@@ -4592,22 +4946,110 @@
           </p:nvPr>
         </p:nvPicPr>
         <p:blipFill>
-          <a:blip r:embed="rId3">
-            <a:extLst>
-              <a:ext uri="{28A0092B-C50C-407E-A947-70E740481C1C}">
-                <a14:useLocalDpi xmlns:a14="http://schemas.microsoft.com/office/drawing/2010/main" val="0"/>
-              </a:ext>
-            </a:extLst>
-          </a:blip>
+          <a:blip r:embed="rId3"/>
           <a:stretch>
             <a:fillRect/>
           </a:stretch>
         </p:blipFill>
         <p:spPr>
           <a:xfrm>
-            <a:off x="657535" y="1494692"/>
-            <a:ext cx="10876929" cy="5115892"/>
-          </a:xfrm>
+            <a:off x="4122366" y="2016125"/>
+            <a:ext cx="4261593" cy="3449638"/>
+          </a:xfrm>
+          <a:prstGeom prst="rect">
+            <a:avLst/>
+          </a:prstGeom>
+        </p:spPr>
+      </p:pic>
+    </p:spTree>
+    <p:extLst>
+      <p:ext uri="{BB962C8B-B14F-4D97-AF65-F5344CB8AC3E}">
+        <p14:creationId xmlns:p14="http://schemas.microsoft.com/office/powerpoint/2010/main" val="2246741724"/>
+      </p:ext>
+    </p:extLst>
+  </p:cSld>
+  <p:clrMapOvr>
+    <a:masterClrMapping/>
+  </p:clrMapOvr>
+</p:sld>
+</file>
+
+<file path=ppt/slides/slide6.xml><?xml version="1.0" encoding="utf-8"?>
+<p:sld xmlns:a="http://schemas.openxmlformats.org/drawingml/2006/main" xmlns:r="http://schemas.openxmlformats.org/officeDocument/2006/relationships" xmlns:p="http://schemas.openxmlformats.org/presentationml/2006/main">
+  <p:cSld>
+    <p:spTree>
+      <p:nvGrpSpPr>
+        <p:cNvPr id="1" name=""/>
+        <p:cNvGrpSpPr/>
+        <p:nvPr/>
+      </p:nvGrpSpPr>
+      <p:grpSpPr>
+        <a:xfrm>
+          <a:off x="0" y="0"/>
+          <a:ext cx="0" cy="0"/>
+          <a:chOff x="0" y="0"/>
+          <a:chExt cx="0" cy="0"/>
+        </a:xfrm>
+      </p:grpSpPr>
+      <p:sp>
+        <p:nvSpPr>
+          <p:cNvPr id="2" name="Title 1">
+            <a:extLst>
+              <a:ext uri="{FF2B5EF4-FFF2-40B4-BE49-F238E27FC236}">
+                <a16:creationId xmlns:a16="http://schemas.microsoft.com/office/drawing/2014/main" id="{3BC978F4-831A-416E-9A3B-431AEF059172}"/>
+              </a:ext>
+            </a:extLst>
+          </p:cNvPr>
+          <p:cNvSpPr>
+            <a:spLocks noGrp="1"/>
+          </p:cNvSpPr>
+          <p:nvPr>
+            <p:ph type="title"/>
+          </p:nvPr>
+        </p:nvSpPr>
+        <p:spPr/>
+        <p:txBody>
+          <a:bodyPr/>
+          <a:lstStyle/>
+          <a:p>
+            <a:r>
+              <a:rPr lang="en-US"/>
+              <a:t>Login page</a:t>
+            </a:r>
+            <a:endParaRPr lang="en-US" dirty="0"/>
+          </a:p>
+        </p:txBody>
+      </p:sp>
+      <p:pic>
+        <p:nvPicPr>
+          <p:cNvPr id="5" name="Content Placeholder 4">
+            <a:extLst>
+              <a:ext uri="{FF2B5EF4-FFF2-40B4-BE49-F238E27FC236}">
+                <a16:creationId xmlns:a16="http://schemas.microsoft.com/office/drawing/2014/main" id="{D45BF02F-63EA-4D9E-BC97-AA42750DFC58}"/>
+              </a:ext>
+            </a:extLst>
+          </p:cNvPr>
+          <p:cNvPicPr>
+            <a:picLocks noGrp="1" noChangeAspect="1"/>
+          </p:cNvPicPr>
+          <p:nvPr>
+            <p:ph idx="1"/>
+          </p:nvPr>
+        </p:nvPicPr>
+        <p:blipFill>
+          <a:blip r:embed="rId3"/>
+          <a:stretch>
+            <a:fillRect/>
+          </a:stretch>
+        </p:blipFill>
+        <p:spPr>
+          <a:xfrm>
+            <a:off x="3355900" y="2016125"/>
+            <a:ext cx="5794525" cy="3449638"/>
+          </a:xfrm>
+          <a:prstGeom prst="rect">
+            <a:avLst/>
+          </a:prstGeom>
         </p:spPr>
       </p:pic>
     </p:spTree>
@@ -4620,20 +5062,103 @@
   <p:clrMapOvr>
     <a:masterClrMapping/>
   </p:clrMapOvr>
-  <p:timing>
-    <p:tnLst>
-      <p:par>
-        <p:cTn id="1" dur="indefinite" restart="never" nodeType="tmRoot"/>
-      </p:par>
-    </p:tnLst>
-  </p:timing>
+</p:sld>
+</file>
+
+<file path=ppt/slides/slide7.xml><?xml version="1.0" encoding="utf-8"?>
+<p:sld xmlns:a="http://schemas.openxmlformats.org/drawingml/2006/main" xmlns:r="http://schemas.openxmlformats.org/officeDocument/2006/relationships" xmlns:p="http://schemas.openxmlformats.org/presentationml/2006/main">
+  <p:cSld>
+    <p:spTree>
+      <p:nvGrpSpPr>
+        <p:cNvPr id="1" name=""/>
+        <p:cNvGrpSpPr/>
+        <p:nvPr/>
+      </p:nvGrpSpPr>
+      <p:grpSpPr>
+        <a:xfrm>
+          <a:off x="0" y="0"/>
+          <a:ext cx="0" cy="0"/>
+          <a:chOff x="0" y="0"/>
+          <a:chExt cx="0" cy="0"/>
+        </a:xfrm>
+      </p:grpSpPr>
+      <p:sp>
+        <p:nvSpPr>
+          <p:cNvPr id="2" name="Title 1">
+            <a:extLst>
+              <a:ext uri="{FF2B5EF4-FFF2-40B4-BE49-F238E27FC236}">
+                <a16:creationId xmlns:a16="http://schemas.microsoft.com/office/drawing/2014/main" id="{9AD5FA44-C754-4389-BA68-5901AF7A0975}"/>
+              </a:ext>
+            </a:extLst>
+          </p:cNvPr>
+          <p:cNvSpPr>
+            <a:spLocks noGrp="1"/>
+          </p:cNvSpPr>
+          <p:nvPr>
+            <p:ph type="title"/>
+          </p:nvPr>
+        </p:nvSpPr>
+        <p:spPr/>
+        <p:txBody>
+          <a:bodyPr/>
+          <a:lstStyle/>
+          <a:p>
+            <a:r>
+              <a:rPr lang="en-US" dirty="0"/>
+              <a:t>Reset Password Page</a:t>
+            </a:r>
+          </a:p>
+        </p:txBody>
+      </p:sp>
+      <p:pic>
+        <p:nvPicPr>
+          <p:cNvPr id="4" name="Content Placeholder 3">
+            <a:extLst>
+              <a:ext uri="{FF2B5EF4-FFF2-40B4-BE49-F238E27FC236}">
+                <a16:creationId xmlns:a16="http://schemas.microsoft.com/office/drawing/2014/main" id="{C58E0C3A-555C-4CF8-8DEE-0E33B5DCF3F9}"/>
+              </a:ext>
+            </a:extLst>
+          </p:cNvPr>
+          <p:cNvPicPr>
+            <a:picLocks noGrp="1" noChangeAspect="1"/>
+          </p:cNvPicPr>
+          <p:nvPr>
+            <p:ph idx="1"/>
+          </p:nvPr>
+        </p:nvPicPr>
+        <p:blipFill>
+          <a:blip r:embed="rId2"/>
+          <a:stretch>
+            <a:fillRect/>
+          </a:stretch>
+        </p:blipFill>
+        <p:spPr>
+          <a:xfrm>
+            <a:off x="3360441" y="2016125"/>
+            <a:ext cx="5785443" cy="3449638"/>
+          </a:xfrm>
+          <a:prstGeom prst="rect">
+            <a:avLst/>
+          </a:prstGeom>
+        </p:spPr>
+      </p:pic>
+    </p:spTree>
+    <p:extLst>
+      <p:ext uri="{BB962C8B-B14F-4D97-AF65-F5344CB8AC3E}">
+        <p14:creationId xmlns:p14="http://schemas.microsoft.com/office/powerpoint/2010/main" val="2639605501"/>
+      </p:ext>
+    </p:extLst>
+  </p:cSld>
+  <p:clrMapOvr>
+    <a:masterClrMapping/>
+  </p:clrMapOvr>
 </p:sld>
 </file>
 
 <file path=ppt/theme/theme1.xml><?xml version="1.0" encoding="utf-8"?>
-<a:theme xmlns:a="http://schemas.openxmlformats.org/drawingml/2006/main" name="Office Theme">
+<a:theme xmlns:a="http://schemas.openxmlformats.org/drawingml/2006/main" name="Gallery">
   <a:themeElements>
-    <a:clrScheme name="Office">
+    <a:clrScheme name="Gallery">
       <a:dk1>
         <a:sysClr val="windowText" lastClr="000000"/>
       </a:dk1>
@@ -4641,39 +5166,39 @@
         <a:sysClr val="window" lastClr="FFFFFF"/>
       </a:lt1>
       <a:dk2>
-        <a:srgbClr val="44546A"/>
+        <a:srgbClr val="454545"/>
       </a:dk2>
       <a:lt2>
-        <a:srgbClr val="E7E6E6"/>
+        <a:srgbClr val="DFDBD5"/>
       </a:lt2>
       <a:accent1>
-        <a:srgbClr val="4472C4"/>
+        <a:srgbClr val="B71E42"/>
       </a:accent1>
       <a:accent2>
-        <a:srgbClr val="ED7D31"/>
+        <a:srgbClr val="DE478E"/>
       </a:accent2>
       <a:accent3>
-        <a:srgbClr val="A5A5A5"/>
+        <a:srgbClr val="BC72F0"/>
       </a:accent3>
       <a:accent4>
-        <a:srgbClr val="FFC000"/>
+        <a:srgbClr val="795FAF"/>
       </a:accent4>
       <a:accent5>
-        <a:srgbClr val="5B9BD5"/>
+        <a:srgbClr val="586EA6"/>
       </a:accent5>
       <a:accent6>
-        <a:srgbClr val="70AD47"/>
+        <a:srgbClr val="6892A0"/>
       </a:accent6>
       <a:hlink>
-        <a:srgbClr val="0563C1"/>
+        <a:srgbClr val="FA2B5C"/>
       </a:hlink>
       <a:folHlink>
-        <a:srgbClr val="954F72"/>
+        <a:srgbClr val="BC658E"/>
       </a:folHlink>
     </a:clrScheme>
-    <a:fontScheme name="Office">
+    <a:fontScheme name="Gallery">
       <a:majorFont>
-        <a:latin typeface="Calibri Light" panose="020F0302020204030204"/>
+        <a:latin typeface="Gill Sans MT" panose="020B0502020104020203"/>
         <a:ea typeface=""/>
         <a:cs typeface=""/>
         <a:font script="Jpan" typeface="游ゴシック Light"/>
@@ -4706,26 +5231,9 @@
         <a:font script="Viet" typeface="Times New Roman"/>
         <a:font script="Uigh" typeface="Microsoft Uighur"/>
         <a:font script="Geor" typeface="Sylfaen"/>
-        <a:font script="Armn" typeface="Arial"/>
-        <a:font script="Bugi" typeface="Leelawadee UI"/>
-        <a:font script="Bopo" typeface="Microsoft JhengHei"/>
-        <a:font script="Java" typeface="Javanese Text"/>
-        <a:font script="Lisu" typeface="Segoe UI"/>
-        <a:font script="Mymr" typeface="Myanmar Text"/>
-        <a:font script="Nkoo" typeface="Ebrima"/>
-        <a:font script="Olck" typeface="Nirmala UI"/>
-        <a:font script="Osma" typeface="Ebrima"/>
-        <a:font script="Phag" typeface="Phagspa"/>
-        <a:font script="Syrn" typeface="Estrangelo Edessa"/>
-        <a:font script="Syrj" typeface="Estrangelo Edessa"/>
-        <a:font script="Syre" typeface="Estrangelo Edessa"/>
-        <a:font script="Sora" typeface="Nirmala UI"/>
-        <a:font script="Tale" typeface="Microsoft Tai Le"/>
-        <a:font script="Talu" typeface="Microsoft New Tai Lue"/>
-        <a:font script="Tfng" typeface="Ebrima"/>
       </a:majorFont>
       <a:minorFont>
-        <a:latin typeface="Calibri" panose="020F0502020204030204"/>
+        <a:latin typeface="Gill Sans MT" panose="020B0502020104020203"/>
         <a:ea typeface=""/>
         <a:cs typeface=""/>
         <a:font script="Jpan" typeface="游ゴシック"/>
@@ -4758,26 +5266,9 @@
         <a:font script="Viet" typeface="Arial"/>
         <a:font script="Uigh" typeface="Microsoft Uighur"/>
         <a:font script="Geor" typeface="Sylfaen"/>
-        <a:font script="Armn" typeface="Arial"/>
-        <a:font script="Bugi" typeface="Leelawadee UI"/>
-        <a:font script="Bopo" typeface="Microsoft JhengHei"/>
-        <a:font script="Java" typeface="Javanese Text"/>
-        <a:font script="Lisu" typeface="Segoe UI"/>
-        <a:font script="Mymr" typeface="Myanmar Text"/>
-        <a:font script="Nkoo" typeface="Ebrima"/>
-        <a:font script="Olck" typeface="Nirmala UI"/>
-        <a:font script="Osma" typeface="Ebrima"/>
-        <a:font script="Phag" typeface="Phagspa"/>
-        <a:font script="Syrn" typeface="Estrangelo Edessa"/>
-        <a:font script="Syrj" typeface="Estrangelo Edessa"/>
-        <a:font script="Syre" typeface="Estrangelo Edessa"/>
-        <a:font script="Sora" typeface="Nirmala UI"/>
-        <a:font script="Tale" typeface="Microsoft Tai Le"/>
-        <a:font script="Talu" typeface="Microsoft New Tai Lue"/>
-        <a:font script="Tfng" typeface="Ebrima"/>
       </a:minorFont>
     </a:fontScheme>
-    <a:fmtScheme name="Office">
+    <a:fmtScheme name="Gallery">
       <a:fillStyleLst>
         <a:solidFill>
           <a:schemeClr val="phClr"/>
@@ -4786,23 +5277,18 @@
           <a:gsLst>
             <a:gs pos="0">
               <a:schemeClr val="phClr">
+                <a:tint val="54000"/>
+                <a:alpha val="100000"/>
+                <a:satMod val="105000"/>
                 <a:lumMod val="110000"/>
-                <a:satMod val="105000"/>
-                <a:tint val="67000"/>
-              </a:schemeClr>
-            </a:gs>
-            <a:gs pos="50000">
-              <a:schemeClr val="phClr">
-                <a:lumMod val="105000"/>
-                <a:satMod val="103000"/>
-                <a:tint val="73000"/>
               </a:schemeClr>
             </a:gs>
             <a:gs pos="100000">
               <a:schemeClr val="phClr">
-                <a:lumMod val="105000"/>
+                <a:tint val="78000"/>
+                <a:alpha val="92000"/>
                 <a:satMod val="109000"/>
-                <a:tint val="81000"/>
+                <a:lumMod val="100000"/>
               </a:schemeClr>
             </a:gs>
           </a:gsLst>
@@ -4812,23 +5298,23 @@
           <a:gsLst>
             <a:gs pos="0">
               <a:schemeClr val="phClr">
-                <a:satMod val="103000"/>
-                <a:lumMod val="102000"/>
-                <a:tint val="94000"/>
+                <a:tint val="98000"/>
+                <a:satMod val="110000"/>
+                <a:lumMod val="104000"/>
               </a:schemeClr>
             </a:gs>
-            <a:gs pos="50000">
+            <a:gs pos="69000">
               <a:schemeClr val="phClr">
-                <a:satMod val="110000"/>
-                <a:lumMod val="100000"/>
-                <a:shade val="100000"/>
+                <a:shade val="88000"/>
+                <a:satMod val="130000"/>
+                <a:lumMod val="92000"/>
               </a:schemeClr>
             </a:gs>
             <a:gs pos="100000">
               <a:schemeClr val="phClr">
-                <a:lumMod val="99000"/>
-                <a:satMod val="120000"/>
                 <a:shade val="78000"/>
+                <a:satMod val="130000"/>
+                <a:lumMod val="92000"/>
               </a:schemeClr>
             </a:gs>
           </a:gsLst>
@@ -4836,26 +5322,23 @@
         </a:gradFill>
       </a:fillStyleLst>
       <a:lnStyleLst>
-        <a:ln w="6350" cap="flat" cmpd="sng" algn="ctr">
+        <a:ln w="9525" cap="flat" cmpd="sng" algn="ctr">
           <a:solidFill>
             <a:schemeClr val="phClr"/>
           </a:solidFill>
           <a:prstDash val="solid"/>
-          <a:miter lim="800000"/>
         </a:ln>
-        <a:ln w="12700" cap="flat" cmpd="sng" algn="ctr">
+        <a:ln w="15875" cap="flat" cmpd="sng" algn="ctr">
           <a:solidFill>
             <a:schemeClr val="phClr"/>
           </a:solidFill>
           <a:prstDash val="solid"/>
-          <a:miter lim="800000"/>
         </a:ln>
-        <a:ln w="19050" cap="flat" cmpd="sng" algn="ctr">
+        <a:ln w="22225" cap="flat" cmpd="sng" algn="ctr">
           <a:solidFill>
             <a:schemeClr val="phClr"/>
           </a:solidFill>
           <a:prstDash val="solid"/>
-          <a:miter lim="800000"/>
         </a:ln>
       </a:lnStyleLst>
       <a:effectStyleLst>
@@ -4867,12 +5350,23 @@
         </a:effectStyle>
         <a:effectStyle>
           <a:effectLst>
-            <a:outerShdw blurRad="57150" dist="19050" dir="5400000" algn="ctr" rotWithShape="0">
+            <a:outerShdw blurRad="50800" dist="50800" dir="5400000" sx="96000" sy="96000" rotWithShape="0">
               <a:srgbClr val="000000">
-                <a:alpha val="63000"/>
+                <a:alpha val="48000"/>
               </a:srgbClr>
             </a:outerShdw>
           </a:effectLst>
+          <a:scene3d>
+            <a:camera prst="orthographicFront">
+              <a:rot lat="0" lon="0" rev="0"/>
+            </a:camera>
+            <a:lightRig rig="balanced" dir="t">
+              <a:rot lat="0" lon="0" rev="1080000"/>
+            </a:lightRig>
+          </a:scene3d>
+          <a:sp3d>
+            <a:bevelT w="38100" h="12700" prst="softRound"/>
+          </a:sp3d>
         </a:effectStyle>
       </a:effectStyleLst>
       <a:bgFillStyleLst>
@@ -4880,37 +5374,26 @@
           <a:schemeClr val="phClr"/>
         </a:solidFill>
         <a:solidFill>
-          <a:schemeClr val="phClr">
-            <a:tint val="95000"/>
-            <a:satMod val="170000"/>
-          </a:schemeClr>
+          <a:schemeClr val="phClr"/>
         </a:solidFill>
         <a:gradFill rotWithShape="1">
           <a:gsLst>
             <a:gs pos="0">
               <a:schemeClr val="phClr">
-                <a:tint val="93000"/>
-                <a:satMod val="150000"/>
-                <a:shade val="98000"/>
-                <a:lumMod val="102000"/>
-              </a:schemeClr>
-            </a:gs>
-            <a:gs pos="50000">
-              <a:schemeClr val="phClr">
-                <a:tint val="98000"/>
-                <a:satMod val="130000"/>
-                <a:shade val="90000"/>
-                <a:lumMod val="103000"/>
+                <a:tint val="94000"/>
+                <a:satMod val="80000"/>
+                <a:lumMod val="106000"/>
               </a:schemeClr>
             </a:gs>
             <a:gs pos="100000">
               <a:schemeClr val="phClr">
-                <a:shade val="63000"/>
-                <a:satMod val="120000"/>
+                <a:shade val="80000"/>
               </a:schemeClr>
             </a:gs>
           </a:gsLst>
-          <a:lin ang="5400000" scaled="0"/>
+          <a:path path="circle">
+            <a:fillToRect l="43000" r="43000" b="100000"/>
+          </a:path>
         </a:gradFill>
       </a:bgFillStyleLst>
     </a:fmtScheme>
@@ -4919,7 +5402,7 @@
   <a:extraClrSchemeLst/>
   <a:extLst>
     <a:ext uri="{05A4C25C-085E-4340-85A3-A5531E510DB2}">
-      <thm15:themeFamily xmlns:thm15="http://schemas.microsoft.com/office/thememl/2012/main" name="Office Theme" id="{62F939B6-93AF-4DB8-9C6B-D6C7DFDC589F}" vid="{4A3C46E8-61CC-4603-A589-7422A47A8E4A}"/>
+      <thm15:themeFamily xmlns:thm15="http://schemas.microsoft.com/office/thememl/2012/main" name="Gallery" id="{BBFCD31E-59A1-489D-B089-A3EAD7CAE12E}" vid="{F5E91637-A7B6-4E27-B710-77DA7014EE1E}"/>
     </a:ext>
   </a:extLst>
 </a:theme>

</xml_diff>

<commit_message>
fix a few visual bugs, retook screenshots again
</commit_message>
<xml_diff>
--- a/Course Project Presentation 1.pptx
+++ b/Course Project Presentation 1.pptx
@@ -11,10 +11,10 @@
     <p:sldId id="256" r:id="rId2"/>
     <p:sldId id="258" r:id="rId3"/>
     <p:sldId id="259" r:id="rId4"/>
-    <p:sldId id="260" r:id="rId5"/>
-    <p:sldId id="267" r:id="rId6"/>
-    <p:sldId id="265" r:id="rId7"/>
-    <p:sldId id="266" r:id="rId8"/>
+    <p:sldId id="265" r:id="rId5"/>
+    <p:sldId id="266" r:id="rId6"/>
+    <p:sldId id="260" r:id="rId7"/>
+    <p:sldId id="267" r:id="rId8"/>
   </p:sldIdLst>
   <p:sldSz cx="12192000" cy="6858000"/>
   <p:notesSz cx="6858000" cy="9144000"/>
@@ -690,7 +690,7 @@
           <a:p>
             <a:r>
               <a:rPr lang="en-US" dirty="0"/>
-              <a:t>Eric made all the input boxes and buttons.  Alexander got the add degree and remove degree buttons to work, with assistance from Jonathan. Alexander also made the header visible in the background, and the window the form is displayed in.</a:t>
+              <a:t>Eric made the input boxes and label text. Alexander plugged that into a window, and applied the style.</a:t>
             </a:r>
           </a:p>
         </p:txBody>
@@ -721,7 +721,7 @@
     </p:spTree>
     <p:extLst>
       <p:ext uri="{BB962C8B-B14F-4D97-AF65-F5344CB8AC3E}">
-        <p14:creationId xmlns:p14="http://schemas.microsoft.com/office/powerpoint/2010/main" val="4230267099"/>
+        <p14:creationId xmlns:p14="http://schemas.microsoft.com/office/powerpoint/2010/main" val="2101869579"/>
       </p:ext>
     </p:extLst>
   </p:cSld>
@@ -776,8 +776,8 @@
           <a:lstStyle/>
           <a:p>
             <a:r>
-              <a:rPr lang="en-US" dirty="0"/>
-              <a:t>Eric made all the input boxes and buttons.  Alexander got the add degree and remove degree buttons to work, with assistance from Jonathan. Alexander also made the header visible in the background, and the window the form is displayed in.</a:t>
+              <a:rPr lang="en-US"/>
+              <a:t>Alexander was here</a:t>
             </a:r>
           </a:p>
         </p:txBody>
@@ -808,7 +808,7 @@
     </p:spTree>
     <p:extLst>
       <p:ext uri="{BB962C8B-B14F-4D97-AF65-F5344CB8AC3E}">
-        <p14:creationId xmlns:p14="http://schemas.microsoft.com/office/powerpoint/2010/main" val="696057365"/>
+        <p14:creationId xmlns:p14="http://schemas.microsoft.com/office/powerpoint/2010/main" val="2097406295"/>
       </p:ext>
     </p:extLst>
   </p:cSld>
@@ -864,7 +864,7 @@
           <a:p>
             <a:r>
               <a:rPr lang="en-US" dirty="0"/>
-              <a:t>Eric made the input boxes and label text. Alexander plugged that into a window, and applied the style.</a:t>
+              <a:t>Eric made all the input boxes and buttons.  Alexander got the add degree and remove degree buttons to work, with assistance from Jonathan. Alexander also made the header visible in the background, and the window the form is displayed in.</a:t>
             </a:r>
           </a:p>
         </p:txBody>
@@ -895,7 +895,94 @@
     </p:spTree>
     <p:extLst>
       <p:ext uri="{BB962C8B-B14F-4D97-AF65-F5344CB8AC3E}">
-        <p14:creationId xmlns:p14="http://schemas.microsoft.com/office/powerpoint/2010/main" val="2101869579"/>
+        <p14:creationId xmlns:p14="http://schemas.microsoft.com/office/powerpoint/2010/main" val="4230267099"/>
+      </p:ext>
+    </p:extLst>
+  </p:cSld>
+  <p:clrMapOvr>
+    <a:masterClrMapping/>
+  </p:clrMapOvr>
+</p:notes>
+</file>
+
+<file path=ppt/notesSlides/notesSlide6.xml><?xml version="1.0" encoding="utf-8"?>
+<p:notes xmlns:a="http://schemas.openxmlformats.org/drawingml/2006/main" xmlns:r="http://schemas.openxmlformats.org/officeDocument/2006/relationships" xmlns:p="http://schemas.openxmlformats.org/presentationml/2006/main">
+  <p:cSld>
+    <p:spTree>
+      <p:nvGrpSpPr>
+        <p:cNvPr id="1" name=""/>
+        <p:cNvGrpSpPr/>
+        <p:nvPr/>
+      </p:nvGrpSpPr>
+      <p:grpSpPr>
+        <a:xfrm>
+          <a:off x="0" y="0"/>
+          <a:ext cx="0" cy="0"/>
+          <a:chOff x="0" y="0"/>
+          <a:chExt cx="0" cy="0"/>
+        </a:xfrm>
+      </p:grpSpPr>
+      <p:sp>
+        <p:nvSpPr>
+          <p:cNvPr id="2" name="Slide Image Placeholder 1"/>
+          <p:cNvSpPr>
+            <a:spLocks noGrp="1" noRot="1" noChangeAspect="1"/>
+          </p:cNvSpPr>
+          <p:nvPr>
+            <p:ph type="sldImg"/>
+          </p:nvPr>
+        </p:nvSpPr>
+        <p:spPr/>
+      </p:sp>
+      <p:sp>
+        <p:nvSpPr>
+          <p:cNvPr id="3" name="Notes Placeholder 2"/>
+          <p:cNvSpPr>
+            <a:spLocks noGrp="1"/>
+          </p:cNvSpPr>
+          <p:nvPr>
+            <p:ph type="body" idx="1"/>
+          </p:nvPr>
+        </p:nvSpPr>
+        <p:spPr/>
+        <p:txBody>
+          <a:bodyPr/>
+          <a:lstStyle/>
+          <a:p>
+            <a:r>
+              <a:rPr lang="en-US" dirty="0"/>
+              <a:t>Eric made all the input boxes and buttons.  Alexander got the add degree and remove degree buttons to work, with assistance from Jonathan. Alexander also made the header visible in the background, and the window the form is displayed in.</a:t>
+            </a:r>
+          </a:p>
+        </p:txBody>
+      </p:sp>
+      <p:sp>
+        <p:nvSpPr>
+          <p:cNvPr id="4" name="Slide Number Placeholder 3"/>
+          <p:cNvSpPr>
+            <a:spLocks noGrp="1"/>
+          </p:cNvSpPr>
+          <p:nvPr>
+            <p:ph type="sldNum" sz="quarter" idx="5"/>
+          </p:nvPr>
+        </p:nvSpPr>
+        <p:spPr/>
+        <p:txBody>
+          <a:bodyPr/>
+          <a:lstStyle/>
+          <a:p>
+            <a:fld id="{6010D91D-3246-47C2-A380-84E50B05807D}" type="slidenum">
+              <a:rPr lang="en-US" smtClean="0"/>
+              <a:t>7</a:t>
+            </a:fld>
+            <a:endParaRPr lang="en-US"/>
+          </a:p>
+        </p:txBody>
+      </p:sp>
+    </p:spTree>
+    <p:extLst>
+      <p:ext uri="{BB962C8B-B14F-4D97-AF65-F5344CB8AC3E}">
+        <p14:creationId xmlns:p14="http://schemas.microsoft.com/office/powerpoint/2010/main" val="696057365"/>
       </p:ext>
     </p:extLst>
   </p:cSld>
@@ -4816,7 +4903,7 @@
           <p:cNvPr id="2" name="Title 1">
             <a:extLst>
               <a:ext uri="{FF2B5EF4-FFF2-40B4-BE49-F238E27FC236}">
-                <a16:creationId xmlns:a16="http://schemas.microsoft.com/office/drawing/2014/main" id="{6060D5DF-1D6A-4416-9A18-137D9DA4EB41}"/>
+                <a16:creationId xmlns:a16="http://schemas.microsoft.com/office/drawing/2014/main" id="{3BC978F4-831A-416E-9A3B-431AEF059172}"/>
               </a:ext>
             </a:extLst>
           </p:cNvPr>
@@ -4833,9 +4920,10 @@
           <a:lstStyle/>
           <a:p>
             <a:r>
-              <a:rPr lang="en-US" dirty="0"/>
-              <a:t>User Registration page</a:t>
-            </a:r>
+              <a:rPr lang="en-US"/>
+              <a:t>Login page</a:t>
+            </a:r>
+            <a:endParaRPr lang="en-US" dirty="0"/>
           </a:p>
         </p:txBody>
       </p:sp>
@@ -4844,7 +4932,7 @@
           <p:cNvPr id="5" name="Content Placeholder 4">
             <a:extLst>
               <a:ext uri="{FF2B5EF4-FFF2-40B4-BE49-F238E27FC236}">
-                <a16:creationId xmlns:a16="http://schemas.microsoft.com/office/drawing/2014/main" id="{CE7BE85F-A21D-40D9-B336-2036033F218B}"/>
+                <a16:creationId xmlns:a16="http://schemas.microsoft.com/office/drawing/2014/main" id="{D45BF02F-63EA-4D9E-BC97-AA42750DFC58}"/>
               </a:ext>
             </a:extLst>
           </p:cNvPr>
@@ -4863,8 +4951,8 @@
         </p:blipFill>
         <p:spPr>
           <a:xfrm>
-            <a:off x="3453649" y="2016125"/>
-            <a:ext cx="5599027" cy="3449638"/>
+            <a:off x="3355900" y="2016125"/>
+            <a:ext cx="5794525" cy="3449638"/>
           </a:xfrm>
           <a:prstGeom prst="rect">
             <a:avLst/>
@@ -4874,7 +4962,7 @@
     </p:spTree>
     <p:extLst>
       <p:ext uri="{BB962C8B-B14F-4D97-AF65-F5344CB8AC3E}">
-        <p14:creationId xmlns:p14="http://schemas.microsoft.com/office/powerpoint/2010/main" val="448455109"/>
+        <p14:creationId xmlns:p14="http://schemas.microsoft.com/office/powerpoint/2010/main" val="1698286532"/>
       </p:ext>
     </p:extLst>
   </p:cSld>
@@ -4906,7 +4994,7 @@
           <p:cNvPr id="2" name="Title 1">
             <a:extLst>
               <a:ext uri="{FF2B5EF4-FFF2-40B4-BE49-F238E27FC236}">
-                <a16:creationId xmlns:a16="http://schemas.microsoft.com/office/drawing/2014/main" id="{6060D5DF-1D6A-4416-9A18-137D9DA4EB41}"/>
+                <a16:creationId xmlns:a16="http://schemas.microsoft.com/office/drawing/2014/main" id="{9AD5FA44-C754-4389-BA68-5901AF7A0975}"/>
               </a:ext>
             </a:extLst>
           </p:cNvPr>
@@ -4924,17 +5012,17 @@
           <a:p>
             <a:r>
               <a:rPr lang="en-US" dirty="0"/>
-              <a:t>User Registration page</a:t>
+              <a:t>Reset Password Page</a:t>
             </a:r>
           </a:p>
         </p:txBody>
       </p:sp>
       <p:pic>
         <p:nvPicPr>
-          <p:cNvPr id="6" name="Content Placeholder 5">
+          <p:cNvPr id="4" name="Content Placeholder 3">
             <a:extLst>
               <a:ext uri="{FF2B5EF4-FFF2-40B4-BE49-F238E27FC236}">
-                <a16:creationId xmlns:a16="http://schemas.microsoft.com/office/drawing/2014/main" id="{42674F34-D3B4-4D0C-9E9E-3734D6108C55}"/>
+                <a16:creationId xmlns:a16="http://schemas.microsoft.com/office/drawing/2014/main" id="{C58E0C3A-555C-4CF8-8DEE-0E33B5DCF3F9}"/>
               </a:ext>
             </a:extLst>
           </p:cNvPr>
@@ -4953,8 +5041,8 @@
         </p:blipFill>
         <p:spPr>
           <a:xfrm>
-            <a:off x="4122366" y="2016125"/>
-            <a:ext cx="4261593" cy="3449638"/>
+            <a:off x="3360441" y="2016125"/>
+            <a:ext cx="5785443" cy="3449638"/>
           </a:xfrm>
           <a:prstGeom prst="rect">
             <a:avLst/>
@@ -4964,7 +5052,7 @@
     </p:spTree>
     <p:extLst>
       <p:ext uri="{BB962C8B-B14F-4D97-AF65-F5344CB8AC3E}">
-        <p14:creationId xmlns:p14="http://schemas.microsoft.com/office/powerpoint/2010/main" val="2246741724"/>
+        <p14:creationId xmlns:p14="http://schemas.microsoft.com/office/powerpoint/2010/main" val="2639605501"/>
       </p:ext>
     </p:extLst>
   </p:cSld>
@@ -4977,6 +5065,30 @@
 <file path=ppt/slides/slide6.xml><?xml version="1.0" encoding="utf-8"?>
 <p:sld xmlns:a="http://schemas.openxmlformats.org/drawingml/2006/main" xmlns:r="http://schemas.openxmlformats.org/officeDocument/2006/relationships" xmlns:p="http://schemas.openxmlformats.org/presentationml/2006/main">
   <p:cSld>
+    <p:bg>
+      <p:bgPr>
+        <a:gradFill rotWithShape="1">
+          <a:gsLst>
+            <a:gs pos="0">
+              <a:schemeClr val="bg2">
+                <a:tint val="94000"/>
+                <a:satMod val="80000"/>
+                <a:lumMod val="106000"/>
+              </a:schemeClr>
+            </a:gs>
+            <a:gs pos="100000">
+              <a:schemeClr val="bg2">
+                <a:shade val="80000"/>
+              </a:schemeClr>
+            </a:gs>
+          </a:gsLst>
+          <a:path path="circle">
+            <a:fillToRect l="43000" r="43000" b="100000"/>
+          </a:path>
+        </a:gradFill>
+        <a:effectLst/>
+      </p:bgPr>
+    </p:bg>
     <p:spTree>
       <p:nvGrpSpPr>
         <p:cNvPr id="1" name=""/>
@@ -4993,59 +5105,317 @@
       </p:grpSpPr>
       <p:sp>
         <p:nvSpPr>
-          <p:cNvPr id="2" name="Title 1">
+          <p:cNvPr id="14" name="Rectangle 13">
             <a:extLst>
               <a:ext uri="{FF2B5EF4-FFF2-40B4-BE49-F238E27FC236}">
-                <a16:creationId xmlns:a16="http://schemas.microsoft.com/office/drawing/2014/main" id="{3BC978F4-831A-416E-9A3B-431AEF059172}"/>
+                <a16:creationId xmlns:a16="http://schemas.microsoft.com/office/drawing/2014/main" id="{CDDE5CDF-1512-4CDA-B956-23D223F8DE44}"/>
+              </a:ext>
+              <a:ext uri="{C183D7F6-B498-43B3-948B-1728B52AA6E4}">
+                <adec:decorative xmlns:adec="http://schemas.microsoft.com/office/drawing/2017/decorative" val="1"/>
               </a:ext>
             </a:extLst>
           </p:cNvPr>
           <p:cNvSpPr>
-            <a:spLocks noGrp="1"/>
-          </p:cNvSpPr>
-          <p:nvPr>
-            <p:ph type="title"/>
-          </p:nvPr>
-        </p:nvSpPr>
-        <p:spPr/>
-        <p:txBody>
-          <a:bodyPr/>
-          <a:lstStyle/>
-          <a:p>
-            <a:r>
-              <a:rPr lang="en-US"/>
-              <a:t>Login page</a:t>
-            </a:r>
-            <a:endParaRPr lang="en-US" dirty="0"/>
-          </a:p>
-        </p:txBody>
+            <a:spLocks noGrp="1" noRot="1" noChangeAspect="1" noMove="1" noResize="1" noEditPoints="1" noAdjustHandles="1" noChangeArrowheads="1" noChangeShapeType="1" noTextEdit="1"/>
+          </p:cNvSpPr>
+          <p:nvPr>
+            <p:extLst>
+              <p:ext uri="{386F3935-93C4-4BCD-93E2-E3B085C9AB24}">
+                <p16:designElem xmlns:p16="http://schemas.microsoft.com/office/powerpoint/2015/main" val="1"/>
+              </p:ext>
+            </p:extLst>
+          </p:nvPr>
+        </p:nvSpPr>
+        <p:spPr>
+          <a:xfrm>
+            <a:off x="0" y="2019476"/>
+            <a:ext cx="12192000" cy="4105941"/>
+          </a:xfrm>
+          <a:prstGeom prst="rect">
+            <a:avLst/>
+          </a:prstGeom>
+          <a:gradFill flip="none" rotWithShape="1">
+            <a:gsLst>
+              <a:gs pos="0">
+                <a:schemeClr val="bg2">
+                  <a:alpha val="0"/>
+                </a:schemeClr>
+              </a:gs>
+              <a:gs pos="100000">
+                <a:schemeClr val="bg2"/>
+              </a:gs>
+            </a:gsLst>
+            <a:lin ang="5400000" scaled="0"/>
+            <a:tileRect/>
+          </a:gradFill>
+          <a:ln>
+            <a:noFill/>
+          </a:ln>
+        </p:spPr>
+        <p:style>
+          <a:lnRef idx="2">
+            <a:schemeClr val="accent1">
+              <a:shade val="50000"/>
+            </a:schemeClr>
+          </a:lnRef>
+          <a:fillRef idx="1">
+            <a:schemeClr val="accent1"/>
+          </a:fillRef>
+          <a:effectRef idx="0">
+            <a:schemeClr val="accent1"/>
+          </a:effectRef>
+          <a:fontRef idx="minor">
+            <a:schemeClr val="lt1"/>
+          </a:fontRef>
+        </p:style>
       </p:sp>
       <p:pic>
         <p:nvPicPr>
-          <p:cNvPr id="5" name="Content Placeholder 4">
+          <p:cNvPr id="16" name="Picture 15">
             <a:extLst>
               <a:ext uri="{FF2B5EF4-FFF2-40B4-BE49-F238E27FC236}">
-                <a16:creationId xmlns:a16="http://schemas.microsoft.com/office/drawing/2014/main" id="{D45BF02F-63EA-4D9E-BC97-AA42750DFC58}"/>
+                <a16:creationId xmlns:a16="http://schemas.microsoft.com/office/drawing/2014/main" id="{B029D7D8-5A6B-4C76-94C8-15798C6C5ADB}"/>
+              </a:ext>
+              <a:ext uri="{C183D7F6-B498-43B3-948B-1728B52AA6E4}">
+                <adec:decorative xmlns:adec="http://schemas.microsoft.com/office/drawing/2017/decorative" val="1"/>
               </a:ext>
             </a:extLst>
           </p:cNvPr>
           <p:cNvPicPr>
-            <a:picLocks noGrp="1" noChangeAspect="1"/>
+            <a:picLocks noGrp="1" noRot="1" noChangeAspect="1" noMove="1" noResize="1" noEditPoints="1" noAdjustHandles="1" noChangeArrowheads="1" noChangeShapeType="1" noCrop="1"/>
           </p:cNvPicPr>
           <p:nvPr>
-            <p:ph idx="1"/>
-          </p:nvPr>
+            <p:extLst>
+              <p:ext uri="{386F3935-93C4-4BCD-93E2-E3B085C9AB24}">
+                <p16:designElem xmlns:p16="http://schemas.microsoft.com/office/powerpoint/2015/main" val="1"/>
+              </p:ext>
+            </p:extLst>
+          </p:nvPr>
+        </p:nvPicPr>
+        <p:blipFill rotWithShape="1">
+          <a:blip r:embed="rId3">
+            <a:extLst>
+              <a:ext uri="{28A0092B-C50C-407E-A947-70E740481C1C}">
+                <a14:useLocalDpi xmlns:a14="http://schemas.microsoft.com/office/drawing/2010/main" val="0"/>
+              </a:ext>
+            </a:extLst>
+          </a:blip>
+          <a:srcRect t="1538" b="-1538"/>
+          <a:stretch/>
+        </p:blipFill>
+        <p:spPr bwMode="black">
+          <a:xfrm>
+            <a:off x="0" y="6126480"/>
+            <a:ext cx="12192000" cy="742950"/>
+          </a:xfrm>
+          <a:prstGeom prst="rect">
+            <a:avLst/>
+          </a:prstGeom>
+        </p:spPr>
+      </p:pic>
+      <p:cxnSp>
+        <p:nvCxnSpPr>
+          <p:cNvPr id="18" name="Straight Connector 17">
+            <a:extLst>
+              <a:ext uri="{FF2B5EF4-FFF2-40B4-BE49-F238E27FC236}">
+                <a16:creationId xmlns:a16="http://schemas.microsoft.com/office/drawing/2014/main" id="{A5C9319C-E20D-4884-952F-60B6A58C3E34}"/>
+              </a:ext>
+              <a:ext uri="{C183D7F6-B498-43B3-948B-1728B52AA6E4}">
+                <adec:decorative xmlns:adec="http://schemas.microsoft.com/office/drawing/2017/decorative" val="1"/>
+              </a:ext>
+            </a:extLst>
+          </p:cNvPr>
+          <p:cNvCxnSpPr>
+            <a:cxnSpLocks noGrp="1" noRot="1" noChangeAspect="1" noMove="1" noResize="1" noEditPoints="1" noAdjustHandles="1" noChangeArrowheads="1" noChangeShapeType="1"/>
+          </p:cNvCxnSpPr>
+          <p:nvPr>
+            <p:extLst>
+              <p:ext uri="{386F3935-93C4-4BCD-93E2-E3B085C9AB24}">
+                <p16:designElem xmlns:p16="http://schemas.microsoft.com/office/powerpoint/2015/main" val="1"/>
+              </p:ext>
+            </p:extLst>
+          </p:nvPr>
+        </p:nvCxnSpPr>
+        <p:spPr>
+          <a:xfrm>
+            <a:off x="0" y="6128413"/>
+            <a:ext cx="12192000" cy="0"/>
+          </a:xfrm>
+          <a:prstGeom prst="line">
+            <a:avLst/>
+          </a:prstGeom>
+          <a:ln w="12700">
+            <a:solidFill>
+              <a:srgbClr val="000001">
+                <a:alpha val="20000"/>
+              </a:srgbClr>
+            </a:solidFill>
+          </a:ln>
+        </p:spPr>
+        <p:style>
+          <a:lnRef idx="1">
+            <a:schemeClr val="accent1"/>
+          </a:lnRef>
+          <a:fillRef idx="0">
+            <a:schemeClr val="accent1"/>
+          </a:fillRef>
+          <a:effectRef idx="0">
+            <a:schemeClr val="accent1"/>
+          </a:effectRef>
+          <a:fontRef idx="minor">
+            <a:schemeClr val="tx1"/>
+          </a:fontRef>
+        </p:style>
+      </p:cxnSp>
+      <p:sp useBgFill="1">
+        <p:nvSpPr>
+          <p:cNvPr id="38" name="Rectangle 19">
+            <a:extLst>
+              <a:ext uri="{FF2B5EF4-FFF2-40B4-BE49-F238E27FC236}">
+                <a16:creationId xmlns:a16="http://schemas.microsoft.com/office/drawing/2014/main" id="{F1176DA6-4BBF-42A4-9C94-E6613CCD6B37}"/>
+              </a:ext>
+              <a:ext uri="{C183D7F6-B498-43B3-948B-1728B52AA6E4}">
+                <adec:decorative xmlns:adec="http://schemas.microsoft.com/office/drawing/2017/decorative" val="1"/>
+              </a:ext>
+            </a:extLst>
+          </p:cNvPr>
+          <p:cNvSpPr>
+            <a:spLocks noGrp="1" noRot="1" noChangeAspect="1" noMove="1" noResize="1" noEditPoints="1" noAdjustHandles="1" noChangeArrowheads="1" noChangeShapeType="1" noTextEdit="1"/>
+          </p:cNvSpPr>
+          <p:nvPr>
+            <p:extLst>
+              <p:ext uri="{386F3935-93C4-4BCD-93E2-E3B085C9AB24}">
+                <p16:designElem xmlns:p16="http://schemas.microsoft.com/office/powerpoint/2015/main" val="1"/>
+              </p:ext>
+            </p:extLst>
+          </p:nvPr>
+        </p:nvSpPr>
+        <p:spPr>
+          <a:xfrm>
+            <a:off x="0" y="0"/>
+            <a:ext cx="12192000" cy="6858000"/>
+          </a:xfrm>
+          <a:prstGeom prst="rect">
+            <a:avLst/>
+          </a:prstGeom>
+          <a:ln>
+            <a:noFill/>
+          </a:ln>
+        </p:spPr>
+        <p:style>
+          <a:lnRef idx="2">
+            <a:schemeClr val="accent1">
+              <a:shade val="50000"/>
+            </a:schemeClr>
+          </a:lnRef>
+          <a:fillRef idx="1">
+            <a:schemeClr val="accent1"/>
+          </a:fillRef>
+          <a:effectRef idx="0">
+            <a:schemeClr val="accent1"/>
+          </a:effectRef>
+          <a:fontRef idx="minor">
+            <a:schemeClr val="lt1"/>
+          </a:fontRef>
+        </p:style>
+        <p:txBody>
+          <a:bodyPr rtlCol="0" anchor="ctr"/>
+          <a:lstStyle/>
+          <a:p>
+            <a:pPr algn="ctr"/>
+            <a:endParaRPr lang="en-US"/>
+          </a:p>
+        </p:txBody>
+      </p:sp>
+      <p:sp>
+        <p:nvSpPr>
+          <p:cNvPr id="22" name="Rectangle 21">
+            <a:extLst>
+              <a:ext uri="{FF2B5EF4-FFF2-40B4-BE49-F238E27FC236}">
+                <a16:creationId xmlns:a16="http://schemas.microsoft.com/office/drawing/2014/main" id="{99AAB0AE-172B-4FB4-80C2-86CD6B824220}"/>
+              </a:ext>
+              <a:ext uri="{C183D7F6-B498-43B3-948B-1728B52AA6E4}">
+                <adec:decorative xmlns:adec="http://schemas.microsoft.com/office/drawing/2017/decorative" val="1"/>
+              </a:ext>
+            </a:extLst>
+          </p:cNvPr>
+          <p:cNvSpPr>
+            <a:spLocks noGrp="1" noRot="1" noChangeAspect="1" noMove="1" noResize="1" noEditPoints="1" noAdjustHandles="1" noChangeArrowheads="1" noChangeShapeType="1" noTextEdit="1"/>
+          </p:cNvSpPr>
+          <p:nvPr>
+            <p:extLst>
+              <p:ext uri="{386F3935-93C4-4BCD-93E2-E3B085C9AB24}">
+                <p16:designElem xmlns:p16="http://schemas.microsoft.com/office/powerpoint/2015/main" val="1"/>
+              </p:ext>
+            </p:extLst>
+          </p:nvPr>
+        </p:nvSpPr>
+        <p:spPr>
+          <a:xfrm>
+            <a:off x="477012" y="480060"/>
+            <a:ext cx="11237976" cy="5897880"/>
+          </a:xfrm>
+          <a:prstGeom prst="rect">
+            <a:avLst/>
+          </a:prstGeom>
+          <a:solidFill>
+            <a:schemeClr val="bg1"/>
+          </a:solidFill>
+          <a:ln w="22225">
+            <a:solidFill>
+              <a:srgbClr val="54A2F8"/>
+            </a:solidFill>
+          </a:ln>
+        </p:spPr>
+        <p:style>
+          <a:lnRef idx="2">
+            <a:schemeClr val="accent1">
+              <a:shade val="50000"/>
+            </a:schemeClr>
+          </a:lnRef>
+          <a:fillRef idx="1">
+            <a:schemeClr val="accent1"/>
+          </a:fillRef>
+          <a:effectRef idx="0">
+            <a:schemeClr val="accent1"/>
+          </a:effectRef>
+          <a:fontRef idx="minor">
+            <a:schemeClr val="lt1"/>
+          </a:fontRef>
+        </p:style>
+        <p:txBody>
+          <a:bodyPr rtlCol="0" anchor="ctr"/>
+          <a:lstStyle/>
+          <a:p>
+            <a:pPr algn="ctr"/>
+            <a:endParaRPr lang="en-US"/>
+          </a:p>
+        </p:txBody>
+      </p:sp>
+      <p:pic>
+        <p:nvPicPr>
+          <p:cNvPr id="9" name="Picture 8">
+            <a:extLst>
+              <a:ext uri="{FF2B5EF4-FFF2-40B4-BE49-F238E27FC236}">
+                <a16:creationId xmlns:a16="http://schemas.microsoft.com/office/drawing/2014/main" id="{16D788DC-A642-481E-9989-9B947D62C81F}"/>
+              </a:ext>
+            </a:extLst>
+          </p:cNvPr>
+          <p:cNvPicPr>
+            <a:picLocks noChangeAspect="1"/>
+          </p:cNvPicPr>
+          <p:nvPr/>
         </p:nvPicPr>
         <p:blipFill>
-          <a:blip r:embed="rId3"/>
+          <a:blip r:embed="rId4"/>
           <a:stretch>
             <a:fillRect/>
           </a:stretch>
         </p:blipFill>
         <p:spPr>
           <a:xfrm>
-            <a:off x="3355900" y="2016125"/>
-            <a:ext cx="5794525" cy="3449638"/>
+            <a:off x="3034975" y="643467"/>
+            <a:ext cx="6122050" cy="5571066"/>
           </a:xfrm>
           <a:prstGeom prst="rect">
             <a:avLst/>
@@ -5055,7 +5425,7 @@
     </p:spTree>
     <p:extLst>
       <p:ext uri="{BB962C8B-B14F-4D97-AF65-F5344CB8AC3E}">
-        <p14:creationId xmlns:p14="http://schemas.microsoft.com/office/powerpoint/2010/main" val="1698286532"/>
+        <p14:creationId xmlns:p14="http://schemas.microsoft.com/office/powerpoint/2010/main" val="448455109"/>
       </p:ext>
     </p:extLst>
   </p:cSld>
@@ -5068,6 +5438,30 @@
 <file path=ppt/slides/slide7.xml><?xml version="1.0" encoding="utf-8"?>
 <p:sld xmlns:a="http://schemas.openxmlformats.org/drawingml/2006/main" xmlns:r="http://schemas.openxmlformats.org/officeDocument/2006/relationships" xmlns:p="http://schemas.openxmlformats.org/presentationml/2006/main">
   <p:cSld>
+    <p:bg>
+      <p:bgPr>
+        <a:gradFill rotWithShape="1">
+          <a:gsLst>
+            <a:gs pos="0">
+              <a:schemeClr val="bg2">
+                <a:tint val="94000"/>
+                <a:satMod val="80000"/>
+                <a:lumMod val="106000"/>
+              </a:schemeClr>
+            </a:gs>
+            <a:gs pos="100000">
+              <a:schemeClr val="bg2">
+                <a:shade val="80000"/>
+              </a:schemeClr>
+            </a:gs>
+          </a:gsLst>
+          <a:path path="circle">
+            <a:fillToRect l="43000" r="43000" b="100000"/>
+          </a:path>
+        </a:gradFill>
+        <a:effectLst/>
+      </p:bgPr>
+    </p:bg>
     <p:spTree>
       <p:nvGrpSpPr>
         <p:cNvPr id="1" name=""/>
@@ -5084,58 +5478,317 @@
       </p:grpSpPr>
       <p:sp>
         <p:nvSpPr>
-          <p:cNvPr id="2" name="Title 1">
+          <p:cNvPr id="14" name="Rectangle 13">
             <a:extLst>
               <a:ext uri="{FF2B5EF4-FFF2-40B4-BE49-F238E27FC236}">
-                <a16:creationId xmlns:a16="http://schemas.microsoft.com/office/drawing/2014/main" id="{9AD5FA44-C754-4389-BA68-5901AF7A0975}"/>
+                <a16:creationId xmlns:a16="http://schemas.microsoft.com/office/drawing/2014/main" id="{CDDE5CDF-1512-4CDA-B956-23D223F8DE44}"/>
+              </a:ext>
+              <a:ext uri="{C183D7F6-B498-43B3-948B-1728B52AA6E4}">
+                <adec:decorative xmlns:adec="http://schemas.microsoft.com/office/drawing/2017/decorative" val="1"/>
               </a:ext>
             </a:extLst>
           </p:cNvPr>
           <p:cNvSpPr>
-            <a:spLocks noGrp="1"/>
-          </p:cNvSpPr>
-          <p:nvPr>
-            <p:ph type="title"/>
-          </p:nvPr>
-        </p:nvSpPr>
-        <p:spPr/>
-        <p:txBody>
-          <a:bodyPr/>
-          <a:lstStyle/>
-          <a:p>
-            <a:r>
-              <a:rPr lang="en-US" dirty="0"/>
-              <a:t>Reset Password Page</a:t>
-            </a:r>
-          </a:p>
-        </p:txBody>
+            <a:spLocks noGrp="1" noRot="1" noChangeAspect="1" noMove="1" noResize="1" noEditPoints="1" noAdjustHandles="1" noChangeArrowheads="1" noChangeShapeType="1" noTextEdit="1"/>
+          </p:cNvSpPr>
+          <p:nvPr>
+            <p:extLst>
+              <p:ext uri="{386F3935-93C4-4BCD-93E2-E3B085C9AB24}">
+                <p16:designElem xmlns:p16="http://schemas.microsoft.com/office/powerpoint/2015/main" val="1"/>
+              </p:ext>
+            </p:extLst>
+          </p:nvPr>
+        </p:nvSpPr>
+        <p:spPr>
+          <a:xfrm>
+            <a:off x="0" y="2019476"/>
+            <a:ext cx="12192000" cy="4105941"/>
+          </a:xfrm>
+          <a:prstGeom prst="rect">
+            <a:avLst/>
+          </a:prstGeom>
+          <a:gradFill flip="none" rotWithShape="1">
+            <a:gsLst>
+              <a:gs pos="0">
+                <a:schemeClr val="bg2">
+                  <a:alpha val="0"/>
+                </a:schemeClr>
+              </a:gs>
+              <a:gs pos="100000">
+                <a:schemeClr val="bg2"/>
+              </a:gs>
+            </a:gsLst>
+            <a:lin ang="5400000" scaled="0"/>
+            <a:tileRect/>
+          </a:gradFill>
+          <a:ln>
+            <a:noFill/>
+          </a:ln>
+        </p:spPr>
+        <p:style>
+          <a:lnRef idx="2">
+            <a:schemeClr val="accent1">
+              <a:shade val="50000"/>
+            </a:schemeClr>
+          </a:lnRef>
+          <a:fillRef idx="1">
+            <a:schemeClr val="accent1"/>
+          </a:fillRef>
+          <a:effectRef idx="0">
+            <a:schemeClr val="accent1"/>
+          </a:effectRef>
+          <a:fontRef idx="minor">
+            <a:schemeClr val="lt1"/>
+          </a:fontRef>
+        </p:style>
       </p:sp>
       <p:pic>
         <p:nvPicPr>
-          <p:cNvPr id="4" name="Content Placeholder 3">
+          <p:cNvPr id="16" name="Picture 15">
             <a:extLst>
               <a:ext uri="{FF2B5EF4-FFF2-40B4-BE49-F238E27FC236}">
-                <a16:creationId xmlns:a16="http://schemas.microsoft.com/office/drawing/2014/main" id="{C58E0C3A-555C-4CF8-8DEE-0E33B5DCF3F9}"/>
+                <a16:creationId xmlns:a16="http://schemas.microsoft.com/office/drawing/2014/main" id="{B029D7D8-5A6B-4C76-94C8-15798C6C5ADB}"/>
+              </a:ext>
+              <a:ext uri="{C183D7F6-B498-43B3-948B-1728B52AA6E4}">
+                <adec:decorative xmlns:adec="http://schemas.microsoft.com/office/drawing/2017/decorative" val="1"/>
               </a:ext>
             </a:extLst>
           </p:cNvPr>
           <p:cNvPicPr>
-            <a:picLocks noGrp="1" noChangeAspect="1"/>
+            <a:picLocks noGrp="1" noRot="1" noChangeAspect="1" noMove="1" noResize="1" noEditPoints="1" noAdjustHandles="1" noChangeArrowheads="1" noChangeShapeType="1" noCrop="1"/>
           </p:cNvPicPr>
           <p:nvPr>
-            <p:ph idx="1"/>
-          </p:nvPr>
+            <p:extLst>
+              <p:ext uri="{386F3935-93C4-4BCD-93E2-E3B085C9AB24}">
+                <p16:designElem xmlns:p16="http://schemas.microsoft.com/office/powerpoint/2015/main" val="1"/>
+              </p:ext>
+            </p:extLst>
+          </p:nvPr>
+        </p:nvPicPr>
+        <p:blipFill rotWithShape="1">
+          <a:blip r:embed="rId3">
+            <a:extLst>
+              <a:ext uri="{28A0092B-C50C-407E-A947-70E740481C1C}">
+                <a14:useLocalDpi xmlns:a14="http://schemas.microsoft.com/office/drawing/2010/main" val="0"/>
+              </a:ext>
+            </a:extLst>
+          </a:blip>
+          <a:srcRect t="1538" b="-1538"/>
+          <a:stretch/>
+        </p:blipFill>
+        <p:spPr bwMode="black">
+          <a:xfrm>
+            <a:off x="0" y="6126480"/>
+            <a:ext cx="12192000" cy="742950"/>
+          </a:xfrm>
+          <a:prstGeom prst="rect">
+            <a:avLst/>
+          </a:prstGeom>
+        </p:spPr>
+      </p:pic>
+      <p:cxnSp>
+        <p:nvCxnSpPr>
+          <p:cNvPr id="18" name="Straight Connector 17">
+            <a:extLst>
+              <a:ext uri="{FF2B5EF4-FFF2-40B4-BE49-F238E27FC236}">
+                <a16:creationId xmlns:a16="http://schemas.microsoft.com/office/drawing/2014/main" id="{A5C9319C-E20D-4884-952F-60B6A58C3E34}"/>
+              </a:ext>
+              <a:ext uri="{C183D7F6-B498-43B3-948B-1728B52AA6E4}">
+                <adec:decorative xmlns:adec="http://schemas.microsoft.com/office/drawing/2017/decorative" val="1"/>
+              </a:ext>
+            </a:extLst>
+          </p:cNvPr>
+          <p:cNvCxnSpPr>
+            <a:cxnSpLocks noGrp="1" noRot="1" noChangeAspect="1" noMove="1" noResize="1" noEditPoints="1" noAdjustHandles="1" noChangeArrowheads="1" noChangeShapeType="1"/>
+          </p:cNvCxnSpPr>
+          <p:nvPr>
+            <p:extLst>
+              <p:ext uri="{386F3935-93C4-4BCD-93E2-E3B085C9AB24}">
+                <p16:designElem xmlns:p16="http://schemas.microsoft.com/office/powerpoint/2015/main" val="1"/>
+              </p:ext>
+            </p:extLst>
+          </p:nvPr>
+        </p:nvCxnSpPr>
+        <p:spPr>
+          <a:xfrm>
+            <a:off x="0" y="6128413"/>
+            <a:ext cx="12192000" cy="0"/>
+          </a:xfrm>
+          <a:prstGeom prst="line">
+            <a:avLst/>
+          </a:prstGeom>
+          <a:ln w="12700">
+            <a:solidFill>
+              <a:srgbClr val="000001">
+                <a:alpha val="20000"/>
+              </a:srgbClr>
+            </a:solidFill>
+          </a:ln>
+        </p:spPr>
+        <p:style>
+          <a:lnRef idx="1">
+            <a:schemeClr val="accent1"/>
+          </a:lnRef>
+          <a:fillRef idx="0">
+            <a:schemeClr val="accent1"/>
+          </a:fillRef>
+          <a:effectRef idx="0">
+            <a:schemeClr val="accent1"/>
+          </a:effectRef>
+          <a:fontRef idx="minor">
+            <a:schemeClr val="tx1"/>
+          </a:fontRef>
+        </p:style>
+      </p:cxnSp>
+      <p:sp useBgFill="1">
+        <p:nvSpPr>
+          <p:cNvPr id="20" name="Rectangle 19">
+            <a:extLst>
+              <a:ext uri="{FF2B5EF4-FFF2-40B4-BE49-F238E27FC236}">
+                <a16:creationId xmlns:a16="http://schemas.microsoft.com/office/drawing/2014/main" id="{F1176DA6-4BBF-42A4-9C94-E6613CCD6B37}"/>
+              </a:ext>
+              <a:ext uri="{C183D7F6-B498-43B3-948B-1728B52AA6E4}">
+                <adec:decorative xmlns:adec="http://schemas.microsoft.com/office/drawing/2017/decorative" val="1"/>
+              </a:ext>
+            </a:extLst>
+          </p:cNvPr>
+          <p:cNvSpPr>
+            <a:spLocks noGrp="1" noRot="1" noChangeAspect="1" noMove="1" noResize="1" noEditPoints="1" noAdjustHandles="1" noChangeArrowheads="1" noChangeShapeType="1" noTextEdit="1"/>
+          </p:cNvSpPr>
+          <p:nvPr>
+            <p:extLst>
+              <p:ext uri="{386F3935-93C4-4BCD-93E2-E3B085C9AB24}">
+                <p16:designElem xmlns:p16="http://schemas.microsoft.com/office/powerpoint/2015/main" val="1"/>
+              </p:ext>
+            </p:extLst>
+          </p:nvPr>
+        </p:nvSpPr>
+        <p:spPr>
+          <a:xfrm>
+            <a:off x="0" y="0"/>
+            <a:ext cx="12192000" cy="6858000"/>
+          </a:xfrm>
+          <a:prstGeom prst="rect">
+            <a:avLst/>
+          </a:prstGeom>
+          <a:ln>
+            <a:noFill/>
+          </a:ln>
+        </p:spPr>
+        <p:style>
+          <a:lnRef idx="2">
+            <a:schemeClr val="accent1">
+              <a:shade val="50000"/>
+            </a:schemeClr>
+          </a:lnRef>
+          <a:fillRef idx="1">
+            <a:schemeClr val="accent1"/>
+          </a:fillRef>
+          <a:effectRef idx="0">
+            <a:schemeClr val="accent1"/>
+          </a:effectRef>
+          <a:fontRef idx="minor">
+            <a:schemeClr val="lt1"/>
+          </a:fontRef>
+        </p:style>
+        <p:txBody>
+          <a:bodyPr rtlCol="0" anchor="ctr"/>
+          <a:lstStyle/>
+          <a:p>
+            <a:pPr algn="ctr"/>
+            <a:endParaRPr lang="en-US"/>
+          </a:p>
+        </p:txBody>
+      </p:sp>
+      <p:sp>
+        <p:nvSpPr>
+          <p:cNvPr id="22" name="Rectangle 21">
+            <a:extLst>
+              <a:ext uri="{FF2B5EF4-FFF2-40B4-BE49-F238E27FC236}">
+                <a16:creationId xmlns:a16="http://schemas.microsoft.com/office/drawing/2014/main" id="{99AAB0AE-172B-4FB4-80C2-86CD6B824220}"/>
+              </a:ext>
+              <a:ext uri="{C183D7F6-B498-43B3-948B-1728B52AA6E4}">
+                <adec:decorative xmlns:adec="http://schemas.microsoft.com/office/drawing/2017/decorative" val="1"/>
+              </a:ext>
+            </a:extLst>
+          </p:cNvPr>
+          <p:cNvSpPr>
+            <a:spLocks noGrp="1" noRot="1" noChangeAspect="1" noMove="1" noResize="1" noEditPoints="1" noAdjustHandles="1" noChangeArrowheads="1" noChangeShapeType="1" noTextEdit="1"/>
+          </p:cNvSpPr>
+          <p:nvPr>
+            <p:extLst>
+              <p:ext uri="{386F3935-93C4-4BCD-93E2-E3B085C9AB24}">
+                <p16:designElem xmlns:p16="http://schemas.microsoft.com/office/powerpoint/2015/main" val="1"/>
+              </p:ext>
+            </p:extLst>
+          </p:nvPr>
+        </p:nvSpPr>
+        <p:spPr>
+          <a:xfrm>
+            <a:off x="477012" y="480060"/>
+            <a:ext cx="11237976" cy="5897880"/>
+          </a:xfrm>
+          <a:prstGeom prst="rect">
+            <a:avLst/>
+          </a:prstGeom>
+          <a:solidFill>
+            <a:schemeClr val="bg1"/>
+          </a:solidFill>
+          <a:ln w="22225">
+            <a:solidFill>
+              <a:srgbClr val="FAA51D"/>
+            </a:solidFill>
+          </a:ln>
+        </p:spPr>
+        <p:style>
+          <a:lnRef idx="2">
+            <a:schemeClr val="accent1">
+              <a:shade val="50000"/>
+            </a:schemeClr>
+          </a:lnRef>
+          <a:fillRef idx="1">
+            <a:schemeClr val="accent1"/>
+          </a:fillRef>
+          <a:effectRef idx="0">
+            <a:schemeClr val="accent1"/>
+          </a:effectRef>
+          <a:fontRef idx="minor">
+            <a:schemeClr val="lt1"/>
+          </a:fontRef>
+        </p:style>
+        <p:txBody>
+          <a:bodyPr rtlCol="0" anchor="ctr"/>
+          <a:lstStyle/>
+          <a:p>
+            <a:pPr algn="ctr"/>
+            <a:endParaRPr lang="en-US"/>
+          </a:p>
+        </p:txBody>
+      </p:sp>
+      <p:pic>
+        <p:nvPicPr>
+          <p:cNvPr id="9" name="Picture 8">
+            <a:extLst>
+              <a:ext uri="{FF2B5EF4-FFF2-40B4-BE49-F238E27FC236}">
+                <a16:creationId xmlns:a16="http://schemas.microsoft.com/office/drawing/2014/main" id="{C41469C0-5C5E-436C-8769-B84197F9E38D}"/>
+              </a:ext>
+            </a:extLst>
+          </p:cNvPr>
+          <p:cNvPicPr>
+            <a:picLocks noChangeAspect="1"/>
+          </p:cNvPicPr>
+          <p:nvPr/>
         </p:nvPicPr>
         <p:blipFill>
-          <a:blip r:embed="rId2"/>
+          <a:blip r:embed="rId4"/>
           <a:stretch>
             <a:fillRect/>
           </a:stretch>
         </p:blipFill>
         <p:spPr>
           <a:xfrm>
-            <a:off x="3360441" y="2016125"/>
-            <a:ext cx="5785443" cy="3449638"/>
+            <a:off x="2688620" y="643467"/>
+            <a:ext cx="6814759" cy="5571066"/>
           </a:xfrm>
           <a:prstGeom prst="rect">
             <a:avLst/>
@@ -5145,7 +5798,7 @@
     </p:spTree>
     <p:extLst>
       <p:ext uri="{BB962C8B-B14F-4D97-AF65-F5344CB8AC3E}">
-        <p14:creationId xmlns:p14="http://schemas.microsoft.com/office/powerpoint/2010/main" val="2639605501"/>
+        <p14:creationId xmlns:p14="http://schemas.microsoft.com/office/powerpoint/2010/main" val="2246741724"/>
       </p:ext>
     </p:extLst>
   </p:cSld>

</xml_diff>